<commit_message>
Definición de Componentes/modulos de implementacion
</commit_message>
<xml_diff>
--- a/Diseno/Concepto_Arquitectura.pptx
+++ b/Diseno/Concepto_Arquitectura.pptx
@@ -4,9 +4,14 @@
   <p:sldMasterIdLst>
     <p:sldMasterId id="2147483648" r:id="rId1"/>
   </p:sldMasterIdLst>
+  <p:notesMasterIdLst>
+    <p:notesMasterId r:id="rId6"/>
+  </p:notesMasterIdLst>
   <p:sldIdLst>
     <p:sldId id="256" r:id="rId2"/>
     <p:sldId id="257" r:id="rId3"/>
+    <p:sldId id="258" r:id="rId4"/>
+    <p:sldId id="259" r:id="rId5"/>
   </p:sldIdLst>
   <p:sldSz cx="12192000" cy="6858000"/>
   <p:notesSz cx="6858000" cy="9144000"/>
@@ -105,7 +110,446 @@
       </a:defRPr>
     </a:lvl9pPr>
   </p:defaultTextStyle>
+  <p:extLst>
+    <p:ext uri="{EFAFB233-063F-42B5-8137-9DF3F51BA10A}">
+      <p15:sldGuideLst xmlns:p15="http://schemas.microsoft.com/office/powerpoint/2012/main"/>
+    </p:ext>
+  </p:extLst>
 </p:presentation>
+</file>
+
+<file path=ppt/notesMasters/notesMaster1.xml><?xml version="1.0" encoding="utf-8"?>
+<p:notesMaster xmlns:a="http://schemas.openxmlformats.org/drawingml/2006/main" xmlns:r="http://schemas.openxmlformats.org/officeDocument/2006/relationships" xmlns:p="http://schemas.openxmlformats.org/presentationml/2006/main">
+  <p:cSld>
+    <p:bg>
+      <p:bgRef idx="1001">
+        <a:schemeClr val="bg1"/>
+      </p:bgRef>
+    </p:bg>
+    <p:spTree>
+      <p:nvGrpSpPr>
+        <p:cNvPr id="1" name=""/>
+        <p:cNvGrpSpPr/>
+        <p:nvPr/>
+      </p:nvGrpSpPr>
+      <p:grpSpPr>
+        <a:xfrm>
+          <a:off x="0" y="0"/>
+          <a:ext cx="0" cy="0"/>
+          <a:chOff x="0" y="0"/>
+          <a:chExt cx="0" cy="0"/>
+        </a:xfrm>
+      </p:grpSpPr>
+      <p:sp>
+        <p:nvSpPr>
+          <p:cNvPr id="2" name="Marcador de encabezado 1"/>
+          <p:cNvSpPr>
+            <a:spLocks noGrp="1"/>
+          </p:cNvSpPr>
+          <p:nvPr>
+            <p:ph type="hdr" sz="quarter"/>
+          </p:nvPr>
+        </p:nvSpPr>
+        <p:spPr>
+          <a:xfrm>
+            <a:off x="0" y="0"/>
+            <a:ext cx="2971800" cy="458788"/>
+          </a:xfrm>
+          <a:prstGeom prst="rect">
+            <a:avLst/>
+          </a:prstGeom>
+        </p:spPr>
+        <p:txBody>
+          <a:bodyPr vert="horz" lIns="91440" tIns="45720" rIns="91440" bIns="45720" rtlCol="0"/>
+          <a:lstStyle>
+            <a:lvl1pPr algn="l">
+              <a:defRPr sz="1200"/>
+            </a:lvl1pPr>
+          </a:lstStyle>
+          <a:p>
+            <a:endParaRPr lang="es-ES"/>
+          </a:p>
+        </p:txBody>
+      </p:sp>
+      <p:sp>
+        <p:nvSpPr>
+          <p:cNvPr id="3" name="Marcador de fecha 2"/>
+          <p:cNvSpPr>
+            <a:spLocks noGrp="1"/>
+          </p:cNvSpPr>
+          <p:nvPr>
+            <p:ph type="dt" idx="1"/>
+          </p:nvPr>
+        </p:nvSpPr>
+        <p:spPr>
+          <a:xfrm>
+            <a:off x="3884613" y="0"/>
+            <a:ext cx="2971800" cy="458788"/>
+          </a:xfrm>
+          <a:prstGeom prst="rect">
+            <a:avLst/>
+          </a:prstGeom>
+        </p:spPr>
+        <p:txBody>
+          <a:bodyPr vert="horz" lIns="91440" tIns="45720" rIns="91440" bIns="45720" rtlCol="0"/>
+          <a:lstStyle>
+            <a:lvl1pPr algn="r">
+              <a:defRPr sz="1200"/>
+            </a:lvl1pPr>
+          </a:lstStyle>
+          <a:p>
+            <a:fld id="{7ECBDAE4-6EA4-40D6-BCE1-AA6A866A51DC}" type="datetimeFigureOut">
+              <a:rPr lang="es-ES" smtClean="0"/>
+              <a:t>20/09/2014</a:t>
+            </a:fld>
+            <a:endParaRPr lang="es-ES"/>
+          </a:p>
+        </p:txBody>
+      </p:sp>
+      <p:sp>
+        <p:nvSpPr>
+          <p:cNvPr id="4" name="Marcador de imagen de diapositiva 3"/>
+          <p:cNvSpPr>
+            <a:spLocks noGrp="1" noRot="1" noChangeAspect="1"/>
+          </p:cNvSpPr>
+          <p:nvPr>
+            <p:ph type="sldImg" idx="2"/>
+          </p:nvPr>
+        </p:nvSpPr>
+        <p:spPr>
+          <a:xfrm>
+            <a:off x="685800" y="1143000"/>
+            <a:ext cx="5486400" cy="3086100"/>
+          </a:xfrm>
+          <a:prstGeom prst="rect">
+            <a:avLst/>
+          </a:prstGeom>
+          <a:noFill/>
+          <a:ln w="12700">
+            <a:solidFill>
+              <a:prstClr val="black"/>
+            </a:solidFill>
+          </a:ln>
+        </p:spPr>
+        <p:txBody>
+          <a:bodyPr vert="horz" lIns="91440" tIns="45720" rIns="91440" bIns="45720" rtlCol="0" anchor="ctr"/>
+          <a:lstStyle/>
+          <a:p>
+            <a:endParaRPr lang="es-ES"/>
+          </a:p>
+        </p:txBody>
+      </p:sp>
+      <p:sp>
+        <p:nvSpPr>
+          <p:cNvPr id="5" name="Marcador de notas 4"/>
+          <p:cNvSpPr>
+            <a:spLocks noGrp="1"/>
+          </p:cNvSpPr>
+          <p:nvPr>
+            <p:ph type="body" sz="quarter" idx="3"/>
+          </p:nvPr>
+        </p:nvSpPr>
+        <p:spPr>
+          <a:xfrm>
+            <a:off x="685800" y="4400550"/>
+            <a:ext cx="5486400" cy="3600450"/>
+          </a:xfrm>
+          <a:prstGeom prst="rect">
+            <a:avLst/>
+          </a:prstGeom>
+        </p:spPr>
+        <p:txBody>
+          <a:bodyPr vert="horz" lIns="91440" tIns="45720" rIns="91440" bIns="45720" rtlCol="0"/>
+          <a:lstStyle/>
+          <a:p>
+            <a:pPr lvl="0"/>
+            <a:r>
+              <a:rPr lang="es-ES" smtClean="0"/>
+              <a:t>Haga clic para modificar el estilo de texto del patrón</a:t>
+            </a:r>
+          </a:p>
+          <a:p>
+            <a:pPr lvl="1"/>
+            <a:r>
+              <a:rPr lang="es-ES" smtClean="0"/>
+              <a:t>Segundo nivel</a:t>
+            </a:r>
+          </a:p>
+          <a:p>
+            <a:pPr lvl="2"/>
+            <a:r>
+              <a:rPr lang="es-ES" smtClean="0"/>
+              <a:t>Tercer nivel</a:t>
+            </a:r>
+          </a:p>
+          <a:p>
+            <a:pPr lvl="3"/>
+            <a:r>
+              <a:rPr lang="es-ES" smtClean="0"/>
+              <a:t>Cuarto nivel</a:t>
+            </a:r>
+          </a:p>
+          <a:p>
+            <a:pPr lvl="4"/>
+            <a:r>
+              <a:rPr lang="es-ES" smtClean="0"/>
+              <a:t>Quinto nivel</a:t>
+            </a:r>
+            <a:endParaRPr lang="es-ES"/>
+          </a:p>
+        </p:txBody>
+      </p:sp>
+      <p:sp>
+        <p:nvSpPr>
+          <p:cNvPr id="6" name="Marcador de pie de página 5"/>
+          <p:cNvSpPr>
+            <a:spLocks noGrp="1"/>
+          </p:cNvSpPr>
+          <p:nvPr>
+            <p:ph type="ftr" sz="quarter" idx="4"/>
+          </p:nvPr>
+        </p:nvSpPr>
+        <p:spPr>
+          <a:xfrm>
+            <a:off x="0" y="8685213"/>
+            <a:ext cx="2971800" cy="458787"/>
+          </a:xfrm>
+          <a:prstGeom prst="rect">
+            <a:avLst/>
+          </a:prstGeom>
+        </p:spPr>
+        <p:txBody>
+          <a:bodyPr vert="horz" lIns="91440" tIns="45720" rIns="91440" bIns="45720" rtlCol="0" anchor="b"/>
+          <a:lstStyle>
+            <a:lvl1pPr algn="l">
+              <a:defRPr sz="1200"/>
+            </a:lvl1pPr>
+          </a:lstStyle>
+          <a:p>
+            <a:endParaRPr lang="es-ES"/>
+          </a:p>
+        </p:txBody>
+      </p:sp>
+      <p:sp>
+        <p:nvSpPr>
+          <p:cNvPr id="7" name="Marcador de número de diapositiva 6"/>
+          <p:cNvSpPr>
+            <a:spLocks noGrp="1"/>
+          </p:cNvSpPr>
+          <p:nvPr>
+            <p:ph type="sldNum" sz="quarter" idx="5"/>
+          </p:nvPr>
+        </p:nvSpPr>
+        <p:spPr>
+          <a:xfrm>
+            <a:off x="3884613" y="8685213"/>
+            <a:ext cx="2971800" cy="458787"/>
+          </a:xfrm>
+          <a:prstGeom prst="rect">
+            <a:avLst/>
+          </a:prstGeom>
+        </p:spPr>
+        <p:txBody>
+          <a:bodyPr vert="horz" lIns="91440" tIns="45720" rIns="91440" bIns="45720" rtlCol="0" anchor="b"/>
+          <a:lstStyle>
+            <a:lvl1pPr algn="r">
+              <a:defRPr sz="1200"/>
+            </a:lvl1pPr>
+          </a:lstStyle>
+          <a:p>
+            <a:fld id="{58B1D539-097F-48EF-88C5-1A2317DAC9C9}" type="slidenum">
+              <a:rPr lang="es-ES" smtClean="0"/>
+              <a:t>‹Nº›</a:t>
+            </a:fld>
+            <a:endParaRPr lang="es-ES"/>
+          </a:p>
+        </p:txBody>
+      </p:sp>
+    </p:spTree>
+    <p:extLst>
+      <p:ext uri="{BB962C8B-B14F-4D97-AF65-F5344CB8AC3E}">
+        <p14:creationId xmlns:p14="http://schemas.microsoft.com/office/powerpoint/2010/main" val="2962360376"/>
+      </p:ext>
+    </p:extLst>
+  </p:cSld>
+  <p:clrMap bg1="lt1" tx1="dk1" bg2="lt2" tx2="dk2" accent1="accent1" accent2="accent2" accent3="accent3" accent4="accent4" accent5="accent5" accent6="accent6" hlink="hlink" folHlink="folHlink"/>
+  <p:notesStyle>
+    <a:lvl1pPr marL="0" algn="l" defTabSz="914400" rtl="0" eaLnBrk="1" latinLnBrk="0" hangingPunct="1">
+      <a:defRPr sz="1200" kern="1200">
+        <a:solidFill>
+          <a:schemeClr val="tx1"/>
+        </a:solidFill>
+        <a:latin typeface="+mn-lt"/>
+        <a:ea typeface="+mn-ea"/>
+        <a:cs typeface="+mn-cs"/>
+      </a:defRPr>
+    </a:lvl1pPr>
+    <a:lvl2pPr marL="457200" algn="l" defTabSz="914400" rtl="0" eaLnBrk="1" latinLnBrk="0" hangingPunct="1">
+      <a:defRPr sz="1200" kern="1200">
+        <a:solidFill>
+          <a:schemeClr val="tx1"/>
+        </a:solidFill>
+        <a:latin typeface="+mn-lt"/>
+        <a:ea typeface="+mn-ea"/>
+        <a:cs typeface="+mn-cs"/>
+      </a:defRPr>
+    </a:lvl2pPr>
+    <a:lvl3pPr marL="914400" algn="l" defTabSz="914400" rtl="0" eaLnBrk="1" latinLnBrk="0" hangingPunct="1">
+      <a:defRPr sz="1200" kern="1200">
+        <a:solidFill>
+          <a:schemeClr val="tx1"/>
+        </a:solidFill>
+        <a:latin typeface="+mn-lt"/>
+        <a:ea typeface="+mn-ea"/>
+        <a:cs typeface="+mn-cs"/>
+      </a:defRPr>
+    </a:lvl3pPr>
+    <a:lvl4pPr marL="1371600" algn="l" defTabSz="914400" rtl="0" eaLnBrk="1" latinLnBrk="0" hangingPunct="1">
+      <a:defRPr sz="1200" kern="1200">
+        <a:solidFill>
+          <a:schemeClr val="tx1"/>
+        </a:solidFill>
+        <a:latin typeface="+mn-lt"/>
+        <a:ea typeface="+mn-ea"/>
+        <a:cs typeface="+mn-cs"/>
+      </a:defRPr>
+    </a:lvl4pPr>
+    <a:lvl5pPr marL="1828800" algn="l" defTabSz="914400" rtl="0" eaLnBrk="1" latinLnBrk="0" hangingPunct="1">
+      <a:defRPr sz="1200" kern="1200">
+        <a:solidFill>
+          <a:schemeClr val="tx1"/>
+        </a:solidFill>
+        <a:latin typeface="+mn-lt"/>
+        <a:ea typeface="+mn-ea"/>
+        <a:cs typeface="+mn-cs"/>
+      </a:defRPr>
+    </a:lvl5pPr>
+    <a:lvl6pPr marL="2286000" algn="l" defTabSz="914400" rtl="0" eaLnBrk="1" latinLnBrk="0" hangingPunct="1">
+      <a:defRPr sz="1200" kern="1200">
+        <a:solidFill>
+          <a:schemeClr val="tx1"/>
+        </a:solidFill>
+        <a:latin typeface="+mn-lt"/>
+        <a:ea typeface="+mn-ea"/>
+        <a:cs typeface="+mn-cs"/>
+      </a:defRPr>
+    </a:lvl6pPr>
+    <a:lvl7pPr marL="2743200" algn="l" defTabSz="914400" rtl="0" eaLnBrk="1" latinLnBrk="0" hangingPunct="1">
+      <a:defRPr sz="1200" kern="1200">
+        <a:solidFill>
+          <a:schemeClr val="tx1"/>
+        </a:solidFill>
+        <a:latin typeface="+mn-lt"/>
+        <a:ea typeface="+mn-ea"/>
+        <a:cs typeface="+mn-cs"/>
+      </a:defRPr>
+    </a:lvl7pPr>
+    <a:lvl8pPr marL="3200400" algn="l" defTabSz="914400" rtl="0" eaLnBrk="1" latinLnBrk="0" hangingPunct="1">
+      <a:defRPr sz="1200" kern="1200">
+        <a:solidFill>
+          <a:schemeClr val="tx1"/>
+        </a:solidFill>
+        <a:latin typeface="+mn-lt"/>
+        <a:ea typeface="+mn-ea"/>
+        <a:cs typeface="+mn-cs"/>
+      </a:defRPr>
+    </a:lvl8pPr>
+    <a:lvl9pPr marL="3657600" algn="l" defTabSz="914400" rtl="0" eaLnBrk="1" latinLnBrk="0" hangingPunct="1">
+      <a:defRPr sz="1200" kern="1200">
+        <a:solidFill>
+          <a:schemeClr val="tx1"/>
+        </a:solidFill>
+        <a:latin typeface="+mn-lt"/>
+        <a:ea typeface="+mn-ea"/>
+        <a:cs typeface="+mn-cs"/>
+      </a:defRPr>
+    </a:lvl9pPr>
+  </p:notesStyle>
+</p:notesMaster>
+</file>
+
+<file path=ppt/notesSlides/notesSlide1.xml><?xml version="1.0" encoding="utf-8"?>
+<p:notes xmlns:a="http://schemas.openxmlformats.org/drawingml/2006/main" xmlns:r="http://schemas.openxmlformats.org/officeDocument/2006/relationships" xmlns:p="http://schemas.openxmlformats.org/presentationml/2006/main">
+  <p:cSld>
+    <p:spTree>
+      <p:nvGrpSpPr>
+        <p:cNvPr id="1" name=""/>
+        <p:cNvGrpSpPr/>
+        <p:nvPr/>
+      </p:nvGrpSpPr>
+      <p:grpSpPr>
+        <a:xfrm>
+          <a:off x="0" y="0"/>
+          <a:ext cx="0" cy="0"/>
+          <a:chOff x="0" y="0"/>
+          <a:chExt cx="0" cy="0"/>
+        </a:xfrm>
+      </p:grpSpPr>
+      <p:sp>
+        <p:nvSpPr>
+          <p:cNvPr id="2" name="Marcador de imagen de diapositiva 1"/>
+          <p:cNvSpPr>
+            <a:spLocks noGrp="1" noRot="1" noChangeAspect="1"/>
+          </p:cNvSpPr>
+          <p:nvPr>
+            <p:ph type="sldImg"/>
+          </p:nvPr>
+        </p:nvSpPr>
+        <p:spPr/>
+      </p:sp>
+      <p:sp>
+        <p:nvSpPr>
+          <p:cNvPr id="3" name="Marcador de notas 2"/>
+          <p:cNvSpPr>
+            <a:spLocks noGrp="1"/>
+          </p:cNvSpPr>
+          <p:nvPr>
+            <p:ph type="body" idx="1"/>
+          </p:nvPr>
+        </p:nvSpPr>
+        <p:spPr/>
+        <p:txBody>
+          <a:bodyPr/>
+          <a:lstStyle/>
+          <a:p>
+            <a:endParaRPr lang="es-ES" dirty="0"/>
+          </a:p>
+        </p:txBody>
+      </p:sp>
+      <p:sp>
+        <p:nvSpPr>
+          <p:cNvPr id="4" name="Marcador de número de diapositiva 3"/>
+          <p:cNvSpPr>
+            <a:spLocks noGrp="1"/>
+          </p:cNvSpPr>
+          <p:nvPr>
+            <p:ph type="sldNum" sz="quarter" idx="10"/>
+          </p:nvPr>
+        </p:nvSpPr>
+        <p:spPr/>
+        <p:txBody>
+          <a:bodyPr/>
+          <a:lstStyle/>
+          <a:p>
+            <a:fld id="{58B1D539-097F-48EF-88C5-1A2317DAC9C9}" type="slidenum">
+              <a:rPr lang="es-ES" smtClean="0"/>
+              <a:t>3</a:t>
+            </a:fld>
+            <a:endParaRPr lang="es-ES"/>
+          </a:p>
+        </p:txBody>
+      </p:sp>
+    </p:spTree>
+    <p:extLst>
+      <p:ext uri="{BB962C8B-B14F-4D97-AF65-F5344CB8AC3E}">
+        <p14:creationId xmlns:p14="http://schemas.microsoft.com/office/powerpoint/2010/main" val="1147997226"/>
+      </p:ext>
+    </p:extLst>
+  </p:cSld>
+  <p:clrMapOvr>
+    <a:masterClrMapping/>
+  </p:clrMapOvr>
+</p:notes>
 </file>
 
 <file path=ppt/slideLayouts/slideLayout1.xml><?xml version="1.0" encoding="utf-8"?>
@@ -4403,6 +4847,1776 @@
 </p:sld>
 </file>
 
+<file path=ppt/slides/slide3.xml><?xml version="1.0" encoding="utf-8"?>
+<p:sld xmlns:a="http://schemas.openxmlformats.org/drawingml/2006/main" xmlns:r="http://schemas.openxmlformats.org/officeDocument/2006/relationships" xmlns:p="http://schemas.openxmlformats.org/presentationml/2006/main">
+  <p:cSld>
+    <p:spTree>
+      <p:nvGrpSpPr>
+        <p:cNvPr id="1" name=""/>
+        <p:cNvGrpSpPr/>
+        <p:nvPr/>
+      </p:nvGrpSpPr>
+      <p:grpSpPr>
+        <a:xfrm>
+          <a:off x="0" y="0"/>
+          <a:ext cx="0" cy="0"/>
+          <a:chOff x="0" y="0"/>
+          <a:chExt cx="0" cy="0"/>
+        </a:xfrm>
+      </p:grpSpPr>
+      <p:sp>
+        <p:nvSpPr>
+          <p:cNvPr id="29" name="Rectángulo redondeado 28"/>
+          <p:cNvSpPr/>
+          <p:nvPr/>
+        </p:nvSpPr>
+        <p:spPr>
+          <a:xfrm>
+            <a:off x="942975" y="4873227"/>
+            <a:ext cx="10272713" cy="1870473"/>
+          </a:xfrm>
+          <a:prstGeom prst="roundRect">
+            <a:avLst/>
+          </a:prstGeom>
+          <a:noFill/>
+        </p:spPr>
+        <p:style>
+          <a:lnRef idx="2">
+            <a:schemeClr val="accent1">
+              <a:shade val="50000"/>
+            </a:schemeClr>
+          </a:lnRef>
+          <a:fillRef idx="1">
+            <a:schemeClr val="accent1"/>
+          </a:fillRef>
+          <a:effectRef idx="0">
+            <a:schemeClr val="accent1"/>
+          </a:effectRef>
+          <a:fontRef idx="minor">
+            <a:schemeClr val="lt1"/>
+          </a:fontRef>
+        </p:style>
+        <p:txBody>
+          <a:bodyPr vert="horz" rtlCol="0" anchor="t"/>
+          <a:lstStyle/>
+          <a:p>
+            <a:r>
+              <a:rPr lang="es-ES" dirty="0" smtClean="0">
+                <a:solidFill>
+                  <a:schemeClr val="accent1">
+                    <a:lumMod val="75000"/>
+                  </a:schemeClr>
+                </a:solidFill>
+              </a:rPr>
+              <a:t>Capa de Datos</a:t>
+            </a:r>
+            <a:endParaRPr lang="es-ES" dirty="0">
+              <a:solidFill>
+                <a:schemeClr val="accent1">
+                  <a:lumMod val="75000"/>
+                </a:schemeClr>
+              </a:solidFill>
+            </a:endParaRPr>
+          </a:p>
+        </p:txBody>
+      </p:sp>
+      <p:sp>
+        <p:nvSpPr>
+          <p:cNvPr id="2" name="Título 1"/>
+          <p:cNvSpPr>
+            <a:spLocks noGrp="1"/>
+          </p:cNvSpPr>
+          <p:nvPr>
+            <p:ph type="title"/>
+          </p:nvPr>
+        </p:nvSpPr>
+        <p:spPr>
+          <a:xfrm>
+            <a:off x="838200" y="365125"/>
+            <a:ext cx="10515600" cy="1120087"/>
+          </a:xfrm>
+        </p:spPr>
+        <p:txBody>
+          <a:bodyPr/>
+          <a:lstStyle/>
+          <a:p>
+            <a:r>
+              <a:rPr lang="es-ES" dirty="0" smtClean="0"/>
+              <a:t>Componente de la Arquitectura</a:t>
+            </a:r>
+            <a:endParaRPr lang="es-ES" dirty="0"/>
+          </a:p>
+        </p:txBody>
+      </p:sp>
+      <p:sp>
+        <p:nvSpPr>
+          <p:cNvPr id="3" name="Rectángulo redondeado 2"/>
+          <p:cNvSpPr/>
+          <p:nvPr/>
+        </p:nvSpPr>
+        <p:spPr>
+          <a:xfrm>
+            <a:off x="4581530" y="3914774"/>
+            <a:ext cx="1671637" cy="728663"/>
+          </a:xfrm>
+          <a:prstGeom prst="roundRect">
+            <a:avLst/>
+          </a:prstGeom>
+        </p:spPr>
+        <p:style>
+          <a:lnRef idx="2">
+            <a:schemeClr val="accent1">
+              <a:shade val="50000"/>
+            </a:schemeClr>
+          </a:lnRef>
+          <a:fillRef idx="1">
+            <a:schemeClr val="accent1"/>
+          </a:fillRef>
+          <a:effectRef idx="0">
+            <a:schemeClr val="accent1"/>
+          </a:effectRef>
+          <a:fontRef idx="minor">
+            <a:schemeClr val="lt1"/>
+          </a:fontRef>
+        </p:style>
+        <p:txBody>
+          <a:bodyPr rtlCol="0" anchor="ctr"/>
+          <a:lstStyle/>
+          <a:p>
+            <a:pPr algn="ctr"/>
+            <a:r>
+              <a:rPr lang="es-ES" dirty="0" err="1"/>
+              <a:t>worklist-ejb</a:t>
+            </a:r>
+            <a:endParaRPr lang="es-ES" dirty="0"/>
+          </a:p>
+        </p:txBody>
+      </p:sp>
+      <p:sp>
+        <p:nvSpPr>
+          <p:cNvPr id="4" name="Rectángulo redondeado 3"/>
+          <p:cNvSpPr/>
+          <p:nvPr/>
+        </p:nvSpPr>
+        <p:spPr>
+          <a:xfrm>
+            <a:off x="4581531" y="5011338"/>
+            <a:ext cx="1671637" cy="728663"/>
+          </a:xfrm>
+          <a:prstGeom prst="roundRect">
+            <a:avLst/>
+          </a:prstGeom>
+        </p:spPr>
+        <p:style>
+          <a:lnRef idx="2">
+            <a:schemeClr val="accent1">
+              <a:shade val="50000"/>
+            </a:schemeClr>
+          </a:lnRef>
+          <a:fillRef idx="1">
+            <a:schemeClr val="accent1"/>
+          </a:fillRef>
+          <a:effectRef idx="0">
+            <a:schemeClr val="accent1"/>
+          </a:effectRef>
+          <a:fontRef idx="minor">
+            <a:schemeClr val="lt1"/>
+          </a:fontRef>
+        </p:style>
+        <p:txBody>
+          <a:bodyPr rtlCol="0" anchor="ctr"/>
+          <a:lstStyle/>
+          <a:p>
+            <a:pPr algn="ctr"/>
+            <a:r>
+              <a:rPr lang="es-ES" dirty="0" err="1"/>
+              <a:t>worklist-dac</a:t>
+            </a:r>
+            <a:endParaRPr lang="es-ES" dirty="0"/>
+          </a:p>
+        </p:txBody>
+      </p:sp>
+      <p:sp>
+        <p:nvSpPr>
+          <p:cNvPr id="5" name="Rectángulo redondeado 4"/>
+          <p:cNvSpPr/>
+          <p:nvPr/>
+        </p:nvSpPr>
+        <p:spPr>
+          <a:xfrm>
+            <a:off x="4581530" y="1830581"/>
+            <a:ext cx="1671637" cy="728663"/>
+          </a:xfrm>
+          <a:prstGeom prst="roundRect">
+            <a:avLst/>
+          </a:prstGeom>
+        </p:spPr>
+        <p:style>
+          <a:lnRef idx="2">
+            <a:schemeClr val="accent1">
+              <a:shade val="50000"/>
+            </a:schemeClr>
+          </a:lnRef>
+          <a:fillRef idx="1">
+            <a:schemeClr val="accent1"/>
+          </a:fillRef>
+          <a:effectRef idx="0">
+            <a:schemeClr val="accent1"/>
+          </a:effectRef>
+          <a:fontRef idx="minor">
+            <a:schemeClr val="lt1"/>
+          </a:fontRef>
+        </p:style>
+        <p:txBody>
+          <a:bodyPr rtlCol="0" anchor="ctr"/>
+          <a:lstStyle/>
+          <a:p>
+            <a:pPr algn="ctr"/>
+            <a:r>
+              <a:rPr lang="es-ES" dirty="0" err="1"/>
+              <a:t>worklist</a:t>
+            </a:r>
+            <a:r>
+              <a:rPr lang="es-ES" dirty="0"/>
+              <a:t>-portal</a:t>
+            </a:r>
+          </a:p>
+        </p:txBody>
+      </p:sp>
+      <p:sp>
+        <p:nvSpPr>
+          <p:cNvPr id="6" name="Rectángulo redondeado 5"/>
+          <p:cNvSpPr/>
+          <p:nvPr/>
+        </p:nvSpPr>
+        <p:spPr>
+          <a:xfrm>
+            <a:off x="2638430" y="2917624"/>
+            <a:ext cx="1671637" cy="728663"/>
+          </a:xfrm>
+          <a:prstGeom prst="roundRect">
+            <a:avLst/>
+          </a:prstGeom>
+        </p:spPr>
+        <p:style>
+          <a:lnRef idx="2">
+            <a:schemeClr val="accent1">
+              <a:shade val="50000"/>
+            </a:schemeClr>
+          </a:lnRef>
+          <a:fillRef idx="1">
+            <a:schemeClr val="accent1"/>
+          </a:fillRef>
+          <a:effectRef idx="0">
+            <a:schemeClr val="accent1"/>
+          </a:effectRef>
+          <a:fontRef idx="minor">
+            <a:schemeClr val="lt1"/>
+          </a:fontRef>
+        </p:style>
+        <p:txBody>
+          <a:bodyPr rtlCol="0" anchor="ctr"/>
+          <a:lstStyle/>
+          <a:p>
+            <a:pPr algn="ctr"/>
+            <a:r>
+              <a:rPr lang="es-ES" dirty="0" err="1"/>
+              <a:t>worklist-ws</a:t>
+            </a:r>
+            <a:endParaRPr lang="es-ES" dirty="0"/>
+          </a:p>
+        </p:txBody>
+      </p:sp>
+      <p:cxnSp>
+        <p:nvCxnSpPr>
+          <p:cNvPr id="8" name="Conector recto de flecha 7"/>
+          <p:cNvCxnSpPr>
+            <a:stCxn id="5" idx="2"/>
+            <a:endCxn id="3" idx="0"/>
+          </p:cNvCxnSpPr>
+          <p:nvPr/>
+        </p:nvCxnSpPr>
+        <p:spPr>
+          <a:xfrm>
+            <a:off x="5417349" y="2559244"/>
+            <a:ext cx="0" cy="1355530"/>
+          </a:xfrm>
+          <a:prstGeom prst="straightConnector1">
+            <a:avLst/>
+          </a:prstGeom>
+          <a:ln w="28575">
+            <a:solidFill>
+              <a:srgbClr val="C00000"/>
+            </a:solidFill>
+            <a:tailEnd type="triangle"/>
+          </a:ln>
+        </p:spPr>
+        <p:style>
+          <a:lnRef idx="1">
+            <a:schemeClr val="accent1"/>
+          </a:lnRef>
+          <a:fillRef idx="0">
+            <a:schemeClr val="accent1"/>
+          </a:fillRef>
+          <a:effectRef idx="0">
+            <a:schemeClr val="accent1"/>
+          </a:effectRef>
+          <a:fontRef idx="minor">
+            <a:schemeClr val="tx1"/>
+          </a:fontRef>
+        </p:style>
+      </p:cxnSp>
+      <p:cxnSp>
+        <p:nvCxnSpPr>
+          <p:cNvPr id="12" name="Conector recto de flecha 11"/>
+          <p:cNvCxnSpPr>
+            <a:stCxn id="3" idx="2"/>
+            <a:endCxn id="4" idx="0"/>
+          </p:cNvCxnSpPr>
+          <p:nvPr/>
+        </p:nvCxnSpPr>
+        <p:spPr>
+          <a:xfrm>
+            <a:off x="5417349" y="4643437"/>
+            <a:ext cx="1" cy="367901"/>
+          </a:xfrm>
+          <a:prstGeom prst="straightConnector1">
+            <a:avLst/>
+          </a:prstGeom>
+          <a:ln w="28575">
+            <a:solidFill>
+              <a:srgbClr val="C00000"/>
+            </a:solidFill>
+            <a:tailEnd type="triangle"/>
+          </a:ln>
+        </p:spPr>
+        <p:style>
+          <a:lnRef idx="1">
+            <a:schemeClr val="accent1"/>
+          </a:lnRef>
+          <a:fillRef idx="0">
+            <a:schemeClr val="accent1"/>
+          </a:fillRef>
+          <a:effectRef idx="0">
+            <a:schemeClr val="accent1"/>
+          </a:effectRef>
+          <a:fontRef idx="minor">
+            <a:schemeClr val="tx1"/>
+          </a:fontRef>
+        </p:style>
+      </p:cxnSp>
+      <p:sp>
+        <p:nvSpPr>
+          <p:cNvPr id="14" name="Cilindro 13"/>
+          <p:cNvSpPr/>
+          <p:nvPr/>
+        </p:nvSpPr>
+        <p:spPr>
+          <a:xfrm>
+            <a:off x="4517237" y="6085370"/>
+            <a:ext cx="1800225" cy="528638"/>
+          </a:xfrm>
+          <a:prstGeom prst="can">
+            <a:avLst/>
+          </a:prstGeom>
+        </p:spPr>
+        <p:style>
+          <a:lnRef idx="2">
+            <a:schemeClr val="accent1">
+              <a:shade val="50000"/>
+            </a:schemeClr>
+          </a:lnRef>
+          <a:fillRef idx="1">
+            <a:schemeClr val="accent1"/>
+          </a:fillRef>
+          <a:effectRef idx="0">
+            <a:schemeClr val="accent1"/>
+          </a:effectRef>
+          <a:fontRef idx="minor">
+            <a:schemeClr val="lt1"/>
+          </a:fontRef>
+        </p:style>
+        <p:txBody>
+          <a:bodyPr rtlCol="0" anchor="ctr"/>
+          <a:lstStyle/>
+          <a:p>
+            <a:pPr algn="ctr"/>
+            <a:r>
+              <a:rPr lang="es-ES" sz="1600" dirty="0" smtClean="0"/>
+              <a:t>BTM_MDS</a:t>
+            </a:r>
+            <a:endParaRPr lang="es-ES" sz="1600" dirty="0"/>
+          </a:p>
+        </p:txBody>
+      </p:sp>
+      <p:cxnSp>
+        <p:nvCxnSpPr>
+          <p:cNvPr id="16" name="Conector recto de flecha 15"/>
+          <p:cNvCxnSpPr>
+            <a:stCxn id="4" idx="2"/>
+            <a:endCxn id="14" idx="1"/>
+          </p:cNvCxnSpPr>
+          <p:nvPr/>
+        </p:nvCxnSpPr>
+        <p:spPr>
+          <a:xfrm>
+            <a:off x="5417350" y="5740001"/>
+            <a:ext cx="0" cy="345369"/>
+          </a:xfrm>
+          <a:prstGeom prst="straightConnector1">
+            <a:avLst/>
+          </a:prstGeom>
+          <a:ln w="28575">
+            <a:solidFill>
+              <a:srgbClr val="C00000"/>
+            </a:solidFill>
+            <a:tailEnd type="triangle"/>
+          </a:ln>
+        </p:spPr>
+        <p:style>
+          <a:lnRef idx="1">
+            <a:schemeClr val="accent1"/>
+          </a:lnRef>
+          <a:fillRef idx="0">
+            <a:schemeClr val="accent1"/>
+          </a:fillRef>
+          <a:effectRef idx="0">
+            <a:schemeClr val="accent1"/>
+          </a:effectRef>
+          <a:fontRef idx="minor">
+            <a:schemeClr val="tx1"/>
+          </a:fontRef>
+        </p:style>
+      </p:cxnSp>
+      <p:sp>
+        <p:nvSpPr>
+          <p:cNvPr id="19" name="Rectángulo redondeado 18"/>
+          <p:cNvSpPr/>
+          <p:nvPr/>
+        </p:nvSpPr>
+        <p:spPr>
+          <a:xfrm>
+            <a:off x="7333073" y="2886624"/>
+            <a:ext cx="1671637" cy="728663"/>
+          </a:xfrm>
+          <a:prstGeom prst="roundRect">
+            <a:avLst/>
+          </a:prstGeom>
+        </p:spPr>
+        <p:style>
+          <a:lnRef idx="2">
+            <a:schemeClr val="accent1">
+              <a:shade val="50000"/>
+            </a:schemeClr>
+          </a:lnRef>
+          <a:fillRef idx="1">
+            <a:schemeClr val="accent1"/>
+          </a:fillRef>
+          <a:effectRef idx="0">
+            <a:schemeClr val="accent1"/>
+          </a:effectRef>
+          <a:fontRef idx="minor">
+            <a:schemeClr val="lt1"/>
+          </a:fontRef>
+        </p:style>
+        <p:txBody>
+          <a:bodyPr rtlCol="0" anchor="ctr"/>
+          <a:lstStyle/>
+          <a:p>
+            <a:pPr algn="ctr"/>
+            <a:r>
+              <a:rPr lang="es-ES" dirty="0" err="1" smtClean="0"/>
+              <a:t>worklist-rest</a:t>
+            </a:r>
+            <a:endParaRPr lang="es-ES" dirty="0"/>
+          </a:p>
+        </p:txBody>
+      </p:sp>
+      <p:cxnSp>
+        <p:nvCxnSpPr>
+          <p:cNvPr id="25" name="Conector angular 24"/>
+          <p:cNvCxnSpPr>
+            <a:stCxn id="6" idx="2"/>
+            <a:endCxn id="3" idx="1"/>
+          </p:cNvCxnSpPr>
+          <p:nvPr/>
+        </p:nvCxnSpPr>
+        <p:spPr>
+          <a:xfrm rot="16200000" flipH="1">
+            <a:off x="3711480" y="3409055"/>
+            <a:ext cx="632819" cy="1107281"/>
+          </a:xfrm>
+          <a:prstGeom prst="bentConnector2">
+            <a:avLst/>
+          </a:prstGeom>
+          <a:ln w="28575">
+            <a:solidFill>
+              <a:srgbClr val="C00000"/>
+            </a:solidFill>
+            <a:tailEnd type="triangle"/>
+          </a:ln>
+        </p:spPr>
+        <p:style>
+          <a:lnRef idx="1">
+            <a:schemeClr val="accent1"/>
+          </a:lnRef>
+          <a:fillRef idx="0">
+            <a:schemeClr val="accent1"/>
+          </a:fillRef>
+          <a:effectRef idx="0">
+            <a:schemeClr val="accent1"/>
+          </a:effectRef>
+          <a:fontRef idx="minor">
+            <a:schemeClr val="tx1"/>
+          </a:fontRef>
+        </p:style>
+      </p:cxnSp>
+      <p:cxnSp>
+        <p:nvCxnSpPr>
+          <p:cNvPr id="28" name="Conector angular 27"/>
+          <p:cNvCxnSpPr>
+            <a:stCxn id="19" idx="2"/>
+            <a:endCxn id="3" idx="3"/>
+          </p:cNvCxnSpPr>
+          <p:nvPr/>
+        </p:nvCxnSpPr>
+        <p:spPr>
+          <a:xfrm rot="5400000">
+            <a:off x="6879121" y="2989334"/>
+            <a:ext cx="663819" cy="1915725"/>
+          </a:xfrm>
+          <a:prstGeom prst="bentConnector2">
+            <a:avLst/>
+          </a:prstGeom>
+          <a:ln w="28575">
+            <a:solidFill>
+              <a:srgbClr val="C00000"/>
+            </a:solidFill>
+            <a:tailEnd type="triangle"/>
+          </a:ln>
+        </p:spPr>
+        <p:style>
+          <a:lnRef idx="1">
+            <a:schemeClr val="accent1"/>
+          </a:lnRef>
+          <a:fillRef idx="0">
+            <a:schemeClr val="accent1"/>
+          </a:fillRef>
+          <a:effectRef idx="0">
+            <a:schemeClr val="accent1"/>
+          </a:effectRef>
+          <a:fontRef idx="minor">
+            <a:schemeClr val="tx1"/>
+          </a:fontRef>
+        </p:style>
+      </p:cxnSp>
+      <p:sp>
+        <p:nvSpPr>
+          <p:cNvPr id="32" name="Rectángulo redondeado 31"/>
+          <p:cNvSpPr/>
+          <p:nvPr/>
+        </p:nvSpPr>
+        <p:spPr>
+          <a:xfrm>
+            <a:off x="942974" y="3804043"/>
+            <a:ext cx="10272713" cy="953779"/>
+          </a:xfrm>
+          <a:prstGeom prst="roundRect">
+            <a:avLst/>
+          </a:prstGeom>
+          <a:noFill/>
+        </p:spPr>
+        <p:style>
+          <a:lnRef idx="2">
+            <a:schemeClr val="accent1">
+              <a:shade val="50000"/>
+            </a:schemeClr>
+          </a:lnRef>
+          <a:fillRef idx="1">
+            <a:schemeClr val="accent1"/>
+          </a:fillRef>
+          <a:effectRef idx="0">
+            <a:schemeClr val="accent1"/>
+          </a:effectRef>
+          <a:fontRef idx="minor">
+            <a:schemeClr val="lt1"/>
+          </a:fontRef>
+        </p:style>
+        <p:txBody>
+          <a:bodyPr vert="horz" rtlCol="0" anchor="t"/>
+          <a:lstStyle/>
+          <a:p>
+            <a:r>
+              <a:rPr lang="es-ES" dirty="0" smtClean="0">
+                <a:solidFill>
+                  <a:schemeClr val="accent1">
+                    <a:lumMod val="75000"/>
+                  </a:schemeClr>
+                </a:solidFill>
+              </a:rPr>
+              <a:t>Componentes</a:t>
+            </a:r>
+            <a:endParaRPr lang="es-ES" dirty="0">
+              <a:solidFill>
+                <a:schemeClr val="accent1">
+                  <a:lumMod val="75000"/>
+                </a:schemeClr>
+              </a:solidFill>
+            </a:endParaRPr>
+          </a:p>
+        </p:txBody>
+      </p:sp>
+      <p:sp>
+        <p:nvSpPr>
+          <p:cNvPr id="40" name="Rectángulo redondeado 39"/>
+          <p:cNvSpPr/>
+          <p:nvPr/>
+        </p:nvSpPr>
+        <p:spPr>
+          <a:xfrm>
+            <a:off x="942973" y="2764452"/>
+            <a:ext cx="10272713" cy="953779"/>
+          </a:xfrm>
+          <a:prstGeom prst="roundRect">
+            <a:avLst/>
+          </a:prstGeom>
+          <a:noFill/>
+        </p:spPr>
+        <p:style>
+          <a:lnRef idx="2">
+            <a:schemeClr val="accent1">
+              <a:shade val="50000"/>
+            </a:schemeClr>
+          </a:lnRef>
+          <a:fillRef idx="1">
+            <a:schemeClr val="accent1"/>
+          </a:fillRef>
+          <a:effectRef idx="0">
+            <a:schemeClr val="accent1"/>
+          </a:effectRef>
+          <a:fontRef idx="minor">
+            <a:schemeClr val="lt1"/>
+          </a:fontRef>
+        </p:style>
+        <p:txBody>
+          <a:bodyPr vert="horz" rtlCol="0" anchor="t"/>
+          <a:lstStyle/>
+          <a:p>
+            <a:r>
+              <a:rPr lang="es-ES" dirty="0" smtClean="0">
+                <a:solidFill>
+                  <a:schemeClr val="accent1">
+                    <a:lumMod val="75000"/>
+                  </a:schemeClr>
+                </a:solidFill>
+              </a:rPr>
+              <a:t>Servicios</a:t>
+            </a:r>
+            <a:endParaRPr lang="es-ES" dirty="0">
+              <a:solidFill>
+                <a:schemeClr val="accent1">
+                  <a:lumMod val="75000"/>
+                </a:schemeClr>
+              </a:solidFill>
+            </a:endParaRPr>
+          </a:p>
+        </p:txBody>
+      </p:sp>
+      <p:sp>
+        <p:nvSpPr>
+          <p:cNvPr id="42" name="Rectángulo redondeado 41"/>
+          <p:cNvSpPr/>
+          <p:nvPr/>
+        </p:nvSpPr>
+        <p:spPr>
+          <a:xfrm>
+            <a:off x="7333072" y="1793629"/>
+            <a:ext cx="1671637" cy="728663"/>
+          </a:xfrm>
+          <a:prstGeom prst="roundRect">
+            <a:avLst/>
+          </a:prstGeom>
+        </p:spPr>
+        <p:style>
+          <a:lnRef idx="2">
+            <a:schemeClr val="accent1">
+              <a:shade val="50000"/>
+            </a:schemeClr>
+          </a:lnRef>
+          <a:fillRef idx="1">
+            <a:schemeClr val="accent1"/>
+          </a:fillRef>
+          <a:effectRef idx="0">
+            <a:schemeClr val="accent1"/>
+          </a:effectRef>
+          <a:fontRef idx="minor">
+            <a:schemeClr val="lt1"/>
+          </a:fontRef>
+        </p:style>
+        <p:txBody>
+          <a:bodyPr rtlCol="0" anchor="ctr"/>
+          <a:lstStyle/>
+          <a:p>
+            <a:pPr algn="ctr"/>
+            <a:r>
+              <a:rPr lang="es-ES" dirty="0" err="1" smtClean="0"/>
+              <a:t>worklist-mobile</a:t>
+            </a:r>
+            <a:endParaRPr lang="es-ES" dirty="0"/>
+          </a:p>
+        </p:txBody>
+      </p:sp>
+      <p:cxnSp>
+        <p:nvCxnSpPr>
+          <p:cNvPr id="44" name="Conector recto de flecha 43"/>
+          <p:cNvCxnSpPr>
+            <a:stCxn id="42" idx="2"/>
+            <a:endCxn id="19" idx="0"/>
+          </p:cNvCxnSpPr>
+          <p:nvPr/>
+        </p:nvCxnSpPr>
+        <p:spPr>
+          <a:xfrm>
+            <a:off x="8168891" y="2522292"/>
+            <a:ext cx="1" cy="364332"/>
+          </a:xfrm>
+          <a:prstGeom prst="straightConnector1">
+            <a:avLst/>
+          </a:prstGeom>
+          <a:ln w="28575">
+            <a:solidFill>
+              <a:srgbClr val="C00000"/>
+            </a:solidFill>
+            <a:tailEnd type="triangle"/>
+          </a:ln>
+        </p:spPr>
+        <p:style>
+          <a:lnRef idx="1">
+            <a:schemeClr val="accent1"/>
+          </a:lnRef>
+          <a:fillRef idx="0">
+            <a:schemeClr val="accent1"/>
+          </a:fillRef>
+          <a:effectRef idx="0">
+            <a:schemeClr val="accent1"/>
+          </a:effectRef>
+          <a:fontRef idx="minor">
+            <a:schemeClr val="tx1"/>
+          </a:fontRef>
+        </p:style>
+      </p:cxnSp>
+      <p:sp>
+        <p:nvSpPr>
+          <p:cNvPr id="45" name="Rectángulo redondeado 44"/>
+          <p:cNvSpPr/>
+          <p:nvPr/>
+        </p:nvSpPr>
+        <p:spPr>
+          <a:xfrm>
+            <a:off x="959643" y="1680981"/>
+            <a:ext cx="10272713" cy="953779"/>
+          </a:xfrm>
+          <a:prstGeom prst="roundRect">
+            <a:avLst/>
+          </a:prstGeom>
+          <a:noFill/>
+        </p:spPr>
+        <p:style>
+          <a:lnRef idx="2">
+            <a:schemeClr val="accent1">
+              <a:shade val="50000"/>
+            </a:schemeClr>
+          </a:lnRef>
+          <a:fillRef idx="1">
+            <a:schemeClr val="accent1"/>
+          </a:fillRef>
+          <a:effectRef idx="0">
+            <a:schemeClr val="accent1"/>
+          </a:effectRef>
+          <a:fontRef idx="minor">
+            <a:schemeClr val="lt1"/>
+          </a:fontRef>
+        </p:style>
+        <p:txBody>
+          <a:bodyPr vert="horz" rtlCol="0" anchor="t"/>
+          <a:lstStyle/>
+          <a:p>
+            <a:r>
+              <a:rPr lang="es-ES" dirty="0" smtClean="0">
+                <a:solidFill>
+                  <a:schemeClr val="accent1">
+                    <a:lumMod val="75000"/>
+                  </a:schemeClr>
+                </a:solidFill>
+              </a:rPr>
+              <a:t>Aplicaciones</a:t>
+            </a:r>
+            <a:endParaRPr lang="es-ES" dirty="0">
+              <a:solidFill>
+                <a:schemeClr val="accent1">
+                  <a:lumMod val="75000"/>
+                </a:schemeClr>
+              </a:solidFill>
+            </a:endParaRPr>
+          </a:p>
+        </p:txBody>
+      </p:sp>
+    </p:spTree>
+    <p:extLst>
+      <p:ext uri="{BB962C8B-B14F-4D97-AF65-F5344CB8AC3E}">
+        <p14:creationId xmlns:p14="http://schemas.microsoft.com/office/powerpoint/2010/main" val="4079572745"/>
+      </p:ext>
+    </p:extLst>
+  </p:cSld>
+  <p:clrMapOvr>
+    <a:masterClrMapping/>
+  </p:clrMapOvr>
+</p:sld>
+</file>
+
+<file path=ppt/slides/slide4.xml><?xml version="1.0" encoding="utf-8"?>
+<p:sld xmlns:a="http://schemas.openxmlformats.org/drawingml/2006/main" xmlns:r="http://schemas.openxmlformats.org/officeDocument/2006/relationships" xmlns:p="http://schemas.openxmlformats.org/presentationml/2006/main">
+  <p:cSld>
+    <p:spTree>
+      <p:nvGrpSpPr>
+        <p:cNvPr id="1" name=""/>
+        <p:cNvGrpSpPr/>
+        <p:nvPr/>
+      </p:nvGrpSpPr>
+      <p:grpSpPr>
+        <a:xfrm>
+          <a:off x="0" y="0"/>
+          <a:ext cx="0" cy="0"/>
+          <a:chOff x="0" y="0"/>
+          <a:chExt cx="0" cy="0"/>
+        </a:xfrm>
+      </p:grpSpPr>
+      <p:sp>
+        <p:nvSpPr>
+          <p:cNvPr id="2" name="Título 1"/>
+          <p:cNvSpPr>
+            <a:spLocks noGrp="1"/>
+          </p:cNvSpPr>
+          <p:nvPr>
+            <p:ph type="title"/>
+          </p:nvPr>
+        </p:nvSpPr>
+        <p:spPr/>
+        <p:txBody>
+          <a:bodyPr/>
+          <a:lstStyle/>
+          <a:p>
+            <a:r>
+              <a:rPr lang="es-ES" dirty="0" smtClean="0"/>
+              <a:t>Organización de la Implementación </a:t>
+            </a:r>
+            <a:r>
+              <a:rPr lang="es-ES" dirty="0" err="1" smtClean="0"/>
+              <a:t>Maven</a:t>
+            </a:r>
+            <a:endParaRPr lang="es-ES" dirty="0"/>
+          </a:p>
+        </p:txBody>
+      </p:sp>
+      <p:sp>
+        <p:nvSpPr>
+          <p:cNvPr id="3" name="Rectángulo redondeado 2"/>
+          <p:cNvSpPr/>
+          <p:nvPr/>
+        </p:nvSpPr>
+        <p:spPr>
+          <a:xfrm>
+            <a:off x="7996225" y="3120602"/>
+            <a:ext cx="1671637" cy="728663"/>
+          </a:xfrm>
+          <a:prstGeom prst="roundRect">
+            <a:avLst/>
+          </a:prstGeom>
+        </p:spPr>
+        <p:style>
+          <a:lnRef idx="2">
+            <a:schemeClr val="accent1">
+              <a:shade val="50000"/>
+            </a:schemeClr>
+          </a:lnRef>
+          <a:fillRef idx="1">
+            <a:schemeClr val="accent1"/>
+          </a:fillRef>
+          <a:effectRef idx="0">
+            <a:schemeClr val="accent1"/>
+          </a:effectRef>
+          <a:fontRef idx="minor">
+            <a:schemeClr val="lt1"/>
+          </a:fontRef>
+        </p:style>
+        <p:txBody>
+          <a:bodyPr rtlCol="0" anchor="ctr"/>
+          <a:lstStyle/>
+          <a:p>
+            <a:pPr algn="ctr"/>
+            <a:r>
+              <a:rPr lang="es-ES" sz="1600" dirty="0" smtClean="0"/>
+              <a:t>&lt;</a:t>
+            </a:r>
+            <a:r>
+              <a:rPr lang="es-ES" sz="1600" dirty="0" err="1" smtClean="0"/>
+              <a:t>ejb</a:t>
+            </a:r>
+            <a:r>
+              <a:rPr lang="es-ES" sz="1600" dirty="0" smtClean="0"/>
+              <a:t>&gt;</a:t>
+            </a:r>
+            <a:br>
+              <a:rPr lang="es-ES" sz="1600" dirty="0" smtClean="0"/>
+            </a:br>
+            <a:r>
+              <a:rPr lang="es-ES" sz="1600" dirty="0" err="1" smtClean="0"/>
+              <a:t>worklist-ejb</a:t>
+            </a:r>
+            <a:endParaRPr lang="es-ES" sz="1600" dirty="0"/>
+          </a:p>
+        </p:txBody>
+      </p:sp>
+      <p:sp>
+        <p:nvSpPr>
+          <p:cNvPr id="4" name="Rectángulo redondeado 3"/>
+          <p:cNvSpPr/>
+          <p:nvPr/>
+        </p:nvSpPr>
+        <p:spPr>
+          <a:xfrm>
+            <a:off x="898327" y="3120604"/>
+            <a:ext cx="1671637" cy="728663"/>
+          </a:xfrm>
+          <a:prstGeom prst="roundRect">
+            <a:avLst/>
+          </a:prstGeom>
+        </p:spPr>
+        <p:style>
+          <a:lnRef idx="2">
+            <a:schemeClr val="accent1">
+              <a:shade val="50000"/>
+            </a:schemeClr>
+          </a:lnRef>
+          <a:fillRef idx="1">
+            <a:schemeClr val="accent1"/>
+          </a:fillRef>
+          <a:effectRef idx="0">
+            <a:schemeClr val="accent1"/>
+          </a:effectRef>
+          <a:fontRef idx="minor">
+            <a:schemeClr val="lt1"/>
+          </a:fontRef>
+        </p:style>
+        <p:txBody>
+          <a:bodyPr rtlCol="0" anchor="ctr"/>
+          <a:lstStyle/>
+          <a:p>
+            <a:pPr algn="ctr"/>
+            <a:r>
+              <a:rPr lang="es-ES" sz="1600" dirty="0" smtClean="0"/>
+              <a:t>&lt;</a:t>
+            </a:r>
+            <a:r>
+              <a:rPr lang="es-ES" sz="1600" dirty="0" err="1" smtClean="0"/>
+              <a:t>jar</a:t>
+            </a:r>
+            <a:r>
+              <a:rPr lang="es-ES" sz="1600" dirty="0" smtClean="0"/>
+              <a:t>&gt;</a:t>
+            </a:r>
+            <a:br>
+              <a:rPr lang="es-ES" sz="1600" dirty="0" smtClean="0"/>
+            </a:br>
+            <a:r>
+              <a:rPr lang="es-ES" sz="1600" dirty="0" err="1" smtClean="0"/>
+              <a:t>worklist-dac</a:t>
+            </a:r>
+            <a:endParaRPr lang="es-ES" sz="1600" dirty="0"/>
+          </a:p>
+        </p:txBody>
+      </p:sp>
+      <p:sp>
+        <p:nvSpPr>
+          <p:cNvPr id="5" name="Rectángulo redondeado 4"/>
+          <p:cNvSpPr/>
+          <p:nvPr/>
+        </p:nvSpPr>
+        <p:spPr>
+          <a:xfrm>
+            <a:off x="4424363" y="3120604"/>
+            <a:ext cx="1671637" cy="728663"/>
+          </a:xfrm>
+          <a:prstGeom prst="roundRect">
+            <a:avLst/>
+          </a:prstGeom>
+        </p:spPr>
+        <p:style>
+          <a:lnRef idx="2">
+            <a:schemeClr val="accent1">
+              <a:shade val="50000"/>
+            </a:schemeClr>
+          </a:lnRef>
+          <a:fillRef idx="1">
+            <a:schemeClr val="accent1"/>
+          </a:fillRef>
+          <a:effectRef idx="0">
+            <a:schemeClr val="accent1"/>
+          </a:effectRef>
+          <a:fontRef idx="minor">
+            <a:schemeClr val="lt1"/>
+          </a:fontRef>
+        </p:style>
+        <p:txBody>
+          <a:bodyPr rtlCol="0" anchor="ctr"/>
+          <a:lstStyle/>
+          <a:p>
+            <a:pPr algn="ctr"/>
+            <a:r>
+              <a:rPr lang="es-ES" sz="1600" dirty="0" smtClean="0"/>
+              <a:t>&lt;</a:t>
+            </a:r>
+            <a:r>
+              <a:rPr lang="es-ES" sz="1600" dirty="0" err="1" smtClean="0"/>
+              <a:t>war</a:t>
+            </a:r>
+            <a:r>
+              <a:rPr lang="es-ES" sz="1600" dirty="0" smtClean="0"/>
+              <a:t>&gt;</a:t>
+            </a:r>
+            <a:br>
+              <a:rPr lang="es-ES" sz="1600" dirty="0" smtClean="0"/>
+            </a:br>
+            <a:r>
+              <a:rPr lang="es-ES" sz="1600" dirty="0" err="1" smtClean="0"/>
+              <a:t>worklist</a:t>
+            </a:r>
+            <a:r>
+              <a:rPr lang="es-ES" sz="1600" dirty="0" smtClean="0"/>
+              <a:t>-portal</a:t>
+            </a:r>
+            <a:endParaRPr lang="es-ES" sz="1600" dirty="0"/>
+          </a:p>
+        </p:txBody>
+      </p:sp>
+      <p:sp>
+        <p:nvSpPr>
+          <p:cNvPr id="6" name="Rectángulo redondeado 5"/>
+          <p:cNvSpPr/>
+          <p:nvPr/>
+        </p:nvSpPr>
+        <p:spPr>
+          <a:xfrm>
+            <a:off x="2638430" y="3120608"/>
+            <a:ext cx="1671637" cy="728663"/>
+          </a:xfrm>
+          <a:prstGeom prst="roundRect">
+            <a:avLst/>
+          </a:prstGeom>
+        </p:spPr>
+        <p:style>
+          <a:lnRef idx="2">
+            <a:schemeClr val="accent1">
+              <a:shade val="50000"/>
+            </a:schemeClr>
+          </a:lnRef>
+          <a:fillRef idx="1">
+            <a:schemeClr val="accent1"/>
+          </a:fillRef>
+          <a:effectRef idx="0">
+            <a:schemeClr val="accent1"/>
+          </a:effectRef>
+          <a:fontRef idx="minor">
+            <a:schemeClr val="lt1"/>
+          </a:fontRef>
+        </p:style>
+        <p:txBody>
+          <a:bodyPr rtlCol="0" anchor="ctr"/>
+          <a:lstStyle/>
+          <a:p>
+            <a:pPr algn="ctr"/>
+            <a:r>
+              <a:rPr lang="es-ES" sz="1600" dirty="0" smtClean="0"/>
+              <a:t>&lt;</a:t>
+            </a:r>
+            <a:r>
+              <a:rPr lang="es-ES" sz="1600" dirty="0" err="1" smtClean="0"/>
+              <a:t>war</a:t>
+            </a:r>
+            <a:r>
+              <a:rPr lang="es-ES" sz="1600" dirty="0" smtClean="0"/>
+              <a:t>&gt;</a:t>
+            </a:r>
+            <a:br>
+              <a:rPr lang="es-ES" sz="1600" dirty="0" smtClean="0"/>
+            </a:br>
+            <a:r>
+              <a:rPr lang="es-ES" sz="1600" dirty="0" err="1" smtClean="0"/>
+              <a:t>worklist-ws</a:t>
+            </a:r>
+            <a:endParaRPr lang="es-ES" sz="1600" dirty="0"/>
+          </a:p>
+        </p:txBody>
+      </p:sp>
+      <p:sp>
+        <p:nvSpPr>
+          <p:cNvPr id="10" name="Rectángulo redondeado 9"/>
+          <p:cNvSpPr/>
+          <p:nvPr/>
+        </p:nvSpPr>
+        <p:spPr>
+          <a:xfrm>
+            <a:off x="6210294" y="3120603"/>
+            <a:ext cx="1671637" cy="728663"/>
+          </a:xfrm>
+          <a:prstGeom prst="roundRect">
+            <a:avLst/>
+          </a:prstGeom>
+        </p:spPr>
+        <p:style>
+          <a:lnRef idx="2">
+            <a:schemeClr val="accent1">
+              <a:shade val="50000"/>
+            </a:schemeClr>
+          </a:lnRef>
+          <a:fillRef idx="1">
+            <a:schemeClr val="accent1"/>
+          </a:fillRef>
+          <a:effectRef idx="0">
+            <a:schemeClr val="accent1"/>
+          </a:effectRef>
+          <a:fontRef idx="minor">
+            <a:schemeClr val="lt1"/>
+          </a:fontRef>
+        </p:style>
+        <p:txBody>
+          <a:bodyPr rtlCol="0" anchor="ctr"/>
+          <a:lstStyle/>
+          <a:p>
+            <a:pPr algn="ctr"/>
+            <a:r>
+              <a:rPr lang="es-ES" sz="1600" dirty="0" smtClean="0"/>
+              <a:t>&lt;</a:t>
+            </a:r>
+            <a:r>
+              <a:rPr lang="es-ES" sz="1600" dirty="0" err="1" smtClean="0"/>
+              <a:t>war</a:t>
+            </a:r>
+            <a:r>
+              <a:rPr lang="es-ES" sz="1600" dirty="0" smtClean="0"/>
+              <a:t>&gt;</a:t>
+            </a:r>
+            <a:br>
+              <a:rPr lang="es-ES" sz="1600" dirty="0" smtClean="0"/>
+            </a:br>
+            <a:r>
+              <a:rPr lang="es-ES" sz="1600" dirty="0" err="1" smtClean="0"/>
+              <a:t>worklist-rest</a:t>
+            </a:r>
+            <a:endParaRPr lang="es-ES" sz="1600" dirty="0"/>
+          </a:p>
+        </p:txBody>
+      </p:sp>
+      <p:sp>
+        <p:nvSpPr>
+          <p:cNvPr id="13" name="Rectángulo redondeado 12"/>
+          <p:cNvSpPr/>
+          <p:nvPr/>
+        </p:nvSpPr>
+        <p:spPr>
+          <a:xfrm>
+            <a:off x="4347574" y="4347539"/>
+            <a:ext cx="1825216" cy="728663"/>
+          </a:xfrm>
+          <a:prstGeom prst="roundRect">
+            <a:avLst/>
+          </a:prstGeom>
+        </p:spPr>
+        <p:style>
+          <a:lnRef idx="1">
+            <a:schemeClr val="accent4"/>
+          </a:lnRef>
+          <a:fillRef idx="3">
+            <a:schemeClr val="accent4"/>
+          </a:fillRef>
+          <a:effectRef idx="2">
+            <a:schemeClr val="accent4"/>
+          </a:effectRef>
+          <a:fontRef idx="minor">
+            <a:schemeClr val="lt1"/>
+          </a:fontRef>
+        </p:style>
+        <p:txBody>
+          <a:bodyPr rtlCol="0" anchor="ctr"/>
+          <a:lstStyle/>
+          <a:p>
+            <a:pPr algn="ctr"/>
+            <a:r>
+              <a:rPr lang="es-ES" sz="1600" dirty="0"/>
+              <a:t>&lt;</a:t>
+            </a:r>
+            <a:r>
+              <a:rPr lang="es-ES" sz="1600" dirty="0" err="1"/>
+              <a:t>pom</a:t>
+            </a:r>
+            <a:r>
+              <a:rPr lang="es-ES" sz="1600" dirty="0"/>
+              <a:t>&gt;</a:t>
+            </a:r>
+            <a:br>
+              <a:rPr lang="es-ES" sz="1600" dirty="0"/>
+            </a:br>
+            <a:r>
+              <a:rPr lang="es-ES" sz="1600" dirty="0" err="1"/>
+              <a:t>worklist-mobile</a:t>
+            </a:r>
+            <a:endParaRPr lang="es-ES" sz="1600" dirty="0"/>
+          </a:p>
+        </p:txBody>
+      </p:sp>
+      <p:sp>
+        <p:nvSpPr>
+          <p:cNvPr id="16" name="Rectángulo redondeado 15"/>
+          <p:cNvSpPr/>
+          <p:nvPr/>
+        </p:nvSpPr>
+        <p:spPr>
+          <a:xfrm>
+            <a:off x="4424952" y="1781725"/>
+            <a:ext cx="1671637" cy="728663"/>
+          </a:xfrm>
+          <a:prstGeom prst="roundRect">
+            <a:avLst/>
+          </a:prstGeom>
+        </p:spPr>
+        <p:style>
+          <a:lnRef idx="1">
+            <a:schemeClr val="accent4"/>
+          </a:lnRef>
+          <a:fillRef idx="3">
+            <a:schemeClr val="accent4"/>
+          </a:fillRef>
+          <a:effectRef idx="2">
+            <a:schemeClr val="accent4"/>
+          </a:effectRef>
+          <a:fontRef idx="minor">
+            <a:schemeClr val="lt1"/>
+          </a:fontRef>
+        </p:style>
+        <p:txBody>
+          <a:bodyPr rtlCol="0" anchor="ctr"/>
+          <a:lstStyle/>
+          <a:p>
+            <a:pPr algn="ctr"/>
+            <a:r>
+              <a:rPr lang="es-ES" sz="1600" dirty="0" smtClean="0"/>
+              <a:t>&lt;</a:t>
+            </a:r>
+            <a:r>
+              <a:rPr lang="es-ES" sz="1600" dirty="0" err="1" smtClean="0"/>
+              <a:t>pom</a:t>
+            </a:r>
+            <a:r>
+              <a:rPr lang="es-ES" sz="1600" dirty="0" smtClean="0"/>
+              <a:t>&gt;</a:t>
+            </a:r>
+            <a:br>
+              <a:rPr lang="es-ES" sz="1600" dirty="0" smtClean="0"/>
+            </a:br>
+            <a:r>
+              <a:rPr lang="es-ES" sz="1600" dirty="0" err="1" smtClean="0"/>
+              <a:t>worklist</a:t>
+            </a:r>
+            <a:endParaRPr lang="es-ES" sz="1600" dirty="0"/>
+          </a:p>
+        </p:txBody>
+      </p:sp>
+      <p:cxnSp>
+        <p:nvCxnSpPr>
+          <p:cNvPr id="21" name="Conector angular 20"/>
+          <p:cNvCxnSpPr>
+            <a:stCxn id="16" idx="2"/>
+            <a:endCxn id="6" idx="0"/>
+          </p:cNvCxnSpPr>
+          <p:nvPr/>
+        </p:nvCxnSpPr>
+        <p:spPr>
+          <a:xfrm rot="5400000">
+            <a:off x="4062400" y="1922237"/>
+            <a:ext cx="610220" cy="1786522"/>
+          </a:xfrm>
+          <a:prstGeom prst="bentConnector3">
+            <a:avLst/>
+          </a:prstGeom>
+          <a:ln w="28575">
+            <a:solidFill>
+              <a:srgbClr val="C00000"/>
+            </a:solidFill>
+            <a:tailEnd type="triangle"/>
+          </a:ln>
+        </p:spPr>
+        <p:style>
+          <a:lnRef idx="1">
+            <a:schemeClr val="accent1"/>
+          </a:lnRef>
+          <a:fillRef idx="0">
+            <a:schemeClr val="accent1"/>
+          </a:fillRef>
+          <a:effectRef idx="0">
+            <a:schemeClr val="accent1"/>
+          </a:effectRef>
+          <a:fontRef idx="minor">
+            <a:schemeClr val="tx1"/>
+          </a:fontRef>
+        </p:style>
+      </p:cxnSp>
+      <p:sp>
+        <p:nvSpPr>
+          <p:cNvPr id="22" name="Rectángulo redondeado 21"/>
+          <p:cNvSpPr/>
+          <p:nvPr/>
+        </p:nvSpPr>
+        <p:spPr>
+          <a:xfrm>
+            <a:off x="2473230" y="5574473"/>
+            <a:ext cx="1825216" cy="728663"/>
+          </a:xfrm>
+          <a:prstGeom prst="roundRect">
+            <a:avLst/>
+          </a:prstGeom>
+        </p:spPr>
+        <p:style>
+          <a:lnRef idx="2">
+            <a:schemeClr val="accent1">
+              <a:shade val="50000"/>
+            </a:schemeClr>
+          </a:lnRef>
+          <a:fillRef idx="1">
+            <a:schemeClr val="accent1"/>
+          </a:fillRef>
+          <a:effectRef idx="0">
+            <a:schemeClr val="accent1"/>
+          </a:effectRef>
+          <a:fontRef idx="minor">
+            <a:schemeClr val="lt1"/>
+          </a:fontRef>
+        </p:style>
+        <p:txBody>
+          <a:bodyPr rtlCol="0" anchor="ctr"/>
+          <a:lstStyle/>
+          <a:p>
+            <a:pPr algn="ctr"/>
+            <a:r>
+              <a:rPr lang="es-ES" sz="1600" dirty="0" smtClean="0"/>
+              <a:t>&lt;app&gt;</a:t>
+            </a:r>
+            <a:br>
+              <a:rPr lang="es-ES" sz="1600" dirty="0" smtClean="0"/>
+            </a:br>
+            <a:r>
+              <a:rPr lang="es-ES" sz="1600" dirty="0" err="1" smtClean="0"/>
+              <a:t>worklist-ios</a:t>
+            </a:r>
+            <a:endParaRPr lang="es-ES" sz="1600" dirty="0"/>
+          </a:p>
+        </p:txBody>
+      </p:sp>
+      <p:sp>
+        <p:nvSpPr>
+          <p:cNvPr id="23" name="Rectángulo redondeado 22"/>
+          <p:cNvSpPr/>
+          <p:nvPr/>
+        </p:nvSpPr>
+        <p:spPr>
+          <a:xfrm>
+            <a:off x="6210294" y="5574474"/>
+            <a:ext cx="1825216" cy="728663"/>
+          </a:xfrm>
+          <a:prstGeom prst="roundRect">
+            <a:avLst/>
+          </a:prstGeom>
+        </p:spPr>
+        <p:style>
+          <a:lnRef idx="2">
+            <a:schemeClr val="accent1">
+              <a:shade val="50000"/>
+            </a:schemeClr>
+          </a:lnRef>
+          <a:fillRef idx="1">
+            <a:schemeClr val="accent1"/>
+          </a:fillRef>
+          <a:effectRef idx="0">
+            <a:schemeClr val="accent1"/>
+          </a:effectRef>
+          <a:fontRef idx="minor">
+            <a:schemeClr val="lt1"/>
+          </a:fontRef>
+        </p:style>
+        <p:txBody>
+          <a:bodyPr rtlCol="0" anchor="ctr"/>
+          <a:lstStyle/>
+          <a:p>
+            <a:pPr algn="ctr"/>
+            <a:r>
+              <a:rPr lang="es-ES" sz="1600" dirty="0" smtClean="0"/>
+              <a:t>&lt;app&gt;</a:t>
+            </a:r>
+            <a:br>
+              <a:rPr lang="es-ES" sz="1600" dirty="0" smtClean="0"/>
+            </a:br>
+            <a:r>
+              <a:rPr lang="es-ES" sz="1600" dirty="0" err="1" smtClean="0"/>
+              <a:t>worklist-android</a:t>
+            </a:r>
+            <a:endParaRPr lang="es-ES" sz="1600" dirty="0"/>
+          </a:p>
+        </p:txBody>
+      </p:sp>
+      <p:cxnSp>
+        <p:nvCxnSpPr>
+          <p:cNvPr id="25" name="Conector angular 24"/>
+          <p:cNvCxnSpPr>
+            <a:stCxn id="13" idx="2"/>
+            <a:endCxn id="23" idx="0"/>
+          </p:cNvCxnSpPr>
+          <p:nvPr/>
+        </p:nvCxnSpPr>
+        <p:spPr>
+          <a:xfrm rot="16200000" flipH="1">
+            <a:off x="5942406" y="4393978"/>
+            <a:ext cx="498272" cy="1862720"/>
+          </a:xfrm>
+          <a:prstGeom prst="bentConnector3">
+            <a:avLst/>
+          </a:prstGeom>
+          <a:ln w="28575">
+            <a:solidFill>
+              <a:srgbClr val="C00000"/>
+            </a:solidFill>
+            <a:tailEnd type="triangle"/>
+          </a:ln>
+        </p:spPr>
+        <p:style>
+          <a:lnRef idx="1">
+            <a:schemeClr val="accent1"/>
+          </a:lnRef>
+          <a:fillRef idx="0">
+            <a:schemeClr val="accent1"/>
+          </a:fillRef>
+          <a:effectRef idx="0">
+            <a:schemeClr val="accent1"/>
+          </a:effectRef>
+          <a:fontRef idx="minor">
+            <a:schemeClr val="tx1"/>
+          </a:fontRef>
+        </p:style>
+      </p:cxnSp>
+      <p:cxnSp>
+        <p:nvCxnSpPr>
+          <p:cNvPr id="27" name="Conector angular 26"/>
+          <p:cNvCxnSpPr>
+            <a:stCxn id="13" idx="2"/>
+            <a:endCxn id="22" idx="0"/>
+          </p:cNvCxnSpPr>
+          <p:nvPr/>
+        </p:nvCxnSpPr>
+        <p:spPr>
+          <a:xfrm rot="5400000">
+            <a:off x="4073875" y="4388165"/>
+            <a:ext cx="498271" cy="1874344"/>
+          </a:xfrm>
+          <a:prstGeom prst="bentConnector3">
+            <a:avLst/>
+          </a:prstGeom>
+          <a:ln w="28575">
+            <a:solidFill>
+              <a:srgbClr val="C00000"/>
+            </a:solidFill>
+            <a:tailEnd type="triangle"/>
+          </a:ln>
+        </p:spPr>
+        <p:style>
+          <a:lnRef idx="1">
+            <a:schemeClr val="accent1"/>
+          </a:lnRef>
+          <a:fillRef idx="0">
+            <a:schemeClr val="accent1"/>
+          </a:fillRef>
+          <a:effectRef idx="0">
+            <a:schemeClr val="accent1"/>
+          </a:effectRef>
+          <a:fontRef idx="minor">
+            <a:schemeClr val="tx1"/>
+          </a:fontRef>
+        </p:style>
+      </p:cxnSp>
+      <p:cxnSp>
+        <p:nvCxnSpPr>
+          <p:cNvPr id="30" name="Conector angular 29"/>
+          <p:cNvCxnSpPr>
+            <a:stCxn id="16" idx="2"/>
+            <a:endCxn id="3" idx="0"/>
+          </p:cNvCxnSpPr>
+          <p:nvPr/>
+        </p:nvCxnSpPr>
+        <p:spPr>
+          <a:xfrm rot="16200000" flipH="1">
+            <a:off x="6741300" y="1029858"/>
+            <a:ext cx="610214" cy="3571273"/>
+          </a:xfrm>
+          <a:prstGeom prst="bentConnector3">
+            <a:avLst/>
+          </a:prstGeom>
+          <a:ln w="28575">
+            <a:solidFill>
+              <a:srgbClr val="C00000"/>
+            </a:solidFill>
+            <a:tailEnd type="triangle"/>
+          </a:ln>
+        </p:spPr>
+        <p:style>
+          <a:lnRef idx="1">
+            <a:schemeClr val="accent1"/>
+          </a:lnRef>
+          <a:fillRef idx="0">
+            <a:schemeClr val="accent1"/>
+          </a:fillRef>
+          <a:effectRef idx="0">
+            <a:schemeClr val="accent1"/>
+          </a:effectRef>
+          <a:fontRef idx="minor">
+            <a:schemeClr val="tx1"/>
+          </a:fontRef>
+        </p:style>
+      </p:cxnSp>
+      <p:cxnSp>
+        <p:nvCxnSpPr>
+          <p:cNvPr id="32" name="Conector angular 31"/>
+          <p:cNvCxnSpPr>
+            <a:stCxn id="16" idx="2"/>
+            <a:endCxn id="10" idx="0"/>
+          </p:cNvCxnSpPr>
+          <p:nvPr/>
+        </p:nvCxnSpPr>
+        <p:spPr>
+          <a:xfrm rot="16200000" flipH="1">
+            <a:off x="5848335" y="1922824"/>
+            <a:ext cx="610215" cy="1785342"/>
+          </a:xfrm>
+          <a:prstGeom prst="bentConnector3">
+            <a:avLst/>
+          </a:prstGeom>
+          <a:ln w="28575">
+            <a:solidFill>
+              <a:srgbClr val="C00000"/>
+            </a:solidFill>
+            <a:tailEnd type="triangle"/>
+          </a:ln>
+        </p:spPr>
+        <p:style>
+          <a:lnRef idx="1">
+            <a:schemeClr val="accent1"/>
+          </a:lnRef>
+          <a:fillRef idx="0">
+            <a:schemeClr val="accent1"/>
+          </a:fillRef>
+          <a:effectRef idx="0">
+            <a:schemeClr val="accent1"/>
+          </a:effectRef>
+          <a:fontRef idx="minor">
+            <a:schemeClr val="tx1"/>
+          </a:fontRef>
+        </p:style>
+      </p:cxnSp>
+      <p:cxnSp>
+        <p:nvCxnSpPr>
+          <p:cNvPr id="34" name="Conector angular 33"/>
+          <p:cNvCxnSpPr>
+            <a:stCxn id="16" idx="2"/>
+            <a:endCxn id="5" idx="0"/>
+          </p:cNvCxnSpPr>
+          <p:nvPr/>
+        </p:nvCxnSpPr>
+        <p:spPr>
+          <a:xfrm rot="5400000">
+            <a:off x="4955369" y="2815202"/>
+            <a:ext cx="610216" cy="589"/>
+          </a:xfrm>
+          <a:prstGeom prst="bentConnector3">
+            <a:avLst/>
+          </a:prstGeom>
+          <a:ln w="28575">
+            <a:solidFill>
+              <a:srgbClr val="C00000"/>
+            </a:solidFill>
+            <a:tailEnd type="triangle"/>
+          </a:ln>
+        </p:spPr>
+        <p:style>
+          <a:lnRef idx="1">
+            <a:schemeClr val="accent1"/>
+          </a:lnRef>
+          <a:fillRef idx="0">
+            <a:schemeClr val="accent1"/>
+          </a:fillRef>
+          <a:effectRef idx="0">
+            <a:schemeClr val="accent1"/>
+          </a:effectRef>
+          <a:fontRef idx="minor">
+            <a:schemeClr val="tx1"/>
+          </a:fontRef>
+        </p:style>
+      </p:cxnSp>
+      <p:cxnSp>
+        <p:nvCxnSpPr>
+          <p:cNvPr id="36" name="Conector angular 35"/>
+          <p:cNvCxnSpPr>
+            <a:stCxn id="16" idx="2"/>
+            <a:endCxn id="4" idx="0"/>
+          </p:cNvCxnSpPr>
+          <p:nvPr/>
+        </p:nvCxnSpPr>
+        <p:spPr>
+          <a:xfrm rot="5400000">
+            <a:off x="3192351" y="1052184"/>
+            <a:ext cx="610216" cy="3526625"/>
+          </a:xfrm>
+          <a:prstGeom prst="bentConnector3">
+            <a:avLst/>
+          </a:prstGeom>
+          <a:ln w="28575">
+            <a:solidFill>
+              <a:srgbClr val="C00000"/>
+            </a:solidFill>
+            <a:tailEnd type="triangle"/>
+          </a:ln>
+        </p:spPr>
+        <p:style>
+          <a:lnRef idx="1">
+            <a:schemeClr val="accent1"/>
+          </a:lnRef>
+          <a:fillRef idx="0">
+            <a:schemeClr val="accent1"/>
+          </a:fillRef>
+          <a:effectRef idx="0">
+            <a:schemeClr val="accent1"/>
+          </a:effectRef>
+          <a:fontRef idx="minor">
+            <a:schemeClr val="tx1"/>
+          </a:fontRef>
+        </p:style>
+      </p:cxnSp>
+      <p:sp>
+        <p:nvSpPr>
+          <p:cNvPr id="51" name="Rectángulo redondeado 50"/>
+          <p:cNvSpPr/>
+          <p:nvPr/>
+        </p:nvSpPr>
+        <p:spPr>
+          <a:xfrm>
+            <a:off x="9782154" y="3110457"/>
+            <a:ext cx="1671637" cy="728663"/>
+          </a:xfrm>
+          <a:prstGeom prst="roundRect">
+            <a:avLst/>
+          </a:prstGeom>
+        </p:spPr>
+        <p:style>
+          <a:lnRef idx="2">
+            <a:schemeClr val="accent1">
+              <a:shade val="50000"/>
+            </a:schemeClr>
+          </a:lnRef>
+          <a:fillRef idx="1">
+            <a:schemeClr val="accent1"/>
+          </a:fillRef>
+          <a:effectRef idx="0">
+            <a:schemeClr val="accent1"/>
+          </a:effectRef>
+          <a:fontRef idx="minor">
+            <a:schemeClr val="lt1"/>
+          </a:fontRef>
+        </p:style>
+        <p:txBody>
+          <a:bodyPr rtlCol="0" anchor="ctr"/>
+          <a:lstStyle/>
+          <a:p>
+            <a:pPr algn="ctr"/>
+            <a:r>
+              <a:rPr lang="es-ES" sz="1600" dirty="0" smtClean="0"/>
+              <a:t>&lt;</a:t>
+            </a:r>
+            <a:r>
+              <a:rPr lang="es-ES" sz="1600" dirty="0" err="1" smtClean="0"/>
+              <a:t>ear</a:t>
+            </a:r>
+            <a:r>
+              <a:rPr lang="es-ES" sz="1600" dirty="0" smtClean="0"/>
+              <a:t>&gt;</a:t>
+            </a:r>
+            <a:br>
+              <a:rPr lang="es-ES" sz="1600" dirty="0" smtClean="0"/>
+            </a:br>
+            <a:r>
+              <a:rPr lang="es-ES" sz="1600" dirty="0" err="1" smtClean="0"/>
+              <a:t>worklist-ear</a:t>
+            </a:r>
+            <a:endParaRPr lang="es-ES" sz="1600" dirty="0"/>
+          </a:p>
+        </p:txBody>
+      </p:sp>
+      <p:cxnSp>
+        <p:nvCxnSpPr>
+          <p:cNvPr id="53" name="Conector angular 52"/>
+          <p:cNvCxnSpPr>
+            <a:stCxn id="16" idx="2"/>
+            <a:endCxn id="51" idx="0"/>
+          </p:cNvCxnSpPr>
+          <p:nvPr/>
+        </p:nvCxnSpPr>
+        <p:spPr>
+          <a:xfrm rot="16200000" flipH="1">
+            <a:off x="7639338" y="131821"/>
+            <a:ext cx="600069" cy="5357202"/>
+          </a:xfrm>
+          <a:prstGeom prst="bentConnector3">
+            <a:avLst/>
+          </a:prstGeom>
+          <a:ln w="28575">
+            <a:solidFill>
+              <a:srgbClr val="C00000"/>
+            </a:solidFill>
+            <a:tailEnd type="triangle"/>
+          </a:ln>
+        </p:spPr>
+        <p:style>
+          <a:lnRef idx="1">
+            <a:schemeClr val="accent1"/>
+          </a:lnRef>
+          <a:fillRef idx="0">
+            <a:schemeClr val="accent1"/>
+          </a:fillRef>
+          <a:effectRef idx="0">
+            <a:schemeClr val="accent1"/>
+          </a:effectRef>
+          <a:fontRef idx="minor">
+            <a:schemeClr val="tx1"/>
+          </a:fontRef>
+        </p:style>
+      </p:cxnSp>
+    </p:spTree>
+    <p:extLst>
+      <p:ext uri="{BB962C8B-B14F-4D97-AF65-F5344CB8AC3E}">
+        <p14:creationId xmlns:p14="http://schemas.microsoft.com/office/powerpoint/2010/main" val="2133461622"/>
+      </p:ext>
+    </p:extLst>
+  </p:cSld>
+  <p:clrMapOvr>
+    <a:masterClrMapping/>
+  </p:clrMapOvr>
+</p:sld>
+</file>
+
 <file path=ppt/theme/theme1.xml><?xml version="1.0" encoding="utf-8"?>
 <a:theme xmlns:a="http://schemas.openxmlformats.org/drawingml/2006/main" name="Tema de Office">
   <a:themeElements>
@@ -4662,4 +6876,265 @@
     </a:ext>
   </a:extLst>
 </a:theme>
+</file>
+
+<file path=ppt/theme/theme2.xml><?xml version="1.0" encoding="utf-8"?>
+<a:theme xmlns:a="http://schemas.openxmlformats.org/drawingml/2006/main" name="Tema de Office">
+  <a:themeElements>
+    <a:clrScheme name="Office">
+      <a:dk1>
+        <a:sysClr val="windowText" lastClr="000000"/>
+      </a:dk1>
+      <a:lt1>
+        <a:sysClr val="window" lastClr="FFFFFF"/>
+      </a:lt1>
+      <a:dk2>
+        <a:srgbClr val="44546A"/>
+      </a:dk2>
+      <a:lt2>
+        <a:srgbClr val="E7E6E6"/>
+      </a:lt2>
+      <a:accent1>
+        <a:srgbClr val="5B9BD5"/>
+      </a:accent1>
+      <a:accent2>
+        <a:srgbClr val="ED7D31"/>
+      </a:accent2>
+      <a:accent3>
+        <a:srgbClr val="A5A5A5"/>
+      </a:accent3>
+      <a:accent4>
+        <a:srgbClr val="FFC000"/>
+      </a:accent4>
+      <a:accent5>
+        <a:srgbClr val="4472C4"/>
+      </a:accent5>
+      <a:accent6>
+        <a:srgbClr val="70AD47"/>
+      </a:accent6>
+      <a:hlink>
+        <a:srgbClr val="0563C1"/>
+      </a:hlink>
+      <a:folHlink>
+        <a:srgbClr val="954F72"/>
+      </a:folHlink>
+    </a:clrScheme>
+    <a:fontScheme name="Office">
+      <a:majorFont>
+        <a:latin typeface="Calibri Light" panose="020F0302020204030204"/>
+        <a:ea typeface=""/>
+        <a:cs typeface=""/>
+        <a:font script="Jpan" typeface="ＭＳ Ｐゴシック"/>
+        <a:font script="Hang" typeface="맑은 고딕"/>
+        <a:font script="Hans" typeface="宋体"/>
+        <a:font script="Hant" typeface="新細明體"/>
+        <a:font script="Arab" typeface="Times New Roman"/>
+        <a:font script="Hebr" typeface="Times New Roman"/>
+        <a:font script="Thai" typeface="Angsana New"/>
+        <a:font script="Ethi" typeface="Nyala"/>
+        <a:font script="Beng" typeface="Vrinda"/>
+        <a:font script="Gujr" typeface="Shruti"/>
+        <a:font script="Khmr" typeface="MoolBoran"/>
+        <a:font script="Knda" typeface="Tunga"/>
+        <a:font script="Guru" typeface="Raavi"/>
+        <a:font script="Cans" typeface="Euphemia"/>
+        <a:font script="Cher" typeface="Plantagenet Cherokee"/>
+        <a:font script="Yiii" typeface="Microsoft Yi Baiti"/>
+        <a:font script="Tibt" typeface="Microsoft Himalaya"/>
+        <a:font script="Thaa" typeface="MV Boli"/>
+        <a:font script="Deva" typeface="Mangal"/>
+        <a:font script="Telu" typeface="Gautami"/>
+        <a:font script="Taml" typeface="Latha"/>
+        <a:font script="Syrc" typeface="Estrangelo Edessa"/>
+        <a:font script="Orya" typeface="Kalinga"/>
+        <a:font script="Mlym" typeface="Kartika"/>
+        <a:font script="Laoo" typeface="DokChampa"/>
+        <a:font script="Sinh" typeface="Iskoola Pota"/>
+        <a:font script="Mong" typeface="Mongolian Baiti"/>
+        <a:font script="Viet" typeface="Times New Roman"/>
+        <a:font script="Uigh" typeface="Microsoft Uighur"/>
+        <a:font script="Geor" typeface="Sylfaen"/>
+      </a:majorFont>
+      <a:minorFont>
+        <a:latin typeface="Calibri" panose="020F0502020204030204"/>
+        <a:ea typeface=""/>
+        <a:cs typeface=""/>
+        <a:font script="Jpan" typeface="ＭＳ Ｐゴシック"/>
+        <a:font script="Hang" typeface="맑은 고딕"/>
+        <a:font script="Hans" typeface="宋体"/>
+        <a:font script="Hant" typeface="新細明體"/>
+        <a:font script="Arab" typeface="Arial"/>
+        <a:font script="Hebr" typeface="Arial"/>
+        <a:font script="Thai" typeface="Cordia New"/>
+        <a:font script="Ethi" typeface="Nyala"/>
+        <a:font script="Beng" typeface="Vrinda"/>
+        <a:font script="Gujr" typeface="Shruti"/>
+        <a:font script="Khmr" typeface="DaunPenh"/>
+        <a:font script="Knda" typeface="Tunga"/>
+        <a:font script="Guru" typeface="Raavi"/>
+        <a:font script="Cans" typeface="Euphemia"/>
+        <a:font script="Cher" typeface="Plantagenet Cherokee"/>
+        <a:font script="Yiii" typeface="Microsoft Yi Baiti"/>
+        <a:font script="Tibt" typeface="Microsoft Himalaya"/>
+        <a:font script="Thaa" typeface="MV Boli"/>
+        <a:font script="Deva" typeface="Mangal"/>
+        <a:font script="Telu" typeface="Gautami"/>
+        <a:font script="Taml" typeface="Latha"/>
+        <a:font script="Syrc" typeface="Estrangelo Edessa"/>
+        <a:font script="Orya" typeface="Kalinga"/>
+        <a:font script="Mlym" typeface="Kartika"/>
+        <a:font script="Laoo" typeface="DokChampa"/>
+        <a:font script="Sinh" typeface="Iskoola Pota"/>
+        <a:font script="Mong" typeface="Mongolian Baiti"/>
+        <a:font script="Viet" typeface="Arial"/>
+        <a:font script="Uigh" typeface="Microsoft Uighur"/>
+        <a:font script="Geor" typeface="Sylfaen"/>
+      </a:minorFont>
+    </a:fontScheme>
+    <a:fmtScheme name="Office">
+      <a:fillStyleLst>
+        <a:solidFill>
+          <a:schemeClr val="phClr"/>
+        </a:solidFill>
+        <a:gradFill rotWithShape="1">
+          <a:gsLst>
+            <a:gs pos="0">
+              <a:schemeClr val="phClr">
+                <a:lumMod val="110000"/>
+                <a:satMod val="105000"/>
+                <a:tint val="67000"/>
+              </a:schemeClr>
+            </a:gs>
+            <a:gs pos="50000">
+              <a:schemeClr val="phClr">
+                <a:lumMod val="105000"/>
+                <a:satMod val="103000"/>
+                <a:tint val="73000"/>
+              </a:schemeClr>
+            </a:gs>
+            <a:gs pos="100000">
+              <a:schemeClr val="phClr">
+                <a:lumMod val="105000"/>
+                <a:satMod val="109000"/>
+                <a:tint val="81000"/>
+              </a:schemeClr>
+            </a:gs>
+          </a:gsLst>
+          <a:lin ang="5400000" scaled="0"/>
+        </a:gradFill>
+        <a:gradFill rotWithShape="1">
+          <a:gsLst>
+            <a:gs pos="0">
+              <a:schemeClr val="phClr">
+                <a:satMod val="103000"/>
+                <a:lumMod val="102000"/>
+                <a:tint val="94000"/>
+              </a:schemeClr>
+            </a:gs>
+            <a:gs pos="50000">
+              <a:schemeClr val="phClr">
+                <a:satMod val="110000"/>
+                <a:lumMod val="100000"/>
+                <a:shade val="100000"/>
+              </a:schemeClr>
+            </a:gs>
+            <a:gs pos="100000">
+              <a:schemeClr val="phClr">
+                <a:lumMod val="99000"/>
+                <a:satMod val="120000"/>
+                <a:shade val="78000"/>
+              </a:schemeClr>
+            </a:gs>
+          </a:gsLst>
+          <a:lin ang="5400000" scaled="0"/>
+        </a:gradFill>
+      </a:fillStyleLst>
+      <a:lnStyleLst>
+        <a:ln w="6350" cap="flat" cmpd="sng" algn="ctr">
+          <a:solidFill>
+            <a:schemeClr val="phClr"/>
+          </a:solidFill>
+          <a:prstDash val="solid"/>
+          <a:miter lim="800000"/>
+        </a:ln>
+        <a:ln w="12700" cap="flat" cmpd="sng" algn="ctr">
+          <a:solidFill>
+            <a:schemeClr val="phClr"/>
+          </a:solidFill>
+          <a:prstDash val="solid"/>
+          <a:miter lim="800000"/>
+        </a:ln>
+        <a:ln w="19050" cap="flat" cmpd="sng" algn="ctr">
+          <a:solidFill>
+            <a:schemeClr val="phClr"/>
+          </a:solidFill>
+          <a:prstDash val="solid"/>
+          <a:miter lim="800000"/>
+        </a:ln>
+      </a:lnStyleLst>
+      <a:effectStyleLst>
+        <a:effectStyle>
+          <a:effectLst/>
+        </a:effectStyle>
+        <a:effectStyle>
+          <a:effectLst/>
+        </a:effectStyle>
+        <a:effectStyle>
+          <a:effectLst>
+            <a:outerShdw blurRad="57150" dist="19050" dir="5400000" algn="ctr" rotWithShape="0">
+              <a:srgbClr val="000000">
+                <a:alpha val="63000"/>
+              </a:srgbClr>
+            </a:outerShdw>
+          </a:effectLst>
+        </a:effectStyle>
+      </a:effectStyleLst>
+      <a:bgFillStyleLst>
+        <a:solidFill>
+          <a:schemeClr val="phClr"/>
+        </a:solidFill>
+        <a:solidFill>
+          <a:schemeClr val="phClr">
+            <a:tint val="95000"/>
+            <a:satMod val="170000"/>
+          </a:schemeClr>
+        </a:solidFill>
+        <a:gradFill rotWithShape="1">
+          <a:gsLst>
+            <a:gs pos="0">
+              <a:schemeClr val="phClr">
+                <a:tint val="93000"/>
+                <a:satMod val="150000"/>
+                <a:shade val="98000"/>
+                <a:lumMod val="102000"/>
+              </a:schemeClr>
+            </a:gs>
+            <a:gs pos="50000">
+              <a:schemeClr val="phClr">
+                <a:tint val="98000"/>
+                <a:satMod val="130000"/>
+                <a:shade val="90000"/>
+                <a:lumMod val="103000"/>
+              </a:schemeClr>
+            </a:gs>
+            <a:gs pos="100000">
+              <a:schemeClr val="phClr">
+                <a:shade val="63000"/>
+                <a:satMod val="120000"/>
+              </a:schemeClr>
+            </a:gs>
+          </a:gsLst>
+          <a:lin ang="5400000" scaled="0"/>
+        </a:gradFill>
+      </a:bgFillStyleLst>
+    </a:fmtScheme>
+  </a:themeElements>
+  <a:objectDefaults/>
+  <a:extraClrSchemeLst/>
+  <a:extLst>
+    <a:ext uri="{05A4C25C-085E-4340-85A3-A5531E510DB2}">
+      <thm15:themeFamily xmlns:thm15="http://schemas.microsoft.com/office/thememl/2012/main" name="Office Theme" id="{62F939B6-93AF-4DB8-9C6B-D6C7DFDC589F}" vid="{4A3C46E8-61CC-4603-A589-7422A47A8E4A}"/>
+    </a:ext>
+  </a:extLst>
+</a:theme>
 </file>
</xml_diff>

<commit_message>
Prototipado del portal de tareas
</commit_message>
<xml_diff>
--- a/Diseno/Concepto_Arquitectura.pptx
+++ b/Diseno/Concepto_Arquitectura.pptx
@@ -5,13 +5,14 @@
     <p:sldMasterId id="2147483648" r:id="rId1"/>
   </p:sldMasterIdLst>
   <p:notesMasterIdLst>
-    <p:notesMasterId r:id="rId6"/>
+    <p:notesMasterId r:id="rId7"/>
   </p:notesMasterIdLst>
   <p:sldIdLst>
     <p:sldId id="256" r:id="rId2"/>
     <p:sldId id="257" r:id="rId3"/>
     <p:sldId id="258" r:id="rId4"/>
     <p:sldId id="259" r:id="rId5"/>
+    <p:sldId id="260" r:id="rId6"/>
   </p:sldIdLst>
   <p:sldSz cx="12192000" cy="6858000"/>
   <p:notesSz cx="6858000" cy="9144000"/>
@@ -3436,15 +3437,7 @@
             </a:r>
             <a:r>
               <a:rPr lang="es-ES" dirty="0" smtClean="0"/>
-              <a:t> Management – Business </a:t>
-            </a:r>
-            <a:r>
-              <a:rPr lang="es-ES" dirty="0" err="1" smtClean="0"/>
-              <a:t>Task</a:t>
-            </a:r>
-            <a:r>
-              <a:rPr lang="es-ES" dirty="0" smtClean="0"/>
-              <a:t> Manager (BTM)</a:t>
+              <a:t> Management – Business Task Manager (BTM)</a:t>
             </a:r>
             <a:endParaRPr lang="es-ES" dirty="0"/>
           </a:p>
@@ -6608,6 +6601,2213 @@
     <p:extLst>
       <p:ext uri="{BB962C8B-B14F-4D97-AF65-F5344CB8AC3E}">
         <p14:creationId xmlns:p14="http://schemas.microsoft.com/office/powerpoint/2010/main" val="2133461622"/>
+      </p:ext>
+    </p:extLst>
+  </p:cSld>
+  <p:clrMapOvr>
+    <a:masterClrMapping/>
+  </p:clrMapOvr>
+</p:sld>
+</file>
+
+<file path=ppt/slides/slide5.xml><?xml version="1.0" encoding="utf-8"?>
+<p:sld xmlns:a="http://schemas.openxmlformats.org/drawingml/2006/main" xmlns:r="http://schemas.openxmlformats.org/officeDocument/2006/relationships" xmlns:p="http://schemas.openxmlformats.org/presentationml/2006/main">
+  <p:cSld>
+    <p:spTree>
+      <p:nvGrpSpPr>
+        <p:cNvPr id="1" name=""/>
+        <p:cNvGrpSpPr/>
+        <p:nvPr/>
+      </p:nvGrpSpPr>
+      <p:grpSpPr>
+        <a:xfrm>
+          <a:off x="0" y="0"/>
+          <a:ext cx="0" cy="0"/>
+          <a:chOff x="0" y="0"/>
+          <a:chExt cx="0" cy="0"/>
+        </a:xfrm>
+      </p:grpSpPr>
+      <p:sp>
+        <p:nvSpPr>
+          <p:cNvPr id="31" name="Rectángulo 30"/>
+          <p:cNvSpPr/>
+          <p:nvPr/>
+        </p:nvSpPr>
+        <p:spPr>
+          <a:xfrm>
+            <a:off x="714375" y="1400176"/>
+            <a:ext cx="10772775" cy="5329238"/>
+          </a:xfrm>
+          <a:prstGeom prst="rect">
+            <a:avLst/>
+          </a:prstGeom>
+          <a:solidFill>
+            <a:schemeClr val="bg1"/>
+          </a:solidFill>
+        </p:spPr>
+        <p:style>
+          <a:lnRef idx="2">
+            <a:schemeClr val="accent1">
+              <a:shade val="50000"/>
+            </a:schemeClr>
+          </a:lnRef>
+          <a:fillRef idx="1">
+            <a:schemeClr val="accent1"/>
+          </a:fillRef>
+          <a:effectRef idx="0">
+            <a:schemeClr val="accent1"/>
+          </a:effectRef>
+          <a:fontRef idx="minor">
+            <a:schemeClr val="lt1"/>
+          </a:fontRef>
+        </p:style>
+        <p:txBody>
+          <a:bodyPr rtlCol="0" anchor="ctr"/>
+          <a:lstStyle/>
+          <a:p>
+            <a:pPr algn="ctr"/>
+            <a:endParaRPr lang="es-ES"/>
+          </a:p>
+        </p:txBody>
+      </p:sp>
+      <p:sp>
+        <p:nvSpPr>
+          <p:cNvPr id="33" name="Rectángulo redondeado 32"/>
+          <p:cNvSpPr/>
+          <p:nvPr/>
+        </p:nvSpPr>
+        <p:spPr>
+          <a:xfrm>
+            <a:off x="5667373" y="2371726"/>
+            <a:ext cx="2062165" cy="369092"/>
+          </a:xfrm>
+          <a:prstGeom prst="roundRect">
+            <a:avLst/>
+          </a:prstGeom>
+          <a:solidFill>
+            <a:schemeClr val="accent4">
+              <a:lumMod val="60000"/>
+              <a:lumOff val="40000"/>
+            </a:schemeClr>
+          </a:solidFill>
+          <a:ln>
+            <a:noFill/>
+          </a:ln>
+        </p:spPr>
+        <p:style>
+          <a:lnRef idx="2">
+            <a:schemeClr val="accent1">
+              <a:shade val="50000"/>
+            </a:schemeClr>
+          </a:lnRef>
+          <a:fillRef idx="1">
+            <a:schemeClr val="accent1"/>
+          </a:fillRef>
+          <a:effectRef idx="0">
+            <a:schemeClr val="accent1"/>
+          </a:effectRef>
+          <a:fontRef idx="minor">
+            <a:schemeClr val="lt1"/>
+          </a:fontRef>
+        </p:style>
+        <p:txBody>
+          <a:bodyPr rtlCol="0" anchor="t"/>
+          <a:lstStyle/>
+          <a:p>
+            <a:pPr algn="ctr"/>
+            <a:r>
+              <a:rPr lang="es-ES" sz="1200" dirty="0" smtClean="0">
+                <a:solidFill>
+                  <a:schemeClr val="tx1"/>
+                </a:solidFill>
+              </a:rPr>
+              <a:t>Business Activity Monitoring</a:t>
+            </a:r>
+            <a:endParaRPr lang="es-ES" sz="1200" dirty="0">
+              <a:solidFill>
+                <a:schemeClr val="tx1"/>
+              </a:solidFill>
+            </a:endParaRPr>
+          </a:p>
+        </p:txBody>
+      </p:sp>
+      <p:sp>
+        <p:nvSpPr>
+          <p:cNvPr id="21" name="Rectángulo redondeado 20"/>
+          <p:cNvSpPr/>
+          <p:nvPr/>
+        </p:nvSpPr>
+        <p:spPr>
+          <a:xfrm>
+            <a:off x="4124324" y="2371726"/>
+            <a:ext cx="1528763" cy="369092"/>
+          </a:xfrm>
+          <a:prstGeom prst="roundRect">
+            <a:avLst/>
+          </a:prstGeom>
+          <a:solidFill>
+            <a:schemeClr val="accent4">
+              <a:lumMod val="60000"/>
+              <a:lumOff val="40000"/>
+            </a:schemeClr>
+          </a:solidFill>
+          <a:ln>
+            <a:noFill/>
+          </a:ln>
+        </p:spPr>
+        <p:style>
+          <a:lnRef idx="2">
+            <a:schemeClr val="accent1">
+              <a:shade val="50000"/>
+            </a:schemeClr>
+          </a:lnRef>
+          <a:fillRef idx="1">
+            <a:schemeClr val="accent1"/>
+          </a:fillRef>
+          <a:effectRef idx="0">
+            <a:schemeClr val="accent1"/>
+          </a:effectRef>
+          <a:fontRef idx="minor">
+            <a:schemeClr val="lt1"/>
+          </a:fontRef>
+        </p:style>
+        <p:txBody>
+          <a:bodyPr rtlCol="0" anchor="t"/>
+          <a:lstStyle/>
+          <a:p>
+            <a:pPr algn="ctr"/>
+            <a:r>
+              <a:rPr lang="es-ES" sz="1200" dirty="0" smtClean="0">
+                <a:solidFill>
+                  <a:schemeClr val="tx1"/>
+                </a:solidFill>
+              </a:rPr>
+              <a:t>My Tasklist</a:t>
+            </a:r>
+            <a:endParaRPr lang="es-ES" sz="1200" dirty="0">
+              <a:solidFill>
+                <a:schemeClr val="tx1"/>
+              </a:solidFill>
+            </a:endParaRPr>
+          </a:p>
+        </p:txBody>
+      </p:sp>
+      <p:sp>
+        <p:nvSpPr>
+          <p:cNvPr id="20" name="Rectángulo redondeado 19"/>
+          <p:cNvSpPr/>
+          <p:nvPr/>
+        </p:nvSpPr>
+        <p:spPr>
+          <a:xfrm>
+            <a:off x="3981450" y="2657475"/>
+            <a:ext cx="7372350" cy="2257426"/>
+          </a:xfrm>
+          <a:prstGeom prst="roundRect">
+            <a:avLst>
+              <a:gd name="adj" fmla="val 2602"/>
+            </a:avLst>
+          </a:prstGeom>
+          <a:solidFill>
+            <a:schemeClr val="bg1"/>
+          </a:solidFill>
+          <a:ln>
+            <a:solidFill>
+              <a:schemeClr val="accent4">
+                <a:lumMod val="60000"/>
+                <a:lumOff val="40000"/>
+              </a:schemeClr>
+            </a:solidFill>
+          </a:ln>
+        </p:spPr>
+        <p:style>
+          <a:lnRef idx="2">
+            <a:schemeClr val="accent1">
+              <a:shade val="50000"/>
+            </a:schemeClr>
+          </a:lnRef>
+          <a:fillRef idx="1">
+            <a:schemeClr val="accent1"/>
+          </a:fillRef>
+          <a:effectRef idx="0">
+            <a:schemeClr val="accent1"/>
+          </a:effectRef>
+          <a:fontRef idx="minor">
+            <a:schemeClr val="lt1"/>
+          </a:fontRef>
+        </p:style>
+        <p:txBody>
+          <a:bodyPr rtlCol="0" anchor="ctr"/>
+          <a:lstStyle/>
+          <a:p>
+            <a:pPr algn="ctr"/>
+            <a:endParaRPr lang="es-ES"/>
+          </a:p>
+        </p:txBody>
+      </p:sp>
+      <p:sp>
+        <p:nvSpPr>
+          <p:cNvPr id="2" name="Título 1"/>
+          <p:cNvSpPr>
+            <a:spLocks noGrp="1"/>
+          </p:cNvSpPr>
+          <p:nvPr>
+            <p:ph type="title"/>
+          </p:nvPr>
+        </p:nvSpPr>
+        <p:spPr/>
+        <p:txBody>
+          <a:bodyPr/>
+          <a:lstStyle/>
+          <a:p>
+            <a:r>
+              <a:rPr lang="es-ES" dirty="0" err="1" smtClean="0"/>
+              <a:t>Worklist</a:t>
+            </a:r>
+            <a:r>
+              <a:rPr lang="es-ES" dirty="0" smtClean="0"/>
+              <a:t> Portal</a:t>
+            </a:r>
+            <a:endParaRPr lang="es-ES" dirty="0"/>
+          </a:p>
+        </p:txBody>
+      </p:sp>
+      <p:sp>
+        <p:nvSpPr>
+          <p:cNvPr id="3" name="Rectángulo 2"/>
+          <p:cNvSpPr/>
+          <p:nvPr/>
+        </p:nvSpPr>
+        <p:spPr>
+          <a:xfrm>
+            <a:off x="4124324" y="3086109"/>
+            <a:ext cx="842963" cy="357187"/>
+          </a:xfrm>
+          <a:prstGeom prst="rect">
+            <a:avLst/>
+          </a:prstGeom>
+          <a:solidFill>
+            <a:schemeClr val="accent4">
+              <a:lumMod val="40000"/>
+              <a:lumOff val="60000"/>
+            </a:schemeClr>
+          </a:solidFill>
+          <a:ln>
+            <a:solidFill>
+              <a:schemeClr val="accent4"/>
+            </a:solidFill>
+          </a:ln>
+        </p:spPr>
+        <p:style>
+          <a:lnRef idx="2">
+            <a:schemeClr val="accent1">
+              <a:shade val="50000"/>
+            </a:schemeClr>
+          </a:lnRef>
+          <a:fillRef idx="1">
+            <a:schemeClr val="accent1"/>
+          </a:fillRef>
+          <a:effectRef idx="0">
+            <a:schemeClr val="accent1"/>
+          </a:effectRef>
+          <a:fontRef idx="minor">
+            <a:schemeClr val="lt1"/>
+          </a:fontRef>
+        </p:style>
+        <p:txBody>
+          <a:bodyPr rtlCol="0" anchor="ctr"/>
+          <a:lstStyle/>
+          <a:p>
+            <a:pPr algn="ctr"/>
+            <a:r>
+              <a:rPr lang="es-ES" sz="1200" dirty="0" smtClean="0">
+                <a:solidFill>
+                  <a:schemeClr val="tx1"/>
+                </a:solidFill>
+              </a:rPr>
+              <a:t>Task ID</a:t>
+            </a:r>
+            <a:endParaRPr lang="es-ES" sz="1200" dirty="0">
+              <a:solidFill>
+                <a:schemeClr val="tx1"/>
+              </a:solidFill>
+            </a:endParaRPr>
+          </a:p>
+        </p:txBody>
+      </p:sp>
+      <p:sp>
+        <p:nvSpPr>
+          <p:cNvPr id="4" name="Rectángulo 3"/>
+          <p:cNvSpPr/>
+          <p:nvPr/>
+        </p:nvSpPr>
+        <p:spPr>
+          <a:xfrm>
+            <a:off x="4967287" y="3086109"/>
+            <a:ext cx="2928937" cy="357187"/>
+          </a:xfrm>
+          <a:prstGeom prst="rect">
+            <a:avLst/>
+          </a:prstGeom>
+          <a:solidFill>
+            <a:schemeClr val="accent4">
+              <a:lumMod val="40000"/>
+              <a:lumOff val="60000"/>
+            </a:schemeClr>
+          </a:solidFill>
+          <a:ln>
+            <a:solidFill>
+              <a:schemeClr val="accent4"/>
+            </a:solidFill>
+          </a:ln>
+        </p:spPr>
+        <p:style>
+          <a:lnRef idx="2">
+            <a:schemeClr val="accent1">
+              <a:shade val="50000"/>
+            </a:schemeClr>
+          </a:lnRef>
+          <a:fillRef idx="1">
+            <a:schemeClr val="accent1"/>
+          </a:fillRef>
+          <a:effectRef idx="0">
+            <a:schemeClr val="accent1"/>
+          </a:effectRef>
+          <a:fontRef idx="minor">
+            <a:schemeClr val="lt1"/>
+          </a:fontRef>
+        </p:style>
+        <p:txBody>
+          <a:bodyPr rtlCol="0" anchor="ctr"/>
+          <a:lstStyle/>
+          <a:p>
+            <a:r>
+              <a:rPr lang="es-ES" sz="1200" dirty="0" smtClean="0">
+                <a:solidFill>
+                  <a:schemeClr val="tx1"/>
+                </a:solidFill>
+              </a:rPr>
+              <a:t>Task title</a:t>
+            </a:r>
+            <a:endParaRPr lang="es-ES" sz="1200" dirty="0">
+              <a:solidFill>
+                <a:schemeClr val="tx1"/>
+              </a:solidFill>
+            </a:endParaRPr>
+          </a:p>
+        </p:txBody>
+      </p:sp>
+      <p:sp>
+        <p:nvSpPr>
+          <p:cNvPr id="5" name="Rectángulo 4"/>
+          <p:cNvSpPr/>
+          <p:nvPr/>
+        </p:nvSpPr>
+        <p:spPr>
+          <a:xfrm>
+            <a:off x="7896225" y="3086109"/>
+            <a:ext cx="1200150" cy="357187"/>
+          </a:xfrm>
+          <a:prstGeom prst="rect">
+            <a:avLst/>
+          </a:prstGeom>
+          <a:solidFill>
+            <a:schemeClr val="accent4">
+              <a:lumMod val="40000"/>
+              <a:lumOff val="60000"/>
+            </a:schemeClr>
+          </a:solidFill>
+          <a:ln>
+            <a:solidFill>
+              <a:schemeClr val="accent4"/>
+            </a:solidFill>
+          </a:ln>
+        </p:spPr>
+        <p:style>
+          <a:lnRef idx="2">
+            <a:schemeClr val="accent1">
+              <a:shade val="50000"/>
+            </a:schemeClr>
+          </a:lnRef>
+          <a:fillRef idx="1">
+            <a:schemeClr val="accent1"/>
+          </a:fillRef>
+          <a:effectRef idx="0">
+            <a:schemeClr val="accent1"/>
+          </a:effectRef>
+          <a:fontRef idx="minor">
+            <a:schemeClr val="lt1"/>
+          </a:fontRef>
+        </p:style>
+        <p:txBody>
+          <a:bodyPr rtlCol="0" anchor="ctr"/>
+          <a:lstStyle/>
+          <a:p>
+            <a:r>
+              <a:rPr lang="es-ES" sz="1200" dirty="0" smtClean="0">
+                <a:solidFill>
+                  <a:schemeClr val="tx1"/>
+                </a:solidFill>
+              </a:rPr>
+              <a:t>Owner</a:t>
+            </a:r>
+            <a:endParaRPr lang="es-ES" sz="1200" dirty="0">
+              <a:solidFill>
+                <a:schemeClr val="tx1"/>
+              </a:solidFill>
+            </a:endParaRPr>
+          </a:p>
+        </p:txBody>
+      </p:sp>
+      <p:sp>
+        <p:nvSpPr>
+          <p:cNvPr id="6" name="Rectángulo 5"/>
+          <p:cNvSpPr/>
+          <p:nvPr/>
+        </p:nvSpPr>
+        <p:spPr>
+          <a:xfrm>
+            <a:off x="9096375" y="3086109"/>
+            <a:ext cx="1200150" cy="357187"/>
+          </a:xfrm>
+          <a:prstGeom prst="rect">
+            <a:avLst/>
+          </a:prstGeom>
+          <a:solidFill>
+            <a:schemeClr val="accent4">
+              <a:lumMod val="40000"/>
+              <a:lumOff val="60000"/>
+            </a:schemeClr>
+          </a:solidFill>
+          <a:ln>
+            <a:solidFill>
+              <a:schemeClr val="accent4"/>
+            </a:solidFill>
+          </a:ln>
+        </p:spPr>
+        <p:style>
+          <a:lnRef idx="2">
+            <a:schemeClr val="accent1">
+              <a:shade val="50000"/>
+            </a:schemeClr>
+          </a:lnRef>
+          <a:fillRef idx="1">
+            <a:schemeClr val="accent1"/>
+          </a:fillRef>
+          <a:effectRef idx="0">
+            <a:schemeClr val="accent1"/>
+          </a:effectRef>
+          <a:fontRef idx="minor">
+            <a:schemeClr val="lt1"/>
+          </a:fontRef>
+        </p:style>
+        <p:txBody>
+          <a:bodyPr rtlCol="0" anchor="ctr"/>
+          <a:lstStyle/>
+          <a:p>
+            <a:r>
+              <a:rPr lang="es-ES" sz="1200" dirty="0" smtClean="0">
+                <a:solidFill>
+                  <a:schemeClr val="tx1"/>
+                </a:solidFill>
+              </a:rPr>
+              <a:t>Assignee</a:t>
+            </a:r>
+            <a:endParaRPr lang="es-ES" sz="1200" dirty="0">
+              <a:solidFill>
+                <a:schemeClr val="tx1"/>
+              </a:solidFill>
+            </a:endParaRPr>
+          </a:p>
+        </p:txBody>
+      </p:sp>
+      <p:sp>
+        <p:nvSpPr>
+          <p:cNvPr id="7" name="Rectángulo 6"/>
+          <p:cNvSpPr/>
+          <p:nvPr/>
+        </p:nvSpPr>
+        <p:spPr>
+          <a:xfrm>
+            <a:off x="10296525" y="3086109"/>
+            <a:ext cx="952499" cy="357187"/>
+          </a:xfrm>
+          <a:prstGeom prst="rect">
+            <a:avLst/>
+          </a:prstGeom>
+          <a:solidFill>
+            <a:schemeClr val="accent4">
+              <a:lumMod val="40000"/>
+              <a:lumOff val="60000"/>
+            </a:schemeClr>
+          </a:solidFill>
+          <a:ln>
+            <a:solidFill>
+              <a:schemeClr val="accent4"/>
+            </a:solidFill>
+          </a:ln>
+        </p:spPr>
+        <p:style>
+          <a:lnRef idx="2">
+            <a:schemeClr val="accent1">
+              <a:shade val="50000"/>
+            </a:schemeClr>
+          </a:lnRef>
+          <a:fillRef idx="1">
+            <a:schemeClr val="accent1"/>
+          </a:fillRef>
+          <a:effectRef idx="0">
+            <a:schemeClr val="accent1"/>
+          </a:effectRef>
+          <a:fontRef idx="minor">
+            <a:schemeClr val="lt1"/>
+          </a:fontRef>
+        </p:style>
+        <p:txBody>
+          <a:bodyPr rtlCol="0" anchor="ctr"/>
+          <a:lstStyle/>
+          <a:p>
+            <a:r>
+              <a:rPr lang="es-ES" sz="1200" dirty="0" smtClean="0">
+                <a:solidFill>
+                  <a:schemeClr val="tx1"/>
+                </a:solidFill>
+              </a:rPr>
+              <a:t>Due date</a:t>
+            </a:r>
+            <a:endParaRPr lang="es-ES" sz="1200" dirty="0">
+              <a:solidFill>
+                <a:schemeClr val="tx1"/>
+              </a:solidFill>
+            </a:endParaRPr>
+          </a:p>
+        </p:txBody>
+      </p:sp>
+      <p:grpSp>
+        <p:nvGrpSpPr>
+          <p:cNvPr id="13" name="Grupo 12"/>
+          <p:cNvGrpSpPr/>
+          <p:nvPr/>
+        </p:nvGrpSpPr>
+        <p:grpSpPr>
+          <a:xfrm>
+            <a:off x="4124324" y="3452823"/>
+            <a:ext cx="7124700" cy="504824"/>
+            <a:chOff x="4229100" y="2424115"/>
+            <a:chExt cx="7124700" cy="504824"/>
+          </a:xfrm>
+        </p:grpSpPr>
+        <p:sp>
+          <p:nvSpPr>
+            <p:cNvPr id="8" name="Rectángulo 7"/>
+            <p:cNvSpPr/>
+            <p:nvPr/>
+          </p:nvSpPr>
+          <p:spPr>
+            <a:xfrm>
+              <a:off x="4229100" y="2424115"/>
+              <a:ext cx="842963" cy="504824"/>
+            </a:xfrm>
+            <a:prstGeom prst="rect">
+              <a:avLst/>
+            </a:prstGeom>
+            <a:solidFill>
+              <a:schemeClr val="bg1"/>
+            </a:solidFill>
+            <a:ln>
+              <a:solidFill>
+                <a:schemeClr val="accent4"/>
+              </a:solidFill>
+            </a:ln>
+          </p:spPr>
+          <p:style>
+            <a:lnRef idx="2">
+              <a:schemeClr val="accent1">
+                <a:shade val="50000"/>
+              </a:schemeClr>
+            </a:lnRef>
+            <a:fillRef idx="1">
+              <a:schemeClr val="accent1"/>
+            </a:fillRef>
+            <a:effectRef idx="0">
+              <a:schemeClr val="accent1"/>
+            </a:effectRef>
+            <a:fontRef idx="minor">
+              <a:schemeClr val="lt1"/>
+            </a:fontRef>
+          </p:style>
+          <p:txBody>
+            <a:bodyPr rtlCol="0" anchor="ctr"/>
+            <a:lstStyle/>
+            <a:p>
+              <a:pPr algn="ctr"/>
+              <a:r>
+                <a:rPr lang="es-ES" sz="1200" dirty="0" smtClean="0">
+                  <a:solidFill>
+                    <a:schemeClr val="tx1"/>
+                  </a:solidFill>
+                </a:rPr>
+                <a:t>00001</a:t>
+              </a:r>
+              <a:endParaRPr lang="es-ES" sz="1200" dirty="0">
+                <a:solidFill>
+                  <a:schemeClr val="tx1"/>
+                </a:solidFill>
+              </a:endParaRPr>
+            </a:p>
+          </p:txBody>
+        </p:sp>
+        <p:sp>
+          <p:nvSpPr>
+            <p:cNvPr id="9" name="Rectángulo 8"/>
+            <p:cNvSpPr/>
+            <p:nvPr/>
+          </p:nvSpPr>
+          <p:spPr>
+            <a:xfrm>
+              <a:off x="5072063" y="2424115"/>
+              <a:ext cx="2928937" cy="504824"/>
+            </a:xfrm>
+            <a:prstGeom prst="rect">
+              <a:avLst/>
+            </a:prstGeom>
+            <a:solidFill>
+              <a:schemeClr val="bg1"/>
+            </a:solidFill>
+            <a:ln>
+              <a:solidFill>
+                <a:schemeClr val="accent4"/>
+              </a:solidFill>
+            </a:ln>
+          </p:spPr>
+          <p:style>
+            <a:lnRef idx="2">
+              <a:schemeClr val="accent1">
+                <a:shade val="50000"/>
+              </a:schemeClr>
+            </a:lnRef>
+            <a:fillRef idx="1">
+              <a:schemeClr val="accent1"/>
+            </a:fillRef>
+            <a:effectRef idx="0">
+              <a:schemeClr val="accent1"/>
+            </a:effectRef>
+            <a:fontRef idx="minor">
+              <a:schemeClr val="lt1"/>
+            </a:fontRef>
+          </p:style>
+          <p:txBody>
+            <a:bodyPr rtlCol="0" anchor="t"/>
+            <a:lstStyle/>
+            <a:p>
+              <a:r>
+                <a:rPr lang="es-ES" sz="1200" b="1" dirty="0" smtClean="0">
+                  <a:solidFill>
+                    <a:schemeClr val="tx1"/>
+                  </a:solidFill>
+                </a:rPr>
+                <a:t>Aprobar diseño del curso SI184</a:t>
+              </a:r>
+              <a:r>
+                <a:rPr lang="es-ES" sz="1200" dirty="0" smtClean="0">
+                  <a:solidFill>
+                    <a:schemeClr val="tx1"/>
+                  </a:solidFill>
+                </a:rPr>
+                <a:t/>
+              </a:r>
+              <a:br>
+                <a:rPr lang="es-ES" sz="1200" dirty="0" smtClean="0">
+                  <a:solidFill>
+                    <a:schemeClr val="tx1"/>
+                  </a:solidFill>
+                </a:rPr>
+              </a:br>
+              <a:r>
+                <a:rPr lang="es-ES" sz="1200" dirty="0" smtClean="0">
+                  <a:solidFill>
+                    <a:schemeClr val="tx1"/>
+                  </a:solidFill>
+                </a:rPr>
+                <a:t>[ </a:t>
+              </a:r>
+              <a:r>
+                <a:rPr lang="es-ES" sz="1200" u="sng" dirty="0" smtClean="0">
+                  <a:solidFill>
+                    <a:schemeClr val="accent1">
+                      <a:lumMod val="75000"/>
+                    </a:schemeClr>
+                  </a:solidFill>
+                </a:rPr>
+                <a:t>Auto asignar</a:t>
+              </a:r>
+              <a:r>
+                <a:rPr lang="es-ES" sz="1200" dirty="0" smtClean="0">
+                  <a:solidFill>
+                    <a:schemeClr val="tx1"/>
+                  </a:solidFill>
+                </a:rPr>
+                <a:t> ] [ </a:t>
+              </a:r>
+              <a:r>
+                <a:rPr lang="es-ES" sz="1200" u="sng" dirty="0">
+                  <a:solidFill>
+                    <a:schemeClr val="accent1">
+                      <a:lumMod val="75000"/>
+                    </a:schemeClr>
+                  </a:solidFill>
+                </a:rPr>
+                <a:t>Liberar</a:t>
+              </a:r>
+              <a:r>
+                <a:rPr lang="es-ES" sz="1200" dirty="0" smtClean="0">
+                  <a:solidFill>
+                    <a:schemeClr val="tx1"/>
+                  </a:solidFill>
+                </a:rPr>
+                <a:t> ] [ </a:t>
+              </a:r>
+              <a:r>
+                <a:rPr lang="es-ES" sz="1200" u="sng" dirty="0">
+                  <a:solidFill>
+                    <a:schemeClr val="accent1">
+                      <a:lumMod val="75000"/>
+                    </a:schemeClr>
+                  </a:solidFill>
+                </a:rPr>
+                <a:t>Ejecutar</a:t>
+              </a:r>
+              <a:r>
+                <a:rPr lang="es-ES" sz="1200" dirty="0" smtClean="0">
+                  <a:solidFill>
+                    <a:schemeClr val="tx1"/>
+                  </a:solidFill>
+                </a:rPr>
+                <a:t> ]</a:t>
+              </a:r>
+              <a:endParaRPr lang="es-ES" sz="1200" dirty="0">
+                <a:solidFill>
+                  <a:schemeClr val="tx1"/>
+                </a:solidFill>
+              </a:endParaRPr>
+            </a:p>
+          </p:txBody>
+        </p:sp>
+        <p:sp>
+          <p:nvSpPr>
+            <p:cNvPr id="10" name="Rectángulo 9"/>
+            <p:cNvSpPr/>
+            <p:nvPr/>
+          </p:nvSpPr>
+          <p:spPr>
+            <a:xfrm>
+              <a:off x="8001001" y="2424115"/>
+              <a:ext cx="1200150" cy="504824"/>
+            </a:xfrm>
+            <a:prstGeom prst="rect">
+              <a:avLst/>
+            </a:prstGeom>
+            <a:solidFill>
+              <a:schemeClr val="bg1"/>
+            </a:solidFill>
+            <a:ln>
+              <a:solidFill>
+                <a:schemeClr val="accent4"/>
+              </a:solidFill>
+            </a:ln>
+          </p:spPr>
+          <p:style>
+            <a:lnRef idx="2">
+              <a:schemeClr val="accent1">
+                <a:shade val="50000"/>
+              </a:schemeClr>
+            </a:lnRef>
+            <a:fillRef idx="1">
+              <a:schemeClr val="accent1"/>
+            </a:fillRef>
+            <a:effectRef idx="0">
+              <a:schemeClr val="accent1"/>
+            </a:effectRef>
+            <a:fontRef idx="minor">
+              <a:schemeClr val="lt1"/>
+            </a:fontRef>
+          </p:style>
+          <p:txBody>
+            <a:bodyPr rtlCol="0" anchor="ctr"/>
+            <a:lstStyle/>
+            <a:p>
+              <a:pPr algn="ctr"/>
+              <a:r>
+                <a:rPr lang="es-ES" sz="1200" dirty="0" smtClean="0">
+                  <a:solidFill>
+                    <a:schemeClr val="tx1"/>
+                  </a:solidFill>
+                </a:rPr>
+                <a:t>ianache</a:t>
+              </a:r>
+              <a:endParaRPr lang="es-ES" sz="1200" dirty="0">
+                <a:solidFill>
+                  <a:schemeClr val="tx1"/>
+                </a:solidFill>
+              </a:endParaRPr>
+            </a:p>
+          </p:txBody>
+        </p:sp>
+        <p:sp>
+          <p:nvSpPr>
+            <p:cNvPr id="11" name="Rectángulo 10"/>
+            <p:cNvSpPr/>
+            <p:nvPr/>
+          </p:nvSpPr>
+          <p:spPr>
+            <a:xfrm>
+              <a:off x="9201151" y="2424115"/>
+              <a:ext cx="1200150" cy="504824"/>
+            </a:xfrm>
+            <a:prstGeom prst="rect">
+              <a:avLst/>
+            </a:prstGeom>
+            <a:solidFill>
+              <a:schemeClr val="bg1"/>
+            </a:solidFill>
+            <a:ln>
+              <a:solidFill>
+                <a:schemeClr val="accent4"/>
+              </a:solidFill>
+            </a:ln>
+          </p:spPr>
+          <p:style>
+            <a:lnRef idx="2">
+              <a:schemeClr val="accent1">
+                <a:shade val="50000"/>
+              </a:schemeClr>
+            </a:lnRef>
+            <a:fillRef idx="1">
+              <a:schemeClr val="accent1"/>
+            </a:fillRef>
+            <a:effectRef idx="0">
+              <a:schemeClr val="accent1"/>
+            </a:effectRef>
+            <a:fontRef idx="minor">
+              <a:schemeClr val="lt1"/>
+            </a:fontRef>
+          </p:style>
+          <p:txBody>
+            <a:bodyPr rtlCol="0" anchor="t"/>
+            <a:lstStyle/>
+            <a:p>
+              <a:endParaRPr lang="es-ES" sz="1200" dirty="0">
+                <a:solidFill>
+                  <a:schemeClr val="tx1"/>
+                </a:solidFill>
+              </a:endParaRPr>
+            </a:p>
+          </p:txBody>
+        </p:sp>
+        <p:sp>
+          <p:nvSpPr>
+            <p:cNvPr id="12" name="Rectángulo 11"/>
+            <p:cNvSpPr/>
+            <p:nvPr/>
+          </p:nvSpPr>
+          <p:spPr>
+            <a:xfrm>
+              <a:off x="10401301" y="2424115"/>
+              <a:ext cx="952499" cy="504824"/>
+            </a:xfrm>
+            <a:prstGeom prst="rect">
+              <a:avLst/>
+            </a:prstGeom>
+            <a:solidFill>
+              <a:schemeClr val="bg1"/>
+            </a:solidFill>
+            <a:ln>
+              <a:solidFill>
+                <a:schemeClr val="accent4"/>
+              </a:solidFill>
+            </a:ln>
+          </p:spPr>
+          <p:style>
+            <a:lnRef idx="2">
+              <a:schemeClr val="accent1">
+                <a:shade val="50000"/>
+              </a:schemeClr>
+            </a:lnRef>
+            <a:fillRef idx="1">
+              <a:schemeClr val="accent1"/>
+            </a:fillRef>
+            <a:effectRef idx="0">
+              <a:schemeClr val="accent1"/>
+            </a:effectRef>
+            <a:fontRef idx="minor">
+              <a:schemeClr val="lt1"/>
+            </a:fontRef>
+          </p:style>
+          <p:txBody>
+            <a:bodyPr rtlCol="0" anchor="ctr"/>
+            <a:lstStyle/>
+            <a:p>
+              <a:r>
+                <a:rPr lang="es-ES" sz="1200" dirty="0" smtClean="0">
+                  <a:solidFill>
+                    <a:schemeClr val="tx1"/>
+                  </a:solidFill>
+                </a:rPr>
+                <a:t>12/01/2014</a:t>
+              </a:r>
+              <a:endParaRPr lang="es-ES" sz="1200" dirty="0">
+                <a:solidFill>
+                  <a:schemeClr val="tx1"/>
+                </a:solidFill>
+              </a:endParaRPr>
+            </a:p>
+          </p:txBody>
+        </p:sp>
+      </p:grpSp>
+      <p:grpSp>
+        <p:nvGrpSpPr>
+          <p:cNvPr id="14" name="Grupo 13"/>
+          <p:cNvGrpSpPr/>
+          <p:nvPr/>
+        </p:nvGrpSpPr>
+        <p:grpSpPr>
+          <a:xfrm>
+            <a:off x="4124324" y="3952886"/>
+            <a:ext cx="7124700" cy="504824"/>
+            <a:chOff x="4229100" y="2424115"/>
+            <a:chExt cx="7124700" cy="504824"/>
+          </a:xfrm>
+        </p:grpSpPr>
+        <p:sp>
+          <p:nvSpPr>
+            <p:cNvPr id="15" name="Rectángulo 14"/>
+            <p:cNvSpPr/>
+            <p:nvPr/>
+          </p:nvSpPr>
+          <p:spPr>
+            <a:xfrm>
+              <a:off x="4229100" y="2424115"/>
+              <a:ext cx="842963" cy="504824"/>
+            </a:xfrm>
+            <a:prstGeom prst="rect">
+              <a:avLst/>
+            </a:prstGeom>
+            <a:solidFill>
+              <a:schemeClr val="bg1"/>
+            </a:solidFill>
+            <a:ln>
+              <a:solidFill>
+                <a:schemeClr val="accent4"/>
+              </a:solidFill>
+            </a:ln>
+          </p:spPr>
+          <p:style>
+            <a:lnRef idx="2">
+              <a:schemeClr val="accent1">
+                <a:shade val="50000"/>
+              </a:schemeClr>
+            </a:lnRef>
+            <a:fillRef idx="1">
+              <a:schemeClr val="accent1"/>
+            </a:fillRef>
+            <a:effectRef idx="0">
+              <a:schemeClr val="accent1"/>
+            </a:effectRef>
+            <a:fontRef idx="minor">
+              <a:schemeClr val="lt1"/>
+            </a:fontRef>
+          </p:style>
+          <p:txBody>
+            <a:bodyPr rtlCol="0" anchor="ctr"/>
+            <a:lstStyle/>
+            <a:p>
+              <a:pPr algn="ctr"/>
+              <a:r>
+                <a:rPr lang="es-ES" sz="1200" dirty="0" smtClean="0">
+                  <a:solidFill>
+                    <a:schemeClr val="tx1"/>
+                  </a:solidFill>
+                </a:rPr>
+                <a:t>00001</a:t>
+              </a:r>
+              <a:endParaRPr lang="es-ES" sz="1200" dirty="0">
+                <a:solidFill>
+                  <a:schemeClr val="tx1"/>
+                </a:solidFill>
+              </a:endParaRPr>
+            </a:p>
+          </p:txBody>
+        </p:sp>
+        <p:sp>
+          <p:nvSpPr>
+            <p:cNvPr id="16" name="Rectángulo 15"/>
+            <p:cNvSpPr/>
+            <p:nvPr/>
+          </p:nvSpPr>
+          <p:spPr>
+            <a:xfrm>
+              <a:off x="5072063" y="2424115"/>
+              <a:ext cx="2928937" cy="504824"/>
+            </a:xfrm>
+            <a:prstGeom prst="rect">
+              <a:avLst/>
+            </a:prstGeom>
+            <a:solidFill>
+              <a:schemeClr val="bg1"/>
+            </a:solidFill>
+            <a:ln>
+              <a:solidFill>
+                <a:schemeClr val="accent4"/>
+              </a:solidFill>
+            </a:ln>
+          </p:spPr>
+          <p:style>
+            <a:lnRef idx="2">
+              <a:schemeClr val="accent1">
+                <a:shade val="50000"/>
+              </a:schemeClr>
+            </a:lnRef>
+            <a:fillRef idx="1">
+              <a:schemeClr val="accent1"/>
+            </a:fillRef>
+            <a:effectRef idx="0">
+              <a:schemeClr val="accent1"/>
+            </a:effectRef>
+            <a:fontRef idx="minor">
+              <a:schemeClr val="lt1"/>
+            </a:fontRef>
+          </p:style>
+          <p:txBody>
+            <a:bodyPr rtlCol="0" anchor="t"/>
+            <a:lstStyle/>
+            <a:p>
+              <a:r>
+                <a:rPr lang="es-ES" sz="1200" b="1" dirty="0" smtClean="0">
+                  <a:solidFill>
+                    <a:schemeClr val="tx1"/>
+                  </a:solidFill>
+                </a:rPr>
+                <a:t>Aprobar nueva currícula</a:t>
+              </a:r>
+              <a:r>
+                <a:rPr lang="es-ES" sz="1200" dirty="0" smtClean="0">
+                  <a:solidFill>
+                    <a:schemeClr val="tx1"/>
+                  </a:solidFill>
+                </a:rPr>
+                <a:t/>
+              </a:r>
+              <a:br>
+                <a:rPr lang="es-ES" sz="1200" dirty="0" smtClean="0">
+                  <a:solidFill>
+                    <a:schemeClr val="tx1"/>
+                  </a:solidFill>
+                </a:rPr>
+              </a:br>
+              <a:r>
+                <a:rPr lang="es-ES" sz="1200" dirty="0" smtClean="0">
+                  <a:solidFill>
+                    <a:schemeClr val="tx1"/>
+                  </a:solidFill>
+                </a:rPr>
+                <a:t>[ </a:t>
+              </a:r>
+              <a:r>
+                <a:rPr lang="es-ES" sz="1200" u="sng" dirty="0" smtClean="0">
+                  <a:solidFill>
+                    <a:schemeClr val="accent1">
+                      <a:lumMod val="75000"/>
+                    </a:schemeClr>
+                  </a:solidFill>
+                </a:rPr>
+                <a:t>Auto asignar</a:t>
+              </a:r>
+              <a:r>
+                <a:rPr lang="es-ES" sz="1200" dirty="0" smtClean="0">
+                  <a:solidFill>
+                    <a:schemeClr val="tx1"/>
+                  </a:solidFill>
+                </a:rPr>
+                <a:t> ] [ </a:t>
+              </a:r>
+              <a:r>
+                <a:rPr lang="es-ES" sz="1200" u="sng" dirty="0">
+                  <a:solidFill>
+                    <a:schemeClr val="accent1">
+                      <a:lumMod val="75000"/>
+                    </a:schemeClr>
+                  </a:solidFill>
+                </a:rPr>
+                <a:t>Liberar</a:t>
+              </a:r>
+              <a:r>
+                <a:rPr lang="es-ES" sz="1200" dirty="0" smtClean="0">
+                  <a:solidFill>
+                    <a:schemeClr val="tx1"/>
+                  </a:solidFill>
+                </a:rPr>
+                <a:t> ] [ </a:t>
+              </a:r>
+              <a:r>
+                <a:rPr lang="es-ES" sz="1200" u="sng" dirty="0">
+                  <a:solidFill>
+                    <a:schemeClr val="accent1">
+                      <a:lumMod val="75000"/>
+                    </a:schemeClr>
+                  </a:solidFill>
+                </a:rPr>
+                <a:t>Ejecutar</a:t>
+              </a:r>
+              <a:r>
+                <a:rPr lang="es-ES" sz="1200" dirty="0" smtClean="0">
+                  <a:solidFill>
+                    <a:schemeClr val="tx1"/>
+                  </a:solidFill>
+                </a:rPr>
+                <a:t> ]</a:t>
+              </a:r>
+              <a:endParaRPr lang="es-ES" sz="1200" dirty="0">
+                <a:solidFill>
+                  <a:schemeClr val="tx1"/>
+                </a:solidFill>
+              </a:endParaRPr>
+            </a:p>
+          </p:txBody>
+        </p:sp>
+        <p:sp>
+          <p:nvSpPr>
+            <p:cNvPr id="17" name="Rectángulo 16"/>
+            <p:cNvSpPr/>
+            <p:nvPr/>
+          </p:nvSpPr>
+          <p:spPr>
+            <a:xfrm>
+              <a:off x="8001001" y="2424115"/>
+              <a:ext cx="1200150" cy="504824"/>
+            </a:xfrm>
+            <a:prstGeom prst="rect">
+              <a:avLst/>
+            </a:prstGeom>
+            <a:solidFill>
+              <a:schemeClr val="bg1"/>
+            </a:solidFill>
+            <a:ln>
+              <a:solidFill>
+                <a:schemeClr val="accent4"/>
+              </a:solidFill>
+            </a:ln>
+          </p:spPr>
+          <p:style>
+            <a:lnRef idx="2">
+              <a:schemeClr val="accent1">
+                <a:shade val="50000"/>
+              </a:schemeClr>
+            </a:lnRef>
+            <a:fillRef idx="1">
+              <a:schemeClr val="accent1"/>
+            </a:fillRef>
+            <a:effectRef idx="0">
+              <a:schemeClr val="accent1"/>
+            </a:effectRef>
+            <a:fontRef idx="minor">
+              <a:schemeClr val="lt1"/>
+            </a:fontRef>
+          </p:style>
+          <p:txBody>
+            <a:bodyPr rtlCol="0" anchor="ctr"/>
+            <a:lstStyle/>
+            <a:p>
+              <a:pPr algn="ctr"/>
+              <a:r>
+                <a:rPr lang="es-ES" sz="1200" dirty="0" smtClean="0">
+                  <a:solidFill>
+                    <a:schemeClr val="tx1"/>
+                  </a:solidFill>
+                </a:rPr>
+                <a:t>jperez</a:t>
+              </a:r>
+              <a:endParaRPr lang="es-ES" sz="1200" dirty="0">
+                <a:solidFill>
+                  <a:schemeClr val="tx1"/>
+                </a:solidFill>
+              </a:endParaRPr>
+            </a:p>
+          </p:txBody>
+        </p:sp>
+        <p:sp>
+          <p:nvSpPr>
+            <p:cNvPr id="18" name="Rectángulo 17"/>
+            <p:cNvSpPr/>
+            <p:nvPr/>
+          </p:nvSpPr>
+          <p:spPr>
+            <a:xfrm>
+              <a:off x="9201151" y="2424115"/>
+              <a:ext cx="1200150" cy="504824"/>
+            </a:xfrm>
+            <a:prstGeom prst="rect">
+              <a:avLst/>
+            </a:prstGeom>
+            <a:solidFill>
+              <a:schemeClr val="bg1"/>
+            </a:solidFill>
+            <a:ln>
+              <a:solidFill>
+                <a:schemeClr val="accent4"/>
+              </a:solidFill>
+            </a:ln>
+          </p:spPr>
+          <p:style>
+            <a:lnRef idx="2">
+              <a:schemeClr val="accent1">
+                <a:shade val="50000"/>
+              </a:schemeClr>
+            </a:lnRef>
+            <a:fillRef idx="1">
+              <a:schemeClr val="accent1"/>
+            </a:fillRef>
+            <a:effectRef idx="0">
+              <a:schemeClr val="accent1"/>
+            </a:effectRef>
+            <a:fontRef idx="minor">
+              <a:schemeClr val="lt1"/>
+            </a:fontRef>
+          </p:style>
+          <p:txBody>
+            <a:bodyPr rtlCol="0" anchor="ctr"/>
+            <a:lstStyle/>
+            <a:p>
+              <a:pPr algn="ctr"/>
+              <a:r>
+                <a:rPr lang="es-ES" sz="1200" dirty="0" smtClean="0">
+                  <a:solidFill>
+                    <a:schemeClr val="tx1"/>
+                  </a:solidFill>
+                </a:rPr>
+                <a:t>ianache</a:t>
+              </a:r>
+              <a:endParaRPr lang="es-ES" sz="1200" dirty="0">
+                <a:solidFill>
+                  <a:schemeClr val="tx1"/>
+                </a:solidFill>
+              </a:endParaRPr>
+            </a:p>
+          </p:txBody>
+        </p:sp>
+        <p:sp>
+          <p:nvSpPr>
+            <p:cNvPr id="19" name="Rectángulo 18"/>
+            <p:cNvSpPr/>
+            <p:nvPr/>
+          </p:nvSpPr>
+          <p:spPr>
+            <a:xfrm>
+              <a:off x="10401301" y="2424115"/>
+              <a:ext cx="952499" cy="504824"/>
+            </a:xfrm>
+            <a:prstGeom prst="rect">
+              <a:avLst/>
+            </a:prstGeom>
+            <a:solidFill>
+              <a:schemeClr val="bg1"/>
+            </a:solidFill>
+            <a:ln>
+              <a:solidFill>
+                <a:schemeClr val="accent4"/>
+              </a:solidFill>
+            </a:ln>
+          </p:spPr>
+          <p:style>
+            <a:lnRef idx="2">
+              <a:schemeClr val="accent1">
+                <a:shade val="50000"/>
+              </a:schemeClr>
+            </a:lnRef>
+            <a:fillRef idx="1">
+              <a:schemeClr val="accent1"/>
+            </a:fillRef>
+            <a:effectRef idx="0">
+              <a:schemeClr val="accent1"/>
+            </a:effectRef>
+            <a:fontRef idx="minor">
+              <a:schemeClr val="lt1"/>
+            </a:fontRef>
+          </p:style>
+          <p:txBody>
+            <a:bodyPr rtlCol="0" anchor="ctr"/>
+            <a:lstStyle/>
+            <a:p>
+              <a:r>
+                <a:rPr lang="es-ES" sz="1200" dirty="0" smtClean="0">
+                  <a:solidFill>
+                    <a:schemeClr val="tx1"/>
+                  </a:solidFill>
+                </a:rPr>
+                <a:t>12/04/2014</a:t>
+              </a:r>
+              <a:endParaRPr lang="es-ES" sz="1200" dirty="0">
+                <a:solidFill>
+                  <a:schemeClr val="tx1"/>
+                </a:solidFill>
+              </a:endParaRPr>
+            </a:p>
+          </p:txBody>
+        </p:sp>
+      </p:grpSp>
+      <p:sp>
+        <p:nvSpPr>
+          <p:cNvPr id="22" name="Rectángulo redondeado 21"/>
+          <p:cNvSpPr/>
+          <p:nvPr/>
+        </p:nvSpPr>
+        <p:spPr>
+          <a:xfrm>
+            <a:off x="10448924" y="2776539"/>
+            <a:ext cx="800100" cy="257175"/>
+          </a:xfrm>
+          <a:prstGeom prst="roundRect">
+            <a:avLst/>
+          </a:prstGeom>
+          <a:solidFill>
+            <a:schemeClr val="accent4">
+              <a:lumMod val="60000"/>
+              <a:lumOff val="40000"/>
+            </a:schemeClr>
+          </a:solidFill>
+          <a:ln>
+            <a:noFill/>
+          </a:ln>
+        </p:spPr>
+        <p:style>
+          <a:lnRef idx="2">
+            <a:schemeClr val="accent1">
+              <a:shade val="50000"/>
+            </a:schemeClr>
+          </a:lnRef>
+          <a:fillRef idx="1">
+            <a:schemeClr val="accent1"/>
+          </a:fillRef>
+          <a:effectRef idx="0">
+            <a:schemeClr val="accent1"/>
+          </a:effectRef>
+          <a:fontRef idx="minor">
+            <a:schemeClr val="lt1"/>
+          </a:fontRef>
+        </p:style>
+        <p:txBody>
+          <a:bodyPr rot="0" spcFirstLastPara="0" vertOverflow="overflow" horzOverflow="overflow" vert="horz" wrap="square" lIns="91440" tIns="45720" rIns="91440" bIns="45720" numCol="1" spcCol="0" rtlCol="0" fromWordArt="0" anchor="ctr" anchorCtr="0" forceAA="0" compatLnSpc="1">
+            <a:prstTxWarp prst="textNoShape">
+              <a:avLst/>
+            </a:prstTxWarp>
+            <a:noAutofit/>
+          </a:bodyPr>
+          <a:lstStyle/>
+          <a:p>
+            <a:pPr algn="ctr"/>
+            <a:r>
+              <a:rPr lang="es-ES" sz="1200" dirty="0">
+                <a:solidFill>
+                  <a:schemeClr val="tx1"/>
+                </a:solidFill>
+              </a:rPr>
+              <a:t>New task</a:t>
+            </a:r>
+          </a:p>
+        </p:txBody>
+      </p:sp>
+      <p:grpSp>
+        <p:nvGrpSpPr>
+          <p:cNvPr id="27" name="Grupo 26"/>
+          <p:cNvGrpSpPr/>
+          <p:nvPr/>
+        </p:nvGrpSpPr>
+        <p:grpSpPr>
+          <a:xfrm>
+            <a:off x="4124324" y="2776538"/>
+            <a:ext cx="2421732" cy="257175"/>
+            <a:chOff x="2571750" y="4100513"/>
+            <a:chExt cx="2421732" cy="257175"/>
+          </a:xfrm>
+        </p:grpSpPr>
+        <p:sp>
+          <p:nvSpPr>
+            <p:cNvPr id="23" name="Rectángulo redondeado 22"/>
+            <p:cNvSpPr/>
+            <p:nvPr/>
+          </p:nvSpPr>
+          <p:spPr>
+            <a:xfrm>
+              <a:off x="3464719" y="4100513"/>
+              <a:ext cx="642938" cy="257175"/>
+            </a:xfrm>
+            <a:prstGeom prst="roundRect">
+              <a:avLst/>
+            </a:prstGeom>
+            <a:solidFill>
+              <a:schemeClr val="accent4">
+                <a:lumMod val="60000"/>
+                <a:lumOff val="40000"/>
+              </a:schemeClr>
+            </a:solidFill>
+            <a:ln>
+              <a:noFill/>
+            </a:ln>
+          </p:spPr>
+          <p:style>
+            <a:lnRef idx="2">
+              <a:schemeClr val="accent1">
+                <a:shade val="50000"/>
+              </a:schemeClr>
+            </a:lnRef>
+            <a:fillRef idx="1">
+              <a:schemeClr val="accent1"/>
+            </a:fillRef>
+            <a:effectRef idx="0">
+              <a:schemeClr val="accent1"/>
+            </a:effectRef>
+            <a:fontRef idx="minor">
+              <a:schemeClr val="lt1"/>
+            </a:fontRef>
+          </p:style>
+          <p:txBody>
+            <a:bodyPr rot="0" spcFirstLastPara="0" vertOverflow="overflow" horzOverflow="overflow" vert="horz" wrap="square" lIns="91440" tIns="45720" rIns="91440" bIns="45720" numCol="1" spcCol="0" rtlCol="0" fromWordArt="0" anchor="ctr" anchorCtr="0" forceAA="0" compatLnSpc="1">
+              <a:prstTxWarp prst="textNoShape">
+                <a:avLst/>
+              </a:prstTxWarp>
+              <a:noAutofit/>
+            </a:bodyPr>
+            <a:lstStyle/>
+            <a:p>
+              <a:pPr algn="ctr"/>
+              <a:r>
+                <a:rPr lang="es-ES" sz="1200" dirty="0" smtClean="0">
+                  <a:solidFill>
+                    <a:schemeClr val="tx1"/>
+                  </a:solidFill>
+                </a:rPr>
+                <a:t>Table</a:t>
+              </a:r>
+              <a:endParaRPr lang="es-ES" sz="1200" dirty="0">
+                <a:solidFill>
+                  <a:schemeClr val="tx1"/>
+                </a:solidFill>
+              </a:endParaRPr>
+            </a:p>
+          </p:txBody>
+        </p:sp>
+        <p:sp>
+          <p:nvSpPr>
+            <p:cNvPr id="24" name="Rectángulo redondeado 23"/>
+            <p:cNvSpPr/>
+            <p:nvPr/>
+          </p:nvSpPr>
+          <p:spPr>
+            <a:xfrm>
+              <a:off x="4229100" y="4100513"/>
+              <a:ext cx="764382" cy="257175"/>
+            </a:xfrm>
+            <a:prstGeom prst="roundRect">
+              <a:avLst/>
+            </a:prstGeom>
+            <a:solidFill>
+              <a:schemeClr val="accent4">
+                <a:lumMod val="60000"/>
+                <a:lumOff val="40000"/>
+              </a:schemeClr>
+            </a:solidFill>
+            <a:ln>
+              <a:noFill/>
+            </a:ln>
+          </p:spPr>
+          <p:style>
+            <a:lnRef idx="2">
+              <a:schemeClr val="accent1">
+                <a:shade val="50000"/>
+              </a:schemeClr>
+            </a:lnRef>
+            <a:fillRef idx="1">
+              <a:schemeClr val="accent1"/>
+            </a:fillRef>
+            <a:effectRef idx="0">
+              <a:schemeClr val="accent1"/>
+            </a:effectRef>
+            <a:fontRef idx="minor">
+              <a:schemeClr val="lt1"/>
+            </a:fontRef>
+          </p:style>
+          <p:txBody>
+            <a:bodyPr rot="0" spcFirstLastPara="0" vertOverflow="overflow" horzOverflow="overflow" vert="horz" wrap="square" lIns="91440" tIns="45720" rIns="91440" bIns="45720" numCol="1" spcCol="0" rtlCol="0" fromWordArt="0" anchor="ctr" anchorCtr="0" forceAA="0" compatLnSpc="1">
+              <a:prstTxWarp prst="textNoShape">
+                <a:avLst/>
+              </a:prstTxWarp>
+              <a:noAutofit/>
+            </a:bodyPr>
+            <a:lstStyle/>
+            <a:p>
+              <a:pPr algn="ctr"/>
+              <a:r>
+                <a:rPr lang="es-ES" sz="1200" dirty="0" smtClean="0">
+                  <a:solidFill>
+                    <a:schemeClr val="tx1"/>
+                  </a:solidFill>
+                </a:rPr>
+                <a:t>Calendar</a:t>
+              </a:r>
+              <a:endParaRPr lang="es-ES" sz="1200" dirty="0">
+                <a:solidFill>
+                  <a:schemeClr val="tx1"/>
+                </a:solidFill>
+              </a:endParaRPr>
+            </a:p>
+          </p:txBody>
+        </p:sp>
+        <p:sp>
+          <p:nvSpPr>
+            <p:cNvPr id="26" name="Rectángulo 25"/>
+            <p:cNvSpPr/>
+            <p:nvPr/>
+          </p:nvSpPr>
+          <p:spPr>
+            <a:xfrm>
+              <a:off x="2571750" y="4100513"/>
+              <a:ext cx="842963" cy="257175"/>
+            </a:xfrm>
+            <a:prstGeom prst="rect">
+              <a:avLst/>
+            </a:prstGeom>
+            <a:solidFill>
+              <a:schemeClr val="bg1"/>
+            </a:solidFill>
+            <a:ln>
+              <a:noFill/>
+            </a:ln>
+          </p:spPr>
+          <p:style>
+            <a:lnRef idx="2">
+              <a:schemeClr val="accent1">
+                <a:shade val="50000"/>
+              </a:schemeClr>
+            </a:lnRef>
+            <a:fillRef idx="1">
+              <a:schemeClr val="accent1"/>
+            </a:fillRef>
+            <a:effectRef idx="0">
+              <a:schemeClr val="accent1"/>
+            </a:effectRef>
+            <a:fontRef idx="minor">
+              <a:schemeClr val="lt1"/>
+            </a:fontRef>
+          </p:style>
+          <p:txBody>
+            <a:bodyPr rtlCol="0" anchor="ctr"/>
+            <a:lstStyle/>
+            <a:p>
+              <a:pPr algn="r"/>
+              <a:r>
+                <a:rPr lang="es-ES" sz="1200" b="1" dirty="0" smtClean="0">
+                  <a:solidFill>
+                    <a:schemeClr val="tx1"/>
+                  </a:solidFill>
+                </a:rPr>
+                <a:t>View as:</a:t>
+              </a:r>
+              <a:endParaRPr lang="es-ES" sz="1200" b="1" dirty="0">
+                <a:solidFill>
+                  <a:schemeClr val="tx1"/>
+                </a:solidFill>
+              </a:endParaRPr>
+            </a:p>
+          </p:txBody>
+        </p:sp>
+      </p:grpSp>
+      <p:sp>
+        <p:nvSpPr>
+          <p:cNvPr id="28" name="Rectángulo redondeado 27"/>
+          <p:cNvSpPr/>
+          <p:nvPr/>
+        </p:nvSpPr>
+        <p:spPr>
+          <a:xfrm>
+            <a:off x="838201" y="2371726"/>
+            <a:ext cx="3014662" cy="3857624"/>
+          </a:xfrm>
+          <a:prstGeom prst="roundRect">
+            <a:avLst>
+              <a:gd name="adj" fmla="val 4691"/>
+            </a:avLst>
+          </a:prstGeom>
+          <a:noFill/>
+          <a:ln>
+            <a:solidFill>
+              <a:schemeClr val="accent4">
+                <a:lumMod val="60000"/>
+                <a:lumOff val="40000"/>
+              </a:schemeClr>
+            </a:solidFill>
+          </a:ln>
+        </p:spPr>
+        <p:style>
+          <a:lnRef idx="2">
+            <a:schemeClr val="accent1">
+              <a:shade val="50000"/>
+            </a:schemeClr>
+          </a:lnRef>
+          <a:fillRef idx="1">
+            <a:schemeClr val="accent1"/>
+          </a:fillRef>
+          <a:effectRef idx="0">
+            <a:schemeClr val="accent1"/>
+          </a:effectRef>
+          <a:fontRef idx="minor">
+            <a:schemeClr val="lt1"/>
+          </a:fontRef>
+        </p:style>
+        <p:txBody>
+          <a:bodyPr rtlCol="0" anchor="ctr"/>
+          <a:lstStyle/>
+          <a:p>
+            <a:pPr algn="ctr"/>
+            <a:r>
+              <a:rPr lang="es-ES" dirty="0" smtClean="0">
+                <a:solidFill>
+                  <a:schemeClr val="tx1"/>
+                </a:solidFill>
+              </a:rPr>
+              <a:t>[</a:t>
+            </a:r>
+            <a:r>
+              <a:rPr lang="es-ES" dirty="0" err="1" smtClean="0">
+                <a:solidFill>
+                  <a:schemeClr val="tx1"/>
+                </a:solidFill>
+              </a:rPr>
+              <a:t>Análiticas</a:t>
+            </a:r>
+            <a:r>
+              <a:rPr lang="es-ES" dirty="0" smtClean="0">
+                <a:solidFill>
+                  <a:schemeClr val="tx1"/>
+                </a:solidFill>
+              </a:rPr>
+              <a:t> de Trabajo]</a:t>
+            </a:r>
+            <a:endParaRPr lang="es-ES" dirty="0">
+              <a:solidFill>
+                <a:schemeClr val="tx1"/>
+              </a:solidFill>
+            </a:endParaRPr>
+          </a:p>
+        </p:txBody>
+      </p:sp>
+      <p:sp>
+        <p:nvSpPr>
+          <p:cNvPr id="29" name="Rectángulo 28"/>
+          <p:cNvSpPr/>
+          <p:nvPr/>
+        </p:nvSpPr>
+        <p:spPr>
+          <a:xfrm>
+            <a:off x="838200" y="1528763"/>
+            <a:ext cx="3014663" cy="642937"/>
+          </a:xfrm>
+          <a:prstGeom prst="rect">
+            <a:avLst/>
+          </a:prstGeom>
+          <a:solidFill>
+            <a:schemeClr val="accent4"/>
+          </a:solidFill>
+          <a:ln>
+            <a:noFill/>
+          </a:ln>
+        </p:spPr>
+        <p:style>
+          <a:lnRef idx="2">
+            <a:schemeClr val="accent1">
+              <a:shade val="50000"/>
+            </a:schemeClr>
+          </a:lnRef>
+          <a:fillRef idx="1">
+            <a:schemeClr val="accent1"/>
+          </a:fillRef>
+          <a:effectRef idx="0">
+            <a:schemeClr val="accent1"/>
+          </a:effectRef>
+          <a:fontRef idx="minor">
+            <a:schemeClr val="lt1"/>
+          </a:fontRef>
+        </p:style>
+        <p:txBody>
+          <a:bodyPr rtlCol="0" anchor="ctr"/>
+          <a:lstStyle/>
+          <a:p>
+            <a:pPr algn="ctr"/>
+            <a:r>
+              <a:rPr lang="es-ES" dirty="0" smtClean="0"/>
+              <a:t>[ LOGO ]</a:t>
+            </a:r>
+            <a:endParaRPr lang="es-ES" dirty="0"/>
+          </a:p>
+        </p:txBody>
+      </p:sp>
+      <p:sp>
+        <p:nvSpPr>
+          <p:cNvPr id="30" name="Rectángulo 29"/>
+          <p:cNvSpPr/>
+          <p:nvPr/>
+        </p:nvSpPr>
+        <p:spPr>
+          <a:xfrm>
+            <a:off x="3852863" y="1528762"/>
+            <a:ext cx="7500937" cy="642937"/>
+          </a:xfrm>
+          <a:prstGeom prst="rect">
+            <a:avLst/>
+          </a:prstGeom>
+          <a:solidFill>
+            <a:schemeClr val="accent4"/>
+          </a:solidFill>
+          <a:ln>
+            <a:noFill/>
+          </a:ln>
+        </p:spPr>
+        <p:style>
+          <a:lnRef idx="2">
+            <a:schemeClr val="accent1">
+              <a:shade val="50000"/>
+            </a:schemeClr>
+          </a:lnRef>
+          <a:fillRef idx="1">
+            <a:schemeClr val="accent1"/>
+          </a:fillRef>
+          <a:effectRef idx="0">
+            <a:schemeClr val="accent1"/>
+          </a:effectRef>
+          <a:fontRef idx="minor">
+            <a:schemeClr val="lt1"/>
+          </a:fontRef>
+        </p:style>
+        <p:txBody>
+          <a:bodyPr rtlCol="0" anchor="ctr"/>
+          <a:lstStyle/>
+          <a:p>
+            <a:pPr algn="r"/>
+            <a:r>
+              <a:rPr lang="es-ES" sz="1400" dirty="0" err="1" smtClean="0"/>
+              <a:t>Welcome</a:t>
+            </a:r>
+            <a:r>
+              <a:rPr lang="es-ES" sz="1400" dirty="0" smtClean="0"/>
+              <a:t> “</a:t>
+            </a:r>
+            <a:r>
+              <a:rPr lang="es-ES" sz="1400" u="sng" dirty="0" smtClean="0">
+                <a:solidFill>
+                  <a:schemeClr val="accent1">
+                    <a:lumMod val="75000"/>
+                  </a:schemeClr>
+                </a:solidFill>
+              </a:rPr>
+              <a:t>ianache</a:t>
+            </a:r>
+            <a:r>
+              <a:rPr lang="es-ES" sz="1400" dirty="0" smtClean="0"/>
+              <a:t>” </a:t>
+            </a:r>
+            <a:r>
+              <a:rPr lang="es-ES" sz="1400" dirty="0"/>
+              <a:t>| </a:t>
+            </a:r>
+            <a:r>
+              <a:rPr lang="es-ES" sz="1400" u="sng" dirty="0" smtClean="0">
+                <a:solidFill>
+                  <a:schemeClr val="accent1">
+                    <a:lumMod val="75000"/>
+                  </a:schemeClr>
+                </a:solidFill>
+              </a:rPr>
+              <a:t>Administración</a:t>
+            </a:r>
+            <a:r>
+              <a:rPr lang="es-ES" sz="1400" dirty="0" smtClean="0">
+                <a:solidFill>
+                  <a:schemeClr val="accent1">
+                    <a:lumMod val="75000"/>
+                  </a:schemeClr>
+                </a:solidFill>
+              </a:rPr>
+              <a:t> </a:t>
+            </a:r>
+            <a:r>
+              <a:rPr lang="es-ES" sz="1400" dirty="0" smtClean="0"/>
+              <a:t>| </a:t>
+            </a:r>
+            <a:r>
+              <a:rPr lang="es-ES" sz="1400" u="sng" dirty="0" err="1" smtClean="0">
+                <a:solidFill>
+                  <a:schemeClr val="accent1">
+                    <a:lumMod val="75000"/>
+                  </a:schemeClr>
+                </a:solidFill>
+              </a:rPr>
+              <a:t>Logout</a:t>
+            </a:r>
+            <a:endParaRPr lang="es-ES" sz="1400" u="sng" dirty="0">
+              <a:solidFill>
+                <a:schemeClr val="accent1">
+                  <a:lumMod val="75000"/>
+                </a:schemeClr>
+              </a:solidFill>
+            </a:endParaRPr>
+          </a:p>
+        </p:txBody>
+      </p:sp>
+      <p:sp>
+        <p:nvSpPr>
+          <p:cNvPr id="32" name="Rectángulo 31"/>
+          <p:cNvSpPr/>
+          <p:nvPr/>
+        </p:nvSpPr>
+        <p:spPr>
+          <a:xfrm>
+            <a:off x="838200" y="6356750"/>
+            <a:ext cx="10515599" cy="372664"/>
+          </a:xfrm>
+          <a:prstGeom prst="rect">
+            <a:avLst/>
+          </a:prstGeom>
+          <a:solidFill>
+            <a:schemeClr val="bg1"/>
+          </a:solidFill>
+          <a:ln>
+            <a:noFill/>
+          </a:ln>
+        </p:spPr>
+        <p:style>
+          <a:lnRef idx="2">
+            <a:schemeClr val="accent1">
+              <a:shade val="50000"/>
+            </a:schemeClr>
+          </a:lnRef>
+          <a:fillRef idx="1">
+            <a:schemeClr val="accent1"/>
+          </a:fillRef>
+          <a:effectRef idx="0">
+            <a:schemeClr val="accent1"/>
+          </a:effectRef>
+          <a:fontRef idx="minor">
+            <a:schemeClr val="lt1"/>
+          </a:fontRef>
+        </p:style>
+        <p:txBody>
+          <a:bodyPr rtlCol="0" anchor="ctr"/>
+          <a:lstStyle/>
+          <a:p>
+            <a:pPr algn="ctr"/>
+            <a:r>
+              <a:rPr lang="es-ES" sz="1200" dirty="0" smtClean="0">
+                <a:solidFill>
+                  <a:schemeClr val="tx1"/>
+                </a:solidFill>
+              </a:rPr>
+              <a:t>Business </a:t>
+            </a:r>
+            <a:r>
+              <a:rPr lang="es-ES" sz="1200" dirty="0" err="1" smtClean="0">
+                <a:solidFill>
+                  <a:schemeClr val="tx1"/>
+                </a:solidFill>
+              </a:rPr>
+              <a:t>Process</a:t>
+            </a:r>
+            <a:r>
+              <a:rPr lang="es-ES" sz="1200" dirty="0" smtClean="0">
+                <a:solidFill>
+                  <a:schemeClr val="tx1"/>
+                </a:solidFill>
+              </a:rPr>
+              <a:t> Management – Business Task Manager</a:t>
+            </a:r>
+            <a:br>
+              <a:rPr lang="es-ES" sz="1200" dirty="0" smtClean="0">
+                <a:solidFill>
+                  <a:schemeClr val="tx1"/>
+                </a:solidFill>
+              </a:rPr>
+            </a:br>
+            <a:r>
+              <a:rPr lang="es-ES" sz="1200" dirty="0" smtClean="0">
+                <a:solidFill>
+                  <a:schemeClr val="tx1"/>
+                </a:solidFill>
+              </a:rPr>
+              <a:t>Copyright © Evolución del Software 2014</a:t>
+            </a:r>
+            <a:endParaRPr lang="es-ES" sz="1200" dirty="0">
+              <a:solidFill>
+                <a:schemeClr val="tx1"/>
+              </a:solidFill>
+            </a:endParaRPr>
+          </a:p>
+        </p:txBody>
+      </p:sp>
+      <p:grpSp>
+        <p:nvGrpSpPr>
+          <p:cNvPr id="38" name="Grupo 37"/>
+          <p:cNvGrpSpPr/>
+          <p:nvPr/>
+        </p:nvGrpSpPr>
+        <p:grpSpPr>
+          <a:xfrm>
+            <a:off x="9882189" y="4507126"/>
+            <a:ext cx="1366835" cy="342890"/>
+            <a:chOff x="7572375" y="4507126"/>
+            <a:chExt cx="1366835" cy="342890"/>
+          </a:xfrm>
+        </p:grpSpPr>
+        <p:sp>
+          <p:nvSpPr>
+            <p:cNvPr id="34" name="Rectángulo 33"/>
+            <p:cNvSpPr/>
+            <p:nvPr/>
+          </p:nvSpPr>
+          <p:spPr>
+            <a:xfrm>
+              <a:off x="7572375" y="4507126"/>
+              <a:ext cx="323849" cy="342890"/>
+            </a:xfrm>
+            <a:prstGeom prst="rect">
+              <a:avLst/>
+            </a:prstGeom>
+            <a:solidFill>
+              <a:schemeClr val="accent4">
+                <a:lumMod val="60000"/>
+                <a:lumOff val="40000"/>
+              </a:schemeClr>
+            </a:solidFill>
+            <a:ln>
+              <a:noFill/>
+            </a:ln>
+          </p:spPr>
+          <p:style>
+            <a:lnRef idx="2">
+              <a:schemeClr val="accent1">
+                <a:shade val="50000"/>
+              </a:schemeClr>
+            </a:lnRef>
+            <a:fillRef idx="1">
+              <a:schemeClr val="accent1"/>
+            </a:fillRef>
+            <a:effectRef idx="0">
+              <a:schemeClr val="accent1"/>
+            </a:effectRef>
+            <a:fontRef idx="minor">
+              <a:schemeClr val="lt1"/>
+            </a:fontRef>
+          </p:style>
+          <p:txBody>
+            <a:bodyPr rtlCol="0" anchor="ctr"/>
+            <a:lstStyle/>
+            <a:p>
+              <a:pPr algn="ctr"/>
+              <a:r>
+                <a:rPr lang="es-ES" sz="1100" b="1" dirty="0">
+                  <a:solidFill>
+                    <a:schemeClr val="tx1"/>
+                  </a:solidFill>
+                </a:rPr>
+                <a:t>|&lt;</a:t>
+              </a:r>
+            </a:p>
+          </p:txBody>
+        </p:sp>
+        <p:sp>
+          <p:nvSpPr>
+            <p:cNvPr id="35" name="Rectángulo 34"/>
+            <p:cNvSpPr/>
+            <p:nvPr/>
+          </p:nvSpPr>
+          <p:spPr>
+            <a:xfrm>
+              <a:off x="7924800" y="4507126"/>
+              <a:ext cx="323849" cy="342890"/>
+            </a:xfrm>
+            <a:prstGeom prst="rect">
+              <a:avLst/>
+            </a:prstGeom>
+            <a:solidFill>
+              <a:schemeClr val="accent4">
+                <a:lumMod val="60000"/>
+                <a:lumOff val="40000"/>
+              </a:schemeClr>
+            </a:solidFill>
+            <a:ln>
+              <a:noFill/>
+            </a:ln>
+          </p:spPr>
+          <p:style>
+            <a:lnRef idx="2">
+              <a:schemeClr val="accent1">
+                <a:shade val="50000"/>
+              </a:schemeClr>
+            </a:lnRef>
+            <a:fillRef idx="1">
+              <a:schemeClr val="accent1"/>
+            </a:fillRef>
+            <a:effectRef idx="0">
+              <a:schemeClr val="accent1"/>
+            </a:effectRef>
+            <a:fontRef idx="minor">
+              <a:schemeClr val="lt1"/>
+            </a:fontRef>
+          </p:style>
+          <p:txBody>
+            <a:bodyPr rtlCol="0" anchor="ctr"/>
+            <a:lstStyle/>
+            <a:p>
+              <a:pPr algn="ctr"/>
+              <a:r>
+                <a:rPr lang="es-ES" sz="1100" b="1" dirty="0" smtClean="0">
+                  <a:solidFill>
+                    <a:schemeClr val="tx1"/>
+                  </a:solidFill>
+                </a:rPr>
+                <a:t>&lt;</a:t>
+              </a:r>
+              <a:endParaRPr lang="es-ES" sz="1100" b="1" dirty="0">
+                <a:solidFill>
+                  <a:schemeClr val="tx1"/>
+                </a:solidFill>
+              </a:endParaRPr>
+            </a:p>
+          </p:txBody>
+        </p:sp>
+        <p:sp>
+          <p:nvSpPr>
+            <p:cNvPr id="36" name="Rectángulo 35"/>
+            <p:cNvSpPr/>
+            <p:nvPr/>
+          </p:nvSpPr>
+          <p:spPr>
+            <a:xfrm>
+              <a:off x="8262936" y="4507126"/>
+              <a:ext cx="323849" cy="342890"/>
+            </a:xfrm>
+            <a:prstGeom prst="rect">
+              <a:avLst/>
+            </a:prstGeom>
+            <a:solidFill>
+              <a:schemeClr val="accent4">
+                <a:lumMod val="60000"/>
+                <a:lumOff val="40000"/>
+              </a:schemeClr>
+            </a:solidFill>
+            <a:ln>
+              <a:noFill/>
+            </a:ln>
+          </p:spPr>
+          <p:style>
+            <a:lnRef idx="2">
+              <a:schemeClr val="accent1">
+                <a:shade val="50000"/>
+              </a:schemeClr>
+            </a:lnRef>
+            <a:fillRef idx="1">
+              <a:schemeClr val="accent1"/>
+            </a:fillRef>
+            <a:effectRef idx="0">
+              <a:schemeClr val="accent1"/>
+            </a:effectRef>
+            <a:fontRef idx="minor">
+              <a:schemeClr val="lt1"/>
+            </a:fontRef>
+          </p:style>
+          <p:txBody>
+            <a:bodyPr rtlCol="0" anchor="ctr"/>
+            <a:lstStyle/>
+            <a:p>
+              <a:pPr algn="ctr"/>
+              <a:r>
+                <a:rPr lang="es-ES" sz="1100" b="1" dirty="0" smtClean="0">
+                  <a:solidFill>
+                    <a:schemeClr val="tx1"/>
+                  </a:solidFill>
+                </a:rPr>
+                <a:t>&gt;</a:t>
+              </a:r>
+              <a:endParaRPr lang="es-ES" sz="1100" b="1" dirty="0">
+                <a:solidFill>
+                  <a:schemeClr val="tx1"/>
+                </a:solidFill>
+              </a:endParaRPr>
+            </a:p>
+          </p:txBody>
+        </p:sp>
+        <p:sp>
+          <p:nvSpPr>
+            <p:cNvPr id="37" name="Rectángulo 36"/>
+            <p:cNvSpPr/>
+            <p:nvPr/>
+          </p:nvSpPr>
+          <p:spPr>
+            <a:xfrm>
+              <a:off x="8615361" y="4507126"/>
+              <a:ext cx="323849" cy="342890"/>
+            </a:xfrm>
+            <a:prstGeom prst="rect">
+              <a:avLst/>
+            </a:prstGeom>
+            <a:solidFill>
+              <a:schemeClr val="accent4">
+                <a:lumMod val="60000"/>
+                <a:lumOff val="40000"/>
+              </a:schemeClr>
+            </a:solidFill>
+            <a:ln>
+              <a:noFill/>
+            </a:ln>
+          </p:spPr>
+          <p:style>
+            <a:lnRef idx="2">
+              <a:schemeClr val="accent1">
+                <a:shade val="50000"/>
+              </a:schemeClr>
+            </a:lnRef>
+            <a:fillRef idx="1">
+              <a:schemeClr val="accent1"/>
+            </a:fillRef>
+            <a:effectRef idx="0">
+              <a:schemeClr val="accent1"/>
+            </a:effectRef>
+            <a:fontRef idx="minor">
+              <a:schemeClr val="lt1"/>
+            </a:fontRef>
+          </p:style>
+          <p:txBody>
+            <a:bodyPr rtlCol="0" anchor="ctr"/>
+            <a:lstStyle/>
+            <a:p>
+              <a:pPr algn="ctr"/>
+              <a:r>
+                <a:rPr lang="es-ES" sz="1100" b="1" dirty="0" smtClean="0">
+                  <a:solidFill>
+                    <a:schemeClr val="tx1"/>
+                  </a:solidFill>
+                </a:rPr>
+                <a:t>&gt;|</a:t>
+              </a:r>
+              <a:endParaRPr lang="es-ES" sz="1100" b="1" dirty="0">
+                <a:solidFill>
+                  <a:schemeClr val="tx1"/>
+                </a:solidFill>
+              </a:endParaRPr>
+            </a:p>
+          </p:txBody>
+        </p:sp>
+      </p:grpSp>
+    </p:spTree>
+    <p:extLst>
+      <p:ext uri="{BB962C8B-B14F-4D97-AF65-F5344CB8AC3E}">
+        <p14:creationId xmlns:p14="http://schemas.microsoft.com/office/powerpoint/2010/main" val="679399956"/>
       </p:ext>
     </p:extLst>
   </p:cSld>

</xml_diff>

<commit_message>
Ajustes al prototipo del portal
</commit_message>
<xml_diff>
--- a/Diseno/Concepto_Arquitectura.pptx
+++ b/Diseno/Concepto_Arquitectura.pptx
@@ -8268,28 +8268,20 @@
           <a:p>
             <a:pPr algn="ctr"/>
             <a:r>
+              <a:rPr lang="es-ES" smtClean="0">
+                <a:solidFill>
+                  <a:schemeClr val="tx1"/>
+                </a:solidFill>
+              </a:rPr>
+              <a:t>[Analíticas </a:t>
+            </a:r>
+            <a:r>
               <a:rPr lang="es-ES" dirty="0" smtClean="0">
                 <a:solidFill>
                   <a:schemeClr val="tx1"/>
                 </a:solidFill>
               </a:rPr>
-              <a:t>[</a:t>
-            </a:r>
-            <a:r>
-              <a:rPr lang="es-ES" dirty="0" err="1" smtClean="0">
-                <a:solidFill>
-                  <a:schemeClr val="tx1"/>
-                </a:solidFill>
-              </a:rPr>
-              <a:t>Análiticas</a:t>
-            </a:r>
-            <a:r>
-              <a:rPr lang="es-ES" dirty="0" smtClean="0">
-                <a:solidFill>
-                  <a:schemeClr val="tx1"/>
-                </a:solidFill>
-              </a:rPr>
-              <a:t> de Trabajo]</a:t>
+              <a:t>de Trabajo]</a:t>
             </a:r>
             <a:endParaRPr lang="es-ES" dirty="0">
               <a:solidFill>

</xml_diff>

<commit_message>
Ajustes de caso ejemplo al concepto de la arquitectura
</commit_message>
<xml_diff>
--- a/Diseno/Concepto_Arquitectura.pptx
+++ b/Diseno/Concepto_Arquitectura.pptx
@@ -5,7 +5,7 @@
     <p:sldMasterId id="2147483648" r:id="rId1"/>
   </p:sldMasterIdLst>
   <p:notesMasterIdLst>
-    <p:notesMasterId r:id="rId7"/>
+    <p:notesMasterId r:id="rId9"/>
   </p:notesMasterIdLst>
   <p:sldIdLst>
     <p:sldId id="256" r:id="rId2"/>
@@ -13,6 +13,8 @@
     <p:sldId id="258" r:id="rId4"/>
     <p:sldId id="259" r:id="rId5"/>
     <p:sldId id="260" r:id="rId6"/>
+    <p:sldId id="261" r:id="rId7"/>
+    <p:sldId id="262" r:id="rId8"/>
   </p:sldIdLst>
   <p:sldSz cx="12192000" cy="6858000"/>
   <p:notesSz cx="6858000" cy="9144000"/>
@@ -201,7 +203,7 @@
           <a:p>
             <a:fld id="{7ECBDAE4-6EA4-40D6-BCE1-AA6A866A51DC}" type="datetimeFigureOut">
               <a:rPr lang="es-ES" smtClean="0"/>
-              <a:t>20/09/2014</a:t>
+              <a:t>26/09/2014</a:t>
             </a:fld>
             <a:endParaRPr lang="es-ES"/>
           </a:p>
@@ -684,7 +686,7 @@
           <a:p>
             <a:fld id="{254AE216-2258-4313-BE63-3C855658739B}" type="datetimeFigureOut">
               <a:rPr lang="es-ES" smtClean="0"/>
-              <a:t>20/09/2014</a:t>
+              <a:t>26/09/2014</a:t>
             </a:fld>
             <a:endParaRPr lang="es-ES"/>
           </a:p>
@@ -854,7 +856,7 @@
           <a:p>
             <a:fld id="{254AE216-2258-4313-BE63-3C855658739B}" type="datetimeFigureOut">
               <a:rPr lang="es-ES" smtClean="0"/>
-              <a:t>20/09/2014</a:t>
+              <a:t>26/09/2014</a:t>
             </a:fld>
             <a:endParaRPr lang="es-ES"/>
           </a:p>
@@ -1034,7 +1036,7 @@
           <a:p>
             <a:fld id="{254AE216-2258-4313-BE63-3C855658739B}" type="datetimeFigureOut">
               <a:rPr lang="es-ES" smtClean="0"/>
-              <a:t>20/09/2014</a:t>
+              <a:t>26/09/2014</a:t>
             </a:fld>
             <a:endParaRPr lang="es-ES"/>
           </a:p>
@@ -1204,7 +1206,7 @@
           <a:p>
             <a:fld id="{254AE216-2258-4313-BE63-3C855658739B}" type="datetimeFigureOut">
               <a:rPr lang="es-ES" smtClean="0"/>
-              <a:t>20/09/2014</a:t>
+              <a:t>26/09/2014</a:t>
             </a:fld>
             <a:endParaRPr lang="es-ES"/>
           </a:p>
@@ -1450,7 +1452,7 @@
           <a:p>
             <a:fld id="{254AE216-2258-4313-BE63-3C855658739B}" type="datetimeFigureOut">
               <a:rPr lang="es-ES" smtClean="0"/>
-              <a:t>20/09/2014</a:t>
+              <a:t>26/09/2014</a:t>
             </a:fld>
             <a:endParaRPr lang="es-ES"/>
           </a:p>
@@ -1682,7 +1684,7 @@
           <a:p>
             <a:fld id="{254AE216-2258-4313-BE63-3C855658739B}" type="datetimeFigureOut">
               <a:rPr lang="es-ES" smtClean="0"/>
-              <a:t>20/09/2014</a:t>
+              <a:t>26/09/2014</a:t>
             </a:fld>
             <a:endParaRPr lang="es-ES"/>
           </a:p>
@@ -2049,7 +2051,7 @@
           <a:p>
             <a:fld id="{254AE216-2258-4313-BE63-3C855658739B}" type="datetimeFigureOut">
               <a:rPr lang="es-ES" smtClean="0"/>
-              <a:t>20/09/2014</a:t>
+              <a:t>26/09/2014</a:t>
             </a:fld>
             <a:endParaRPr lang="es-ES"/>
           </a:p>
@@ -2167,7 +2169,7 @@
           <a:p>
             <a:fld id="{254AE216-2258-4313-BE63-3C855658739B}" type="datetimeFigureOut">
               <a:rPr lang="es-ES" smtClean="0"/>
-              <a:t>20/09/2014</a:t>
+              <a:t>26/09/2014</a:t>
             </a:fld>
             <a:endParaRPr lang="es-ES"/>
           </a:p>
@@ -2262,7 +2264,7 @@
           <a:p>
             <a:fld id="{254AE216-2258-4313-BE63-3C855658739B}" type="datetimeFigureOut">
               <a:rPr lang="es-ES" smtClean="0"/>
-              <a:t>20/09/2014</a:t>
+              <a:t>26/09/2014</a:t>
             </a:fld>
             <a:endParaRPr lang="es-ES"/>
           </a:p>
@@ -2539,7 +2541,7 @@
           <a:p>
             <a:fld id="{254AE216-2258-4313-BE63-3C855658739B}" type="datetimeFigureOut">
               <a:rPr lang="es-ES" smtClean="0"/>
-              <a:t>20/09/2014</a:t>
+              <a:t>26/09/2014</a:t>
             </a:fld>
             <a:endParaRPr lang="es-ES"/>
           </a:p>
@@ -2792,7 +2794,7 @@
           <a:p>
             <a:fld id="{254AE216-2258-4313-BE63-3C855658739B}" type="datetimeFigureOut">
               <a:rPr lang="es-ES" smtClean="0"/>
-              <a:t>20/09/2014</a:t>
+              <a:t>26/09/2014</a:t>
             </a:fld>
             <a:endParaRPr lang="es-ES"/>
           </a:p>
@@ -3005,7 +3007,7 @@
           <a:p>
             <a:fld id="{254AE216-2258-4313-BE63-3C855658739B}" type="datetimeFigureOut">
               <a:rPr lang="es-ES" smtClean="0"/>
-              <a:t>20/09/2014</a:t>
+              <a:t>26/09/2014</a:t>
             </a:fld>
             <a:endParaRPr lang="es-ES"/>
           </a:p>
@@ -8800,6 +8802,1978 @@
     <p:extLst>
       <p:ext uri="{BB962C8B-B14F-4D97-AF65-F5344CB8AC3E}">
         <p14:creationId xmlns:p14="http://schemas.microsoft.com/office/powerpoint/2010/main" val="679399956"/>
+      </p:ext>
+    </p:extLst>
+  </p:cSld>
+  <p:clrMapOvr>
+    <a:masterClrMapping/>
+  </p:clrMapOvr>
+</p:sld>
+</file>
+
+<file path=ppt/slides/slide6.xml><?xml version="1.0" encoding="utf-8"?>
+<p:sld xmlns:a="http://schemas.openxmlformats.org/drawingml/2006/main" xmlns:r="http://schemas.openxmlformats.org/officeDocument/2006/relationships" xmlns:p="http://schemas.openxmlformats.org/presentationml/2006/main">
+  <p:cSld>
+    <p:spTree>
+      <p:nvGrpSpPr>
+        <p:cNvPr id="1" name=""/>
+        <p:cNvGrpSpPr/>
+        <p:nvPr/>
+      </p:nvGrpSpPr>
+      <p:grpSpPr>
+        <a:xfrm>
+          <a:off x="0" y="0"/>
+          <a:ext cx="0" cy="0"/>
+          <a:chOff x="0" y="0"/>
+          <a:chExt cx="0" cy="0"/>
+        </a:xfrm>
+      </p:grpSpPr>
+      <p:sp>
+        <p:nvSpPr>
+          <p:cNvPr id="2" name="Título 1"/>
+          <p:cNvSpPr>
+            <a:spLocks noGrp="1"/>
+          </p:cNvSpPr>
+          <p:nvPr>
+            <p:ph type="title"/>
+          </p:nvPr>
+        </p:nvSpPr>
+        <p:spPr/>
+        <p:txBody>
+          <a:bodyPr/>
+          <a:lstStyle/>
+          <a:p>
+            <a:r>
+              <a:rPr lang="es-ES" dirty="0" smtClean="0"/>
+              <a:t>Ejemplo: Aplicación – proceso de negocio</a:t>
+            </a:r>
+            <a:endParaRPr lang="es-ES" dirty="0"/>
+          </a:p>
+        </p:txBody>
+      </p:sp>
+      <p:pic>
+        <p:nvPicPr>
+          <p:cNvPr id="3" name="Imagen 2"/>
+          <p:cNvPicPr/>
+          <p:nvPr/>
+        </p:nvPicPr>
+        <p:blipFill>
+          <a:blip r:embed="rId2">
+            <a:extLst>
+              <a:ext uri="{28A0092B-C50C-407E-A947-70E740481C1C}">
+                <a14:useLocalDpi xmlns:a14="http://schemas.microsoft.com/office/drawing/2010/main" val="0"/>
+              </a:ext>
+            </a:extLst>
+          </a:blip>
+          <a:srcRect/>
+          <a:stretch>
+            <a:fillRect/>
+          </a:stretch>
+        </p:blipFill>
+        <p:spPr bwMode="auto">
+          <a:xfrm>
+            <a:off x="838200" y="1416684"/>
+            <a:ext cx="10323195" cy="5084128"/>
+          </a:xfrm>
+          <a:prstGeom prst="rect">
+            <a:avLst/>
+          </a:prstGeom>
+          <a:noFill/>
+          <a:ln>
+            <a:noFill/>
+          </a:ln>
+        </p:spPr>
+      </p:pic>
+    </p:spTree>
+    <p:extLst>
+      <p:ext uri="{BB962C8B-B14F-4D97-AF65-F5344CB8AC3E}">
+        <p14:creationId xmlns:p14="http://schemas.microsoft.com/office/powerpoint/2010/main" val="2696273185"/>
+      </p:ext>
+    </p:extLst>
+  </p:cSld>
+  <p:clrMapOvr>
+    <a:masterClrMapping/>
+  </p:clrMapOvr>
+</p:sld>
+</file>
+
+<file path=ppt/slides/slide7.xml><?xml version="1.0" encoding="utf-8"?>
+<p:sld xmlns:a="http://schemas.openxmlformats.org/drawingml/2006/main" xmlns:r="http://schemas.openxmlformats.org/officeDocument/2006/relationships" xmlns:p="http://schemas.openxmlformats.org/presentationml/2006/main">
+  <p:cSld>
+    <p:spTree>
+      <p:nvGrpSpPr>
+        <p:cNvPr id="1" name=""/>
+        <p:cNvGrpSpPr/>
+        <p:nvPr/>
+      </p:nvGrpSpPr>
+      <p:grpSpPr>
+        <a:xfrm>
+          <a:off x="0" y="0"/>
+          <a:ext cx="0" cy="0"/>
+          <a:chOff x="0" y="0"/>
+          <a:chExt cx="0" cy="0"/>
+        </a:xfrm>
+      </p:grpSpPr>
+      <p:sp>
+        <p:nvSpPr>
+          <p:cNvPr id="2" name="Título 1"/>
+          <p:cNvSpPr>
+            <a:spLocks noGrp="1"/>
+          </p:cNvSpPr>
+          <p:nvPr>
+            <p:ph type="title"/>
+          </p:nvPr>
+        </p:nvSpPr>
+        <p:spPr/>
+        <p:txBody>
+          <a:bodyPr/>
+          <a:lstStyle/>
+          <a:p>
+            <a:r>
+              <a:rPr lang="es-ES" dirty="0" smtClean="0"/>
+              <a:t>Un ejemplo de una </a:t>
+            </a:r>
+            <a:r>
+              <a:rPr lang="es-ES" dirty="0" err="1" smtClean="0"/>
+              <a:t>My</a:t>
+            </a:r>
+            <a:r>
+              <a:rPr lang="es-ES" dirty="0" smtClean="0"/>
+              <a:t> </a:t>
+            </a:r>
+            <a:r>
+              <a:rPr lang="es-ES" dirty="0" err="1" smtClean="0"/>
+              <a:t>Task</a:t>
+            </a:r>
+            <a:r>
+              <a:rPr lang="es-ES" dirty="0" smtClean="0"/>
+              <a:t> </a:t>
+            </a:r>
+            <a:r>
+              <a:rPr lang="es-ES" dirty="0" err="1" smtClean="0"/>
+              <a:t>List</a:t>
+            </a:r>
+            <a:r>
+              <a:rPr lang="es-ES" dirty="0" smtClean="0"/>
+              <a:t>: Alumno</a:t>
+            </a:r>
+            <a:endParaRPr lang="es-ES" dirty="0"/>
+          </a:p>
+        </p:txBody>
+      </p:sp>
+      <p:sp>
+        <p:nvSpPr>
+          <p:cNvPr id="3" name="Rectángulo redondeado 2"/>
+          <p:cNvSpPr/>
+          <p:nvPr/>
+        </p:nvSpPr>
+        <p:spPr>
+          <a:xfrm>
+            <a:off x="2524123" y="1690688"/>
+            <a:ext cx="2062165" cy="369092"/>
+          </a:xfrm>
+          <a:prstGeom prst="roundRect">
+            <a:avLst/>
+          </a:prstGeom>
+          <a:solidFill>
+            <a:schemeClr val="accent4">
+              <a:lumMod val="60000"/>
+              <a:lumOff val="40000"/>
+            </a:schemeClr>
+          </a:solidFill>
+          <a:ln>
+            <a:noFill/>
+          </a:ln>
+        </p:spPr>
+        <p:style>
+          <a:lnRef idx="2">
+            <a:schemeClr val="accent1">
+              <a:shade val="50000"/>
+            </a:schemeClr>
+          </a:lnRef>
+          <a:fillRef idx="1">
+            <a:schemeClr val="accent1"/>
+          </a:fillRef>
+          <a:effectRef idx="0">
+            <a:schemeClr val="accent1"/>
+          </a:effectRef>
+          <a:fontRef idx="minor">
+            <a:schemeClr val="lt1"/>
+          </a:fontRef>
+        </p:style>
+        <p:txBody>
+          <a:bodyPr rtlCol="0" anchor="t"/>
+          <a:lstStyle/>
+          <a:p>
+            <a:pPr algn="ctr"/>
+            <a:r>
+              <a:rPr lang="es-ES" sz="1200" dirty="0" smtClean="0">
+                <a:solidFill>
+                  <a:schemeClr val="tx1"/>
+                </a:solidFill>
+              </a:rPr>
+              <a:t>Business Activity Monitoring</a:t>
+            </a:r>
+            <a:endParaRPr lang="es-ES" sz="1200" dirty="0">
+              <a:solidFill>
+                <a:schemeClr val="tx1"/>
+              </a:solidFill>
+            </a:endParaRPr>
+          </a:p>
+        </p:txBody>
+      </p:sp>
+      <p:sp>
+        <p:nvSpPr>
+          <p:cNvPr id="4" name="Rectángulo redondeado 3"/>
+          <p:cNvSpPr/>
+          <p:nvPr/>
+        </p:nvSpPr>
+        <p:spPr>
+          <a:xfrm>
+            <a:off x="981074" y="1690688"/>
+            <a:ext cx="1528763" cy="369092"/>
+          </a:xfrm>
+          <a:prstGeom prst="roundRect">
+            <a:avLst/>
+          </a:prstGeom>
+          <a:solidFill>
+            <a:schemeClr val="accent4">
+              <a:lumMod val="60000"/>
+              <a:lumOff val="40000"/>
+            </a:schemeClr>
+          </a:solidFill>
+          <a:ln>
+            <a:noFill/>
+          </a:ln>
+        </p:spPr>
+        <p:style>
+          <a:lnRef idx="2">
+            <a:schemeClr val="accent1">
+              <a:shade val="50000"/>
+            </a:schemeClr>
+          </a:lnRef>
+          <a:fillRef idx="1">
+            <a:schemeClr val="accent1"/>
+          </a:fillRef>
+          <a:effectRef idx="0">
+            <a:schemeClr val="accent1"/>
+          </a:effectRef>
+          <a:fontRef idx="minor">
+            <a:schemeClr val="lt1"/>
+          </a:fontRef>
+        </p:style>
+        <p:txBody>
+          <a:bodyPr rtlCol="0" anchor="t"/>
+          <a:lstStyle/>
+          <a:p>
+            <a:pPr algn="ctr"/>
+            <a:r>
+              <a:rPr lang="es-ES" sz="1200" dirty="0" smtClean="0">
+                <a:solidFill>
+                  <a:schemeClr val="tx1"/>
+                </a:solidFill>
+              </a:rPr>
+              <a:t>My Tasklist</a:t>
+            </a:r>
+            <a:endParaRPr lang="es-ES" sz="1200" dirty="0">
+              <a:solidFill>
+                <a:schemeClr val="tx1"/>
+              </a:solidFill>
+            </a:endParaRPr>
+          </a:p>
+        </p:txBody>
+      </p:sp>
+      <p:sp>
+        <p:nvSpPr>
+          <p:cNvPr id="5" name="Rectángulo redondeado 4"/>
+          <p:cNvSpPr/>
+          <p:nvPr/>
+        </p:nvSpPr>
+        <p:spPr>
+          <a:xfrm>
+            <a:off x="838200" y="1976437"/>
+            <a:ext cx="10515600" cy="4181476"/>
+          </a:xfrm>
+          <a:prstGeom prst="roundRect">
+            <a:avLst>
+              <a:gd name="adj" fmla="val 2602"/>
+            </a:avLst>
+          </a:prstGeom>
+          <a:solidFill>
+            <a:schemeClr val="bg1"/>
+          </a:solidFill>
+          <a:ln>
+            <a:solidFill>
+              <a:schemeClr val="accent4">
+                <a:lumMod val="60000"/>
+                <a:lumOff val="40000"/>
+              </a:schemeClr>
+            </a:solidFill>
+          </a:ln>
+        </p:spPr>
+        <p:style>
+          <a:lnRef idx="2">
+            <a:schemeClr val="accent1">
+              <a:shade val="50000"/>
+            </a:schemeClr>
+          </a:lnRef>
+          <a:fillRef idx="1">
+            <a:schemeClr val="accent1"/>
+          </a:fillRef>
+          <a:effectRef idx="0">
+            <a:schemeClr val="accent1"/>
+          </a:effectRef>
+          <a:fontRef idx="minor">
+            <a:schemeClr val="lt1"/>
+          </a:fontRef>
+        </p:style>
+        <p:txBody>
+          <a:bodyPr rtlCol="0" anchor="ctr"/>
+          <a:lstStyle/>
+          <a:p>
+            <a:pPr algn="ctr"/>
+            <a:endParaRPr lang="es-ES"/>
+          </a:p>
+        </p:txBody>
+      </p:sp>
+      <p:grpSp>
+        <p:nvGrpSpPr>
+          <p:cNvPr id="33" name="Grupo 32"/>
+          <p:cNvGrpSpPr/>
+          <p:nvPr/>
+        </p:nvGrpSpPr>
+        <p:grpSpPr>
+          <a:xfrm>
+            <a:off x="981074" y="2405071"/>
+            <a:ext cx="10182226" cy="357187"/>
+            <a:chOff x="981074" y="2405071"/>
+            <a:chExt cx="7124700" cy="357187"/>
+          </a:xfrm>
+        </p:grpSpPr>
+        <p:sp>
+          <p:nvSpPr>
+            <p:cNvPr id="6" name="Rectángulo 5"/>
+            <p:cNvSpPr/>
+            <p:nvPr/>
+          </p:nvSpPr>
+          <p:spPr>
+            <a:xfrm>
+              <a:off x="981074" y="2405071"/>
+              <a:ext cx="842963" cy="357187"/>
+            </a:xfrm>
+            <a:prstGeom prst="rect">
+              <a:avLst/>
+            </a:prstGeom>
+            <a:solidFill>
+              <a:schemeClr val="accent4">
+                <a:lumMod val="40000"/>
+                <a:lumOff val="60000"/>
+              </a:schemeClr>
+            </a:solidFill>
+            <a:ln>
+              <a:solidFill>
+                <a:schemeClr val="accent4"/>
+              </a:solidFill>
+            </a:ln>
+          </p:spPr>
+          <p:style>
+            <a:lnRef idx="2">
+              <a:schemeClr val="accent1">
+                <a:shade val="50000"/>
+              </a:schemeClr>
+            </a:lnRef>
+            <a:fillRef idx="1">
+              <a:schemeClr val="accent1"/>
+            </a:fillRef>
+            <a:effectRef idx="0">
+              <a:schemeClr val="accent1"/>
+            </a:effectRef>
+            <a:fontRef idx="minor">
+              <a:schemeClr val="lt1"/>
+            </a:fontRef>
+          </p:style>
+          <p:txBody>
+            <a:bodyPr rtlCol="0" anchor="ctr"/>
+            <a:lstStyle/>
+            <a:p>
+              <a:pPr algn="ctr"/>
+              <a:r>
+                <a:rPr lang="es-ES" sz="1200" dirty="0" smtClean="0">
+                  <a:solidFill>
+                    <a:schemeClr val="tx1"/>
+                  </a:solidFill>
+                </a:rPr>
+                <a:t>Task ID</a:t>
+              </a:r>
+              <a:endParaRPr lang="es-ES" sz="1200" dirty="0">
+                <a:solidFill>
+                  <a:schemeClr val="tx1"/>
+                </a:solidFill>
+              </a:endParaRPr>
+            </a:p>
+          </p:txBody>
+        </p:sp>
+        <p:sp>
+          <p:nvSpPr>
+            <p:cNvPr id="7" name="Rectángulo 6"/>
+            <p:cNvSpPr/>
+            <p:nvPr/>
+          </p:nvSpPr>
+          <p:spPr>
+            <a:xfrm>
+              <a:off x="1824037" y="2405071"/>
+              <a:ext cx="2928937" cy="357187"/>
+            </a:xfrm>
+            <a:prstGeom prst="rect">
+              <a:avLst/>
+            </a:prstGeom>
+            <a:solidFill>
+              <a:schemeClr val="accent4">
+                <a:lumMod val="40000"/>
+                <a:lumOff val="60000"/>
+              </a:schemeClr>
+            </a:solidFill>
+            <a:ln>
+              <a:solidFill>
+                <a:schemeClr val="accent4"/>
+              </a:solidFill>
+            </a:ln>
+          </p:spPr>
+          <p:style>
+            <a:lnRef idx="2">
+              <a:schemeClr val="accent1">
+                <a:shade val="50000"/>
+              </a:schemeClr>
+            </a:lnRef>
+            <a:fillRef idx="1">
+              <a:schemeClr val="accent1"/>
+            </a:fillRef>
+            <a:effectRef idx="0">
+              <a:schemeClr val="accent1"/>
+            </a:effectRef>
+            <a:fontRef idx="minor">
+              <a:schemeClr val="lt1"/>
+            </a:fontRef>
+          </p:style>
+          <p:txBody>
+            <a:bodyPr rtlCol="0" anchor="ctr"/>
+            <a:lstStyle/>
+            <a:p>
+              <a:r>
+                <a:rPr lang="es-ES" sz="1200" dirty="0" smtClean="0">
+                  <a:solidFill>
+                    <a:schemeClr val="tx1"/>
+                  </a:solidFill>
+                </a:rPr>
+                <a:t>Task title</a:t>
+              </a:r>
+              <a:endParaRPr lang="es-ES" sz="1200" dirty="0">
+                <a:solidFill>
+                  <a:schemeClr val="tx1"/>
+                </a:solidFill>
+              </a:endParaRPr>
+            </a:p>
+          </p:txBody>
+        </p:sp>
+        <p:sp>
+          <p:nvSpPr>
+            <p:cNvPr id="8" name="Rectángulo 7"/>
+            <p:cNvSpPr/>
+            <p:nvPr/>
+          </p:nvSpPr>
+          <p:spPr>
+            <a:xfrm>
+              <a:off x="4752975" y="2405071"/>
+              <a:ext cx="1200150" cy="357187"/>
+            </a:xfrm>
+            <a:prstGeom prst="rect">
+              <a:avLst/>
+            </a:prstGeom>
+            <a:solidFill>
+              <a:schemeClr val="accent4">
+                <a:lumMod val="40000"/>
+                <a:lumOff val="60000"/>
+              </a:schemeClr>
+            </a:solidFill>
+            <a:ln>
+              <a:solidFill>
+                <a:schemeClr val="accent4"/>
+              </a:solidFill>
+            </a:ln>
+          </p:spPr>
+          <p:style>
+            <a:lnRef idx="2">
+              <a:schemeClr val="accent1">
+                <a:shade val="50000"/>
+              </a:schemeClr>
+            </a:lnRef>
+            <a:fillRef idx="1">
+              <a:schemeClr val="accent1"/>
+            </a:fillRef>
+            <a:effectRef idx="0">
+              <a:schemeClr val="accent1"/>
+            </a:effectRef>
+            <a:fontRef idx="minor">
+              <a:schemeClr val="lt1"/>
+            </a:fontRef>
+          </p:style>
+          <p:txBody>
+            <a:bodyPr rtlCol="0" anchor="ctr"/>
+            <a:lstStyle/>
+            <a:p>
+              <a:r>
+                <a:rPr lang="es-ES" sz="1200" dirty="0" smtClean="0">
+                  <a:solidFill>
+                    <a:schemeClr val="tx1"/>
+                  </a:solidFill>
+                </a:rPr>
+                <a:t>Owner</a:t>
+              </a:r>
+              <a:endParaRPr lang="es-ES" sz="1200" dirty="0">
+                <a:solidFill>
+                  <a:schemeClr val="tx1"/>
+                </a:solidFill>
+              </a:endParaRPr>
+            </a:p>
+          </p:txBody>
+        </p:sp>
+        <p:sp>
+          <p:nvSpPr>
+            <p:cNvPr id="9" name="Rectángulo 8"/>
+            <p:cNvSpPr/>
+            <p:nvPr/>
+          </p:nvSpPr>
+          <p:spPr>
+            <a:xfrm>
+              <a:off x="5953125" y="2405071"/>
+              <a:ext cx="1200150" cy="357187"/>
+            </a:xfrm>
+            <a:prstGeom prst="rect">
+              <a:avLst/>
+            </a:prstGeom>
+            <a:solidFill>
+              <a:schemeClr val="accent4">
+                <a:lumMod val="40000"/>
+                <a:lumOff val="60000"/>
+              </a:schemeClr>
+            </a:solidFill>
+            <a:ln>
+              <a:solidFill>
+                <a:schemeClr val="accent4"/>
+              </a:solidFill>
+            </a:ln>
+          </p:spPr>
+          <p:style>
+            <a:lnRef idx="2">
+              <a:schemeClr val="accent1">
+                <a:shade val="50000"/>
+              </a:schemeClr>
+            </a:lnRef>
+            <a:fillRef idx="1">
+              <a:schemeClr val="accent1"/>
+            </a:fillRef>
+            <a:effectRef idx="0">
+              <a:schemeClr val="accent1"/>
+            </a:effectRef>
+            <a:fontRef idx="minor">
+              <a:schemeClr val="lt1"/>
+            </a:fontRef>
+          </p:style>
+          <p:txBody>
+            <a:bodyPr rtlCol="0" anchor="ctr"/>
+            <a:lstStyle/>
+            <a:p>
+              <a:r>
+                <a:rPr lang="es-ES" sz="1200" dirty="0" smtClean="0">
+                  <a:solidFill>
+                    <a:schemeClr val="tx1"/>
+                  </a:solidFill>
+                </a:rPr>
+                <a:t>Assignee</a:t>
+              </a:r>
+              <a:endParaRPr lang="es-ES" sz="1200" dirty="0">
+                <a:solidFill>
+                  <a:schemeClr val="tx1"/>
+                </a:solidFill>
+              </a:endParaRPr>
+            </a:p>
+          </p:txBody>
+        </p:sp>
+        <p:sp>
+          <p:nvSpPr>
+            <p:cNvPr id="10" name="Rectángulo 9"/>
+            <p:cNvSpPr/>
+            <p:nvPr/>
+          </p:nvSpPr>
+          <p:spPr>
+            <a:xfrm>
+              <a:off x="7153275" y="2405071"/>
+              <a:ext cx="952499" cy="357187"/>
+            </a:xfrm>
+            <a:prstGeom prst="rect">
+              <a:avLst/>
+            </a:prstGeom>
+            <a:solidFill>
+              <a:schemeClr val="accent4">
+                <a:lumMod val="40000"/>
+                <a:lumOff val="60000"/>
+              </a:schemeClr>
+            </a:solidFill>
+            <a:ln>
+              <a:solidFill>
+                <a:schemeClr val="accent4"/>
+              </a:solidFill>
+            </a:ln>
+          </p:spPr>
+          <p:style>
+            <a:lnRef idx="2">
+              <a:schemeClr val="accent1">
+                <a:shade val="50000"/>
+              </a:schemeClr>
+            </a:lnRef>
+            <a:fillRef idx="1">
+              <a:schemeClr val="accent1"/>
+            </a:fillRef>
+            <a:effectRef idx="0">
+              <a:schemeClr val="accent1"/>
+            </a:effectRef>
+            <a:fontRef idx="minor">
+              <a:schemeClr val="lt1"/>
+            </a:fontRef>
+          </p:style>
+          <p:txBody>
+            <a:bodyPr rtlCol="0" anchor="ctr"/>
+            <a:lstStyle/>
+            <a:p>
+              <a:r>
+                <a:rPr lang="es-ES" sz="1200" dirty="0" smtClean="0">
+                  <a:solidFill>
+                    <a:schemeClr val="tx1"/>
+                  </a:solidFill>
+                </a:rPr>
+                <a:t>Due date</a:t>
+              </a:r>
+              <a:endParaRPr lang="es-ES" sz="1200" dirty="0">
+                <a:solidFill>
+                  <a:schemeClr val="tx1"/>
+                </a:solidFill>
+              </a:endParaRPr>
+            </a:p>
+          </p:txBody>
+        </p:sp>
+      </p:grpSp>
+      <p:grpSp>
+        <p:nvGrpSpPr>
+          <p:cNvPr id="11" name="Grupo 10"/>
+          <p:cNvGrpSpPr/>
+          <p:nvPr/>
+        </p:nvGrpSpPr>
+        <p:grpSpPr>
+          <a:xfrm>
+            <a:off x="981074" y="2771785"/>
+            <a:ext cx="10182226" cy="504824"/>
+            <a:chOff x="4229100" y="2424115"/>
+            <a:chExt cx="7124700" cy="504824"/>
+          </a:xfrm>
+        </p:grpSpPr>
+        <p:sp>
+          <p:nvSpPr>
+            <p:cNvPr id="12" name="Rectángulo 11"/>
+            <p:cNvSpPr/>
+            <p:nvPr/>
+          </p:nvSpPr>
+          <p:spPr>
+            <a:xfrm>
+              <a:off x="4229100" y="2424115"/>
+              <a:ext cx="842963" cy="504824"/>
+            </a:xfrm>
+            <a:prstGeom prst="rect">
+              <a:avLst/>
+            </a:prstGeom>
+            <a:solidFill>
+              <a:schemeClr val="bg1"/>
+            </a:solidFill>
+            <a:ln>
+              <a:solidFill>
+                <a:schemeClr val="accent4"/>
+              </a:solidFill>
+            </a:ln>
+          </p:spPr>
+          <p:style>
+            <a:lnRef idx="2">
+              <a:schemeClr val="accent1">
+                <a:shade val="50000"/>
+              </a:schemeClr>
+            </a:lnRef>
+            <a:fillRef idx="1">
+              <a:schemeClr val="accent1"/>
+            </a:fillRef>
+            <a:effectRef idx="0">
+              <a:schemeClr val="accent1"/>
+            </a:effectRef>
+            <a:fontRef idx="minor">
+              <a:schemeClr val="lt1"/>
+            </a:fontRef>
+          </p:style>
+          <p:txBody>
+            <a:bodyPr rtlCol="0" anchor="ctr"/>
+            <a:lstStyle/>
+            <a:p>
+              <a:pPr algn="ctr"/>
+              <a:r>
+                <a:rPr lang="es-ES" sz="1200" dirty="0" smtClean="0">
+                  <a:solidFill>
+                    <a:schemeClr val="tx1"/>
+                  </a:solidFill>
+                </a:rPr>
+                <a:t>00001</a:t>
+              </a:r>
+              <a:endParaRPr lang="es-ES" sz="1200" dirty="0">
+                <a:solidFill>
+                  <a:schemeClr val="tx1"/>
+                </a:solidFill>
+              </a:endParaRPr>
+            </a:p>
+          </p:txBody>
+        </p:sp>
+        <p:sp>
+          <p:nvSpPr>
+            <p:cNvPr id="13" name="Rectángulo 12"/>
+            <p:cNvSpPr/>
+            <p:nvPr/>
+          </p:nvSpPr>
+          <p:spPr>
+            <a:xfrm>
+              <a:off x="5072063" y="2424115"/>
+              <a:ext cx="2928937" cy="504824"/>
+            </a:xfrm>
+            <a:prstGeom prst="rect">
+              <a:avLst/>
+            </a:prstGeom>
+            <a:solidFill>
+              <a:schemeClr val="bg1"/>
+            </a:solidFill>
+            <a:ln>
+              <a:solidFill>
+                <a:schemeClr val="accent4"/>
+              </a:solidFill>
+            </a:ln>
+          </p:spPr>
+          <p:style>
+            <a:lnRef idx="2">
+              <a:schemeClr val="accent1">
+                <a:shade val="50000"/>
+              </a:schemeClr>
+            </a:lnRef>
+            <a:fillRef idx="1">
+              <a:schemeClr val="accent1"/>
+            </a:fillRef>
+            <a:effectRef idx="0">
+              <a:schemeClr val="accent1"/>
+            </a:effectRef>
+            <a:fontRef idx="minor">
+              <a:schemeClr val="lt1"/>
+            </a:fontRef>
+          </p:style>
+          <p:txBody>
+            <a:bodyPr rtlCol="0" anchor="t"/>
+            <a:lstStyle/>
+            <a:p>
+              <a:r>
+                <a:rPr lang="es-ES" sz="1200" b="1" dirty="0" smtClean="0">
+                  <a:solidFill>
+                    <a:schemeClr val="tx1"/>
+                  </a:solidFill>
+                </a:rPr>
+                <a:t>Presentar solicitud y documentación </a:t>
+              </a:r>
+              <a:r>
+                <a:rPr lang="es-ES" sz="1200" b="1" dirty="0" err="1" smtClean="0">
+                  <a:solidFill>
+                    <a:schemeClr val="tx1"/>
+                  </a:solidFill>
+                </a:rPr>
+                <a:t>sustentatoria</a:t>
+              </a:r>
+              <a:r>
+                <a:rPr lang="es-ES" sz="1200" dirty="0" smtClean="0">
+                  <a:solidFill>
+                    <a:schemeClr val="tx1"/>
+                  </a:solidFill>
+                </a:rPr>
+                <a:t/>
+              </a:r>
+              <a:br>
+                <a:rPr lang="es-ES" sz="1200" dirty="0" smtClean="0">
+                  <a:solidFill>
+                    <a:schemeClr val="tx1"/>
+                  </a:solidFill>
+                </a:rPr>
+              </a:br>
+              <a:r>
+                <a:rPr lang="es-ES" sz="1200" dirty="0" smtClean="0">
+                  <a:solidFill>
+                    <a:schemeClr val="tx1"/>
+                  </a:solidFill>
+                </a:rPr>
+                <a:t>[ </a:t>
+              </a:r>
+              <a:r>
+                <a:rPr lang="es-ES" sz="1200" u="sng" dirty="0" smtClean="0">
+                  <a:solidFill>
+                    <a:schemeClr val="accent1">
+                      <a:lumMod val="75000"/>
+                    </a:schemeClr>
+                  </a:solidFill>
+                </a:rPr>
+                <a:t>Auto asignar</a:t>
+              </a:r>
+              <a:r>
+                <a:rPr lang="es-ES" sz="1200" dirty="0" smtClean="0">
+                  <a:solidFill>
+                    <a:schemeClr val="tx1"/>
+                  </a:solidFill>
+                </a:rPr>
+                <a:t> ] [ </a:t>
+              </a:r>
+              <a:r>
+                <a:rPr lang="es-ES" sz="1200" u="sng" dirty="0">
+                  <a:solidFill>
+                    <a:schemeClr val="accent1">
+                      <a:lumMod val="75000"/>
+                    </a:schemeClr>
+                  </a:solidFill>
+                </a:rPr>
+                <a:t>Liberar</a:t>
+              </a:r>
+              <a:r>
+                <a:rPr lang="es-ES" sz="1200" dirty="0" smtClean="0">
+                  <a:solidFill>
+                    <a:schemeClr val="tx1"/>
+                  </a:solidFill>
+                </a:rPr>
+                <a:t> ] [ </a:t>
+              </a:r>
+              <a:r>
+                <a:rPr lang="es-ES" sz="1200" u="sng" dirty="0">
+                  <a:solidFill>
+                    <a:schemeClr val="accent1">
+                      <a:lumMod val="75000"/>
+                    </a:schemeClr>
+                  </a:solidFill>
+                </a:rPr>
+                <a:t>Ejecutar</a:t>
+              </a:r>
+              <a:r>
+                <a:rPr lang="es-ES" sz="1200" dirty="0" smtClean="0">
+                  <a:solidFill>
+                    <a:schemeClr val="tx1"/>
+                  </a:solidFill>
+                </a:rPr>
+                <a:t> ]</a:t>
+              </a:r>
+              <a:endParaRPr lang="es-ES" sz="1200" dirty="0">
+                <a:solidFill>
+                  <a:schemeClr val="tx1"/>
+                </a:solidFill>
+              </a:endParaRPr>
+            </a:p>
+          </p:txBody>
+        </p:sp>
+        <p:sp>
+          <p:nvSpPr>
+            <p:cNvPr id="14" name="Rectángulo 13"/>
+            <p:cNvSpPr/>
+            <p:nvPr/>
+          </p:nvSpPr>
+          <p:spPr>
+            <a:xfrm>
+              <a:off x="8001001" y="2424115"/>
+              <a:ext cx="1200150" cy="504824"/>
+            </a:xfrm>
+            <a:prstGeom prst="rect">
+              <a:avLst/>
+            </a:prstGeom>
+            <a:solidFill>
+              <a:schemeClr val="bg1"/>
+            </a:solidFill>
+            <a:ln>
+              <a:solidFill>
+                <a:schemeClr val="accent4"/>
+              </a:solidFill>
+            </a:ln>
+          </p:spPr>
+          <p:style>
+            <a:lnRef idx="2">
+              <a:schemeClr val="accent1">
+                <a:shade val="50000"/>
+              </a:schemeClr>
+            </a:lnRef>
+            <a:fillRef idx="1">
+              <a:schemeClr val="accent1"/>
+            </a:fillRef>
+            <a:effectRef idx="0">
+              <a:schemeClr val="accent1"/>
+            </a:effectRef>
+            <a:fontRef idx="minor">
+              <a:schemeClr val="lt1"/>
+            </a:fontRef>
+          </p:style>
+          <p:txBody>
+            <a:bodyPr rtlCol="0" anchor="ctr"/>
+            <a:lstStyle/>
+            <a:p>
+              <a:pPr algn="ctr"/>
+              <a:r>
+                <a:rPr lang="es-ES" sz="1200" dirty="0" err="1" smtClean="0">
+                  <a:solidFill>
+                    <a:schemeClr val="tx1"/>
+                  </a:solidFill>
+                </a:rPr>
+                <a:t>system</a:t>
+              </a:r>
+              <a:endParaRPr lang="es-ES" sz="1200" dirty="0">
+                <a:solidFill>
+                  <a:schemeClr val="tx1"/>
+                </a:solidFill>
+              </a:endParaRPr>
+            </a:p>
+          </p:txBody>
+        </p:sp>
+        <p:sp>
+          <p:nvSpPr>
+            <p:cNvPr id="15" name="Rectángulo 14"/>
+            <p:cNvSpPr/>
+            <p:nvPr/>
+          </p:nvSpPr>
+          <p:spPr>
+            <a:xfrm>
+              <a:off x="9201151" y="2424115"/>
+              <a:ext cx="1200150" cy="504824"/>
+            </a:xfrm>
+            <a:prstGeom prst="rect">
+              <a:avLst/>
+            </a:prstGeom>
+            <a:solidFill>
+              <a:schemeClr val="bg1"/>
+            </a:solidFill>
+            <a:ln>
+              <a:solidFill>
+                <a:schemeClr val="accent4"/>
+              </a:solidFill>
+            </a:ln>
+          </p:spPr>
+          <p:style>
+            <a:lnRef idx="2">
+              <a:schemeClr val="accent1">
+                <a:shade val="50000"/>
+              </a:schemeClr>
+            </a:lnRef>
+            <a:fillRef idx="1">
+              <a:schemeClr val="accent1"/>
+            </a:fillRef>
+            <a:effectRef idx="0">
+              <a:schemeClr val="accent1"/>
+            </a:effectRef>
+            <a:fontRef idx="minor">
+              <a:schemeClr val="lt1"/>
+            </a:fontRef>
+          </p:style>
+          <p:txBody>
+            <a:bodyPr rtlCol="0" anchor="ctr"/>
+            <a:lstStyle/>
+            <a:p>
+              <a:pPr algn="ctr"/>
+              <a:r>
+                <a:rPr lang="es-ES" sz="1200" dirty="0" err="1">
+                  <a:solidFill>
+                    <a:schemeClr val="tx1"/>
+                  </a:solidFill>
+                </a:rPr>
+                <a:t>mrodiguez</a:t>
+              </a:r>
+              <a:endParaRPr lang="es-ES" sz="1200" dirty="0">
+                <a:solidFill>
+                  <a:schemeClr val="tx1"/>
+                </a:solidFill>
+              </a:endParaRPr>
+            </a:p>
+          </p:txBody>
+        </p:sp>
+        <p:sp>
+          <p:nvSpPr>
+            <p:cNvPr id="16" name="Rectángulo 15"/>
+            <p:cNvSpPr/>
+            <p:nvPr/>
+          </p:nvSpPr>
+          <p:spPr>
+            <a:xfrm>
+              <a:off x="10401301" y="2424115"/>
+              <a:ext cx="952499" cy="504824"/>
+            </a:xfrm>
+            <a:prstGeom prst="rect">
+              <a:avLst/>
+            </a:prstGeom>
+            <a:solidFill>
+              <a:schemeClr val="bg1"/>
+            </a:solidFill>
+            <a:ln>
+              <a:solidFill>
+                <a:schemeClr val="accent4"/>
+              </a:solidFill>
+            </a:ln>
+          </p:spPr>
+          <p:style>
+            <a:lnRef idx="2">
+              <a:schemeClr val="accent1">
+                <a:shade val="50000"/>
+              </a:schemeClr>
+            </a:lnRef>
+            <a:fillRef idx="1">
+              <a:schemeClr val="accent1"/>
+            </a:fillRef>
+            <a:effectRef idx="0">
+              <a:schemeClr val="accent1"/>
+            </a:effectRef>
+            <a:fontRef idx="minor">
+              <a:schemeClr val="lt1"/>
+            </a:fontRef>
+          </p:style>
+          <p:txBody>
+            <a:bodyPr rtlCol="0" anchor="ctr"/>
+            <a:lstStyle/>
+            <a:p>
+              <a:r>
+                <a:rPr lang="es-ES" sz="1200" dirty="0" smtClean="0">
+                  <a:solidFill>
+                    <a:schemeClr val="tx1"/>
+                  </a:solidFill>
+                </a:rPr>
+                <a:t>12/01/2014</a:t>
+              </a:r>
+              <a:endParaRPr lang="es-ES" sz="1200" dirty="0">
+                <a:solidFill>
+                  <a:schemeClr val="tx1"/>
+                </a:solidFill>
+              </a:endParaRPr>
+            </a:p>
+          </p:txBody>
+        </p:sp>
+      </p:grpSp>
+      <p:grpSp>
+        <p:nvGrpSpPr>
+          <p:cNvPr id="17" name="Grupo 16"/>
+          <p:cNvGrpSpPr/>
+          <p:nvPr/>
+        </p:nvGrpSpPr>
+        <p:grpSpPr>
+          <a:xfrm>
+            <a:off x="981074" y="3271848"/>
+            <a:ext cx="10182226" cy="504824"/>
+            <a:chOff x="4229100" y="2424115"/>
+            <a:chExt cx="7124700" cy="504824"/>
+          </a:xfrm>
+        </p:grpSpPr>
+        <p:sp>
+          <p:nvSpPr>
+            <p:cNvPr id="18" name="Rectángulo 17"/>
+            <p:cNvSpPr/>
+            <p:nvPr/>
+          </p:nvSpPr>
+          <p:spPr>
+            <a:xfrm>
+              <a:off x="4229100" y="2424115"/>
+              <a:ext cx="842963" cy="504824"/>
+            </a:xfrm>
+            <a:prstGeom prst="rect">
+              <a:avLst/>
+            </a:prstGeom>
+            <a:solidFill>
+              <a:schemeClr val="bg1"/>
+            </a:solidFill>
+            <a:ln>
+              <a:solidFill>
+                <a:schemeClr val="accent4"/>
+              </a:solidFill>
+            </a:ln>
+          </p:spPr>
+          <p:style>
+            <a:lnRef idx="2">
+              <a:schemeClr val="accent1">
+                <a:shade val="50000"/>
+              </a:schemeClr>
+            </a:lnRef>
+            <a:fillRef idx="1">
+              <a:schemeClr val="accent1"/>
+            </a:fillRef>
+            <a:effectRef idx="0">
+              <a:schemeClr val="accent1"/>
+            </a:effectRef>
+            <a:fontRef idx="minor">
+              <a:schemeClr val="lt1"/>
+            </a:fontRef>
+          </p:style>
+          <p:txBody>
+            <a:bodyPr rtlCol="0" anchor="ctr"/>
+            <a:lstStyle/>
+            <a:p>
+              <a:pPr algn="ctr"/>
+              <a:r>
+                <a:rPr lang="es-ES" sz="1200" dirty="0" smtClean="0">
+                  <a:solidFill>
+                    <a:schemeClr val="tx1"/>
+                  </a:solidFill>
+                </a:rPr>
+                <a:t>00001</a:t>
+              </a:r>
+              <a:endParaRPr lang="es-ES" sz="1200" dirty="0">
+                <a:solidFill>
+                  <a:schemeClr val="tx1"/>
+                </a:solidFill>
+              </a:endParaRPr>
+            </a:p>
+          </p:txBody>
+        </p:sp>
+        <p:sp>
+          <p:nvSpPr>
+            <p:cNvPr id="19" name="Rectángulo 18"/>
+            <p:cNvSpPr/>
+            <p:nvPr/>
+          </p:nvSpPr>
+          <p:spPr>
+            <a:xfrm>
+              <a:off x="5072063" y="2424115"/>
+              <a:ext cx="2928937" cy="504824"/>
+            </a:xfrm>
+            <a:prstGeom prst="rect">
+              <a:avLst/>
+            </a:prstGeom>
+            <a:solidFill>
+              <a:schemeClr val="bg1"/>
+            </a:solidFill>
+            <a:ln>
+              <a:solidFill>
+                <a:schemeClr val="accent4"/>
+              </a:solidFill>
+            </a:ln>
+          </p:spPr>
+          <p:style>
+            <a:lnRef idx="2">
+              <a:schemeClr val="accent1">
+                <a:shade val="50000"/>
+              </a:schemeClr>
+            </a:lnRef>
+            <a:fillRef idx="1">
+              <a:schemeClr val="accent1"/>
+            </a:fillRef>
+            <a:effectRef idx="0">
+              <a:schemeClr val="accent1"/>
+            </a:effectRef>
+            <a:fontRef idx="minor">
+              <a:schemeClr val="lt1"/>
+            </a:fontRef>
+          </p:style>
+          <p:txBody>
+            <a:bodyPr rtlCol="0" anchor="t"/>
+            <a:lstStyle/>
+            <a:p>
+              <a:r>
+                <a:rPr lang="es-ES" sz="1200" b="1" dirty="0" smtClean="0">
+                  <a:solidFill>
+                    <a:schemeClr val="tx1"/>
+                  </a:solidFill>
+                </a:rPr>
+                <a:t>Subsanar observación a solicitud de convalidación No 2014021</a:t>
+              </a:r>
+              <a:r>
+                <a:rPr lang="es-ES" sz="1200" dirty="0" smtClean="0">
+                  <a:solidFill>
+                    <a:schemeClr val="tx1"/>
+                  </a:solidFill>
+                </a:rPr>
+                <a:t/>
+              </a:r>
+              <a:br>
+                <a:rPr lang="es-ES" sz="1200" dirty="0" smtClean="0">
+                  <a:solidFill>
+                    <a:schemeClr val="tx1"/>
+                  </a:solidFill>
+                </a:rPr>
+              </a:br>
+              <a:r>
+                <a:rPr lang="es-ES" sz="1200" dirty="0" smtClean="0">
+                  <a:solidFill>
+                    <a:schemeClr val="tx1"/>
+                  </a:solidFill>
+                </a:rPr>
+                <a:t>[ </a:t>
+              </a:r>
+              <a:r>
+                <a:rPr lang="es-ES" sz="1200" u="sng" dirty="0" smtClean="0">
+                  <a:solidFill>
+                    <a:schemeClr val="accent1">
+                      <a:lumMod val="75000"/>
+                    </a:schemeClr>
+                  </a:solidFill>
+                </a:rPr>
+                <a:t>Auto asignar</a:t>
+              </a:r>
+              <a:r>
+                <a:rPr lang="es-ES" sz="1200" dirty="0" smtClean="0">
+                  <a:solidFill>
+                    <a:schemeClr val="tx1"/>
+                  </a:solidFill>
+                </a:rPr>
+                <a:t> ] [ </a:t>
+              </a:r>
+              <a:r>
+                <a:rPr lang="es-ES" sz="1200" u="sng" dirty="0">
+                  <a:solidFill>
+                    <a:schemeClr val="accent1">
+                      <a:lumMod val="75000"/>
+                    </a:schemeClr>
+                  </a:solidFill>
+                </a:rPr>
+                <a:t>Liberar</a:t>
+              </a:r>
+              <a:r>
+                <a:rPr lang="es-ES" sz="1200" dirty="0" smtClean="0">
+                  <a:solidFill>
+                    <a:schemeClr val="tx1"/>
+                  </a:solidFill>
+                </a:rPr>
+                <a:t> ] [ </a:t>
+              </a:r>
+              <a:r>
+                <a:rPr lang="es-ES" sz="1200" u="sng" dirty="0">
+                  <a:solidFill>
+                    <a:schemeClr val="accent1">
+                      <a:lumMod val="75000"/>
+                    </a:schemeClr>
+                  </a:solidFill>
+                </a:rPr>
+                <a:t>Ejecutar</a:t>
+              </a:r>
+              <a:r>
+                <a:rPr lang="es-ES" sz="1200" dirty="0" smtClean="0">
+                  <a:solidFill>
+                    <a:schemeClr val="tx1"/>
+                  </a:solidFill>
+                </a:rPr>
+                <a:t> ]</a:t>
+              </a:r>
+              <a:endParaRPr lang="es-ES" sz="1200" dirty="0">
+                <a:solidFill>
+                  <a:schemeClr val="tx1"/>
+                </a:solidFill>
+              </a:endParaRPr>
+            </a:p>
+          </p:txBody>
+        </p:sp>
+        <p:sp>
+          <p:nvSpPr>
+            <p:cNvPr id="20" name="Rectángulo 19"/>
+            <p:cNvSpPr/>
+            <p:nvPr/>
+          </p:nvSpPr>
+          <p:spPr>
+            <a:xfrm>
+              <a:off x="8001001" y="2424115"/>
+              <a:ext cx="1200150" cy="504824"/>
+            </a:xfrm>
+            <a:prstGeom prst="rect">
+              <a:avLst/>
+            </a:prstGeom>
+            <a:solidFill>
+              <a:schemeClr val="bg1"/>
+            </a:solidFill>
+            <a:ln>
+              <a:solidFill>
+                <a:schemeClr val="accent4"/>
+              </a:solidFill>
+            </a:ln>
+          </p:spPr>
+          <p:style>
+            <a:lnRef idx="2">
+              <a:schemeClr val="accent1">
+                <a:shade val="50000"/>
+              </a:schemeClr>
+            </a:lnRef>
+            <a:fillRef idx="1">
+              <a:schemeClr val="accent1"/>
+            </a:fillRef>
+            <a:effectRef idx="0">
+              <a:schemeClr val="accent1"/>
+            </a:effectRef>
+            <a:fontRef idx="minor">
+              <a:schemeClr val="lt1"/>
+            </a:fontRef>
+          </p:style>
+          <p:txBody>
+            <a:bodyPr rtlCol="0" anchor="ctr"/>
+            <a:lstStyle/>
+            <a:p>
+              <a:pPr algn="ctr"/>
+              <a:r>
+                <a:rPr lang="es-ES" sz="1200" dirty="0" err="1" smtClean="0">
+                  <a:solidFill>
+                    <a:schemeClr val="tx1"/>
+                  </a:solidFill>
+                </a:rPr>
+                <a:t>system</a:t>
+              </a:r>
+              <a:endParaRPr lang="es-ES" sz="1200" dirty="0">
+                <a:solidFill>
+                  <a:schemeClr val="tx1"/>
+                </a:solidFill>
+              </a:endParaRPr>
+            </a:p>
+          </p:txBody>
+        </p:sp>
+        <p:sp>
+          <p:nvSpPr>
+            <p:cNvPr id="21" name="Rectángulo 20"/>
+            <p:cNvSpPr/>
+            <p:nvPr/>
+          </p:nvSpPr>
+          <p:spPr>
+            <a:xfrm>
+              <a:off x="9201151" y="2424115"/>
+              <a:ext cx="1200150" cy="504824"/>
+            </a:xfrm>
+            <a:prstGeom prst="rect">
+              <a:avLst/>
+            </a:prstGeom>
+            <a:solidFill>
+              <a:schemeClr val="bg1"/>
+            </a:solidFill>
+            <a:ln>
+              <a:solidFill>
+                <a:schemeClr val="accent4"/>
+              </a:solidFill>
+            </a:ln>
+          </p:spPr>
+          <p:style>
+            <a:lnRef idx="2">
+              <a:schemeClr val="accent1">
+                <a:shade val="50000"/>
+              </a:schemeClr>
+            </a:lnRef>
+            <a:fillRef idx="1">
+              <a:schemeClr val="accent1"/>
+            </a:fillRef>
+            <a:effectRef idx="0">
+              <a:schemeClr val="accent1"/>
+            </a:effectRef>
+            <a:fontRef idx="minor">
+              <a:schemeClr val="lt1"/>
+            </a:fontRef>
+          </p:style>
+          <p:txBody>
+            <a:bodyPr rtlCol="0" anchor="ctr"/>
+            <a:lstStyle/>
+            <a:p>
+              <a:pPr algn="ctr"/>
+              <a:r>
+                <a:rPr lang="es-ES" sz="1200" dirty="0" err="1" smtClean="0">
+                  <a:solidFill>
+                    <a:schemeClr val="tx1"/>
+                  </a:solidFill>
+                </a:rPr>
+                <a:t>mrodiguez</a:t>
+              </a:r>
+              <a:endParaRPr lang="es-ES" sz="1200" dirty="0">
+                <a:solidFill>
+                  <a:schemeClr val="tx1"/>
+                </a:solidFill>
+              </a:endParaRPr>
+            </a:p>
+          </p:txBody>
+        </p:sp>
+        <p:sp>
+          <p:nvSpPr>
+            <p:cNvPr id="22" name="Rectángulo 21"/>
+            <p:cNvSpPr/>
+            <p:nvPr/>
+          </p:nvSpPr>
+          <p:spPr>
+            <a:xfrm>
+              <a:off x="10401301" y="2424115"/>
+              <a:ext cx="952499" cy="504824"/>
+            </a:xfrm>
+            <a:prstGeom prst="rect">
+              <a:avLst/>
+            </a:prstGeom>
+            <a:solidFill>
+              <a:schemeClr val="bg1"/>
+            </a:solidFill>
+            <a:ln>
+              <a:solidFill>
+                <a:schemeClr val="accent4"/>
+              </a:solidFill>
+            </a:ln>
+          </p:spPr>
+          <p:style>
+            <a:lnRef idx="2">
+              <a:schemeClr val="accent1">
+                <a:shade val="50000"/>
+              </a:schemeClr>
+            </a:lnRef>
+            <a:fillRef idx="1">
+              <a:schemeClr val="accent1"/>
+            </a:fillRef>
+            <a:effectRef idx="0">
+              <a:schemeClr val="accent1"/>
+            </a:effectRef>
+            <a:fontRef idx="minor">
+              <a:schemeClr val="lt1"/>
+            </a:fontRef>
+          </p:style>
+          <p:txBody>
+            <a:bodyPr rtlCol="0" anchor="ctr"/>
+            <a:lstStyle/>
+            <a:p>
+              <a:r>
+                <a:rPr lang="es-ES" sz="1200" dirty="0" smtClean="0">
+                  <a:solidFill>
+                    <a:schemeClr val="tx1"/>
+                  </a:solidFill>
+                </a:rPr>
+                <a:t>12/04/2014</a:t>
+              </a:r>
+              <a:endParaRPr lang="es-ES" sz="1200" dirty="0">
+                <a:solidFill>
+                  <a:schemeClr val="tx1"/>
+                </a:solidFill>
+              </a:endParaRPr>
+            </a:p>
+          </p:txBody>
+        </p:sp>
+      </p:grpSp>
+      <p:sp>
+        <p:nvSpPr>
+          <p:cNvPr id="23" name="Rectángulo redondeado 22"/>
+          <p:cNvSpPr/>
+          <p:nvPr/>
+        </p:nvSpPr>
+        <p:spPr>
+          <a:xfrm>
+            <a:off x="7305674" y="2095501"/>
+            <a:ext cx="800100" cy="257175"/>
+          </a:xfrm>
+          <a:prstGeom prst="roundRect">
+            <a:avLst/>
+          </a:prstGeom>
+          <a:solidFill>
+            <a:schemeClr val="accent4">
+              <a:lumMod val="60000"/>
+              <a:lumOff val="40000"/>
+            </a:schemeClr>
+          </a:solidFill>
+          <a:ln>
+            <a:noFill/>
+          </a:ln>
+        </p:spPr>
+        <p:style>
+          <a:lnRef idx="2">
+            <a:schemeClr val="accent1">
+              <a:shade val="50000"/>
+            </a:schemeClr>
+          </a:lnRef>
+          <a:fillRef idx="1">
+            <a:schemeClr val="accent1"/>
+          </a:fillRef>
+          <a:effectRef idx="0">
+            <a:schemeClr val="accent1"/>
+          </a:effectRef>
+          <a:fontRef idx="minor">
+            <a:schemeClr val="lt1"/>
+          </a:fontRef>
+        </p:style>
+        <p:txBody>
+          <a:bodyPr rot="0" spcFirstLastPara="0" vertOverflow="overflow" horzOverflow="overflow" vert="horz" wrap="square" lIns="91440" tIns="45720" rIns="91440" bIns="45720" numCol="1" spcCol="0" rtlCol="0" fromWordArt="0" anchor="ctr" anchorCtr="0" forceAA="0" compatLnSpc="1">
+            <a:prstTxWarp prst="textNoShape">
+              <a:avLst/>
+            </a:prstTxWarp>
+            <a:noAutofit/>
+          </a:bodyPr>
+          <a:lstStyle/>
+          <a:p>
+            <a:pPr algn="ctr"/>
+            <a:r>
+              <a:rPr lang="es-ES" sz="1200" dirty="0">
+                <a:solidFill>
+                  <a:schemeClr val="tx1"/>
+                </a:solidFill>
+              </a:rPr>
+              <a:t>New task</a:t>
+            </a:r>
+          </a:p>
+        </p:txBody>
+      </p:sp>
+      <p:grpSp>
+        <p:nvGrpSpPr>
+          <p:cNvPr id="24" name="Grupo 23"/>
+          <p:cNvGrpSpPr/>
+          <p:nvPr/>
+        </p:nvGrpSpPr>
+        <p:grpSpPr>
+          <a:xfrm>
+            <a:off x="981074" y="2095500"/>
+            <a:ext cx="2421732" cy="257175"/>
+            <a:chOff x="2571750" y="4100513"/>
+            <a:chExt cx="2421732" cy="257175"/>
+          </a:xfrm>
+        </p:grpSpPr>
+        <p:sp>
+          <p:nvSpPr>
+            <p:cNvPr id="25" name="Rectángulo redondeado 24"/>
+            <p:cNvSpPr/>
+            <p:nvPr/>
+          </p:nvSpPr>
+          <p:spPr>
+            <a:xfrm>
+              <a:off x="3464719" y="4100513"/>
+              <a:ext cx="642938" cy="257175"/>
+            </a:xfrm>
+            <a:prstGeom prst="roundRect">
+              <a:avLst/>
+            </a:prstGeom>
+            <a:solidFill>
+              <a:schemeClr val="accent4">
+                <a:lumMod val="60000"/>
+                <a:lumOff val="40000"/>
+              </a:schemeClr>
+            </a:solidFill>
+            <a:ln>
+              <a:noFill/>
+            </a:ln>
+          </p:spPr>
+          <p:style>
+            <a:lnRef idx="2">
+              <a:schemeClr val="accent1">
+                <a:shade val="50000"/>
+              </a:schemeClr>
+            </a:lnRef>
+            <a:fillRef idx="1">
+              <a:schemeClr val="accent1"/>
+            </a:fillRef>
+            <a:effectRef idx="0">
+              <a:schemeClr val="accent1"/>
+            </a:effectRef>
+            <a:fontRef idx="minor">
+              <a:schemeClr val="lt1"/>
+            </a:fontRef>
+          </p:style>
+          <p:txBody>
+            <a:bodyPr rot="0" spcFirstLastPara="0" vertOverflow="overflow" horzOverflow="overflow" vert="horz" wrap="square" lIns="91440" tIns="45720" rIns="91440" bIns="45720" numCol="1" spcCol="0" rtlCol="0" fromWordArt="0" anchor="ctr" anchorCtr="0" forceAA="0" compatLnSpc="1">
+              <a:prstTxWarp prst="textNoShape">
+                <a:avLst/>
+              </a:prstTxWarp>
+              <a:noAutofit/>
+            </a:bodyPr>
+            <a:lstStyle/>
+            <a:p>
+              <a:pPr algn="ctr"/>
+              <a:r>
+                <a:rPr lang="es-ES" sz="1200" dirty="0" smtClean="0">
+                  <a:solidFill>
+                    <a:schemeClr val="tx1"/>
+                  </a:solidFill>
+                </a:rPr>
+                <a:t>Table</a:t>
+              </a:r>
+              <a:endParaRPr lang="es-ES" sz="1200" dirty="0">
+                <a:solidFill>
+                  <a:schemeClr val="tx1"/>
+                </a:solidFill>
+              </a:endParaRPr>
+            </a:p>
+          </p:txBody>
+        </p:sp>
+        <p:sp>
+          <p:nvSpPr>
+            <p:cNvPr id="26" name="Rectángulo redondeado 25"/>
+            <p:cNvSpPr/>
+            <p:nvPr/>
+          </p:nvSpPr>
+          <p:spPr>
+            <a:xfrm>
+              <a:off x="4229100" y="4100513"/>
+              <a:ext cx="764382" cy="257175"/>
+            </a:xfrm>
+            <a:prstGeom prst="roundRect">
+              <a:avLst/>
+            </a:prstGeom>
+            <a:solidFill>
+              <a:schemeClr val="accent4">
+                <a:lumMod val="60000"/>
+                <a:lumOff val="40000"/>
+              </a:schemeClr>
+            </a:solidFill>
+            <a:ln>
+              <a:noFill/>
+            </a:ln>
+          </p:spPr>
+          <p:style>
+            <a:lnRef idx="2">
+              <a:schemeClr val="accent1">
+                <a:shade val="50000"/>
+              </a:schemeClr>
+            </a:lnRef>
+            <a:fillRef idx="1">
+              <a:schemeClr val="accent1"/>
+            </a:fillRef>
+            <a:effectRef idx="0">
+              <a:schemeClr val="accent1"/>
+            </a:effectRef>
+            <a:fontRef idx="minor">
+              <a:schemeClr val="lt1"/>
+            </a:fontRef>
+          </p:style>
+          <p:txBody>
+            <a:bodyPr rot="0" spcFirstLastPara="0" vertOverflow="overflow" horzOverflow="overflow" vert="horz" wrap="square" lIns="91440" tIns="45720" rIns="91440" bIns="45720" numCol="1" spcCol="0" rtlCol="0" fromWordArt="0" anchor="ctr" anchorCtr="0" forceAA="0" compatLnSpc="1">
+              <a:prstTxWarp prst="textNoShape">
+                <a:avLst/>
+              </a:prstTxWarp>
+              <a:noAutofit/>
+            </a:bodyPr>
+            <a:lstStyle/>
+            <a:p>
+              <a:pPr algn="ctr"/>
+              <a:r>
+                <a:rPr lang="es-ES" sz="1200" dirty="0" smtClean="0">
+                  <a:solidFill>
+                    <a:schemeClr val="tx1"/>
+                  </a:solidFill>
+                </a:rPr>
+                <a:t>Calendar</a:t>
+              </a:r>
+              <a:endParaRPr lang="es-ES" sz="1200" dirty="0">
+                <a:solidFill>
+                  <a:schemeClr val="tx1"/>
+                </a:solidFill>
+              </a:endParaRPr>
+            </a:p>
+          </p:txBody>
+        </p:sp>
+        <p:sp>
+          <p:nvSpPr>
+            <p:cNvPr id="27" name="Rectángulo 26"/>
+            <p:cNvSpPr/>
+            <p:nvPr/>
+          </p:nvSpPr>
+          <p:spPr>
+            <a:xfrm>
+              <a:off x="2571750" y="4100513"/>
+              <a:ext cx="842963" cy="257175"/>
+            </a:xfrm>
+            <a:prstGeom prst="rect">
+              <a:avLst/>
+            </a:prstGeom>
+            <a:solidFill>
+              <a:schemeClr val="bg1"/>
+            </a:solidFill>
+            <a:ln>
+              <a:noFill/>
+            </a:ln>
+          </p:spPr>
+          <p:style>
+            <a:lnRef idx="2">
+              <a:schemeClr val="accent1">
+                <a:shade val="50000"/>
+              </a:schemeClr>
+            </a:lnRef>
+            <a:fillRef idx="1">
+              <a:schemeClr val="accent1"/>
+            </a:fillRef>
+            <a:effectRef idx="0">
+              <a:schemeClr val="accent1"/>
+            </a:effectRef>
+            <a:fontRef idx="minor">
+              <a:schemeClr val="lt1"/>
+            </a:fontRef>
+          </p:style>
+          <p:txBody>
+            <a:bodyPr rtlCol="0" anchor="ctr"/>
+            <a:lstStyle/>
+            <a:p>
+              <a:pPr algn="r"/>
+              <a:r>
+                <a:rPr lang="es-ES" sz="1200" b="1" dirty="0" smtClean="0">
+                  <a:solidFill>
+                    <a:schemeClr val="tx1"/>
+                  </a:solidFill>
+                </a:rPr>
+                <a:t>View as:</a:t>
+              </a:r>
+              <a:endParaRPr lang="es-ES" sz="1200" b="1" dirty="0">
+                <a:solidFill>
+                  <a:schemeClr val="tx1"/>
+                </a:solidFill>
+              </a:endParaRPr>
+            </a:p>
+          </p:txBody>
+        </p:sp>
+      </p:grpSp>
+      <p:grpSp>
+        <p:nvGrpSpPr>
+          <p:cNvPr id="28" name="Grupo 27"/>
+          <p:cNvGrpSpPr/>
+          <p:nvPr/>
+        </p:nvGrpSpPr>
+        <p:grpSpPr>
+          <a:xfrm>
+            <a:off x="9796465" y="3890976"/>
+            <a:ext cx="1366835" cy="342890"/>
+            <a:chOff x="7572375" y="4507126"/>
+            <a:chExt cx="1366835" cy="342890"/>
+          </a:xfrm>
+        </p:grpSpPr>
+        <p:sp>
+          <p:nvSpPr>
+            <p:cNvPr id="29" name="Rectángulo 28"/>
+            <p:cNvSpPr/>
+            <p:nvPr/>
+          </p:nvSpPr>
+          <p:spPr>
+            <a:xfrm>
+              <a:off x="7572375" y="4507126"/>
+              <a:ext cx="323849" cy="342890"/>
+            </a:xfrm>
+            <a:prstGeom prst="rect">
+              <a:avLst/>
+            </a:prstGeom>
+            <a:solidFill>
+              <a:schemeClr val="accent4">
+                <a:lumMod val="60000"/>
+                <a:lumOff val="40000"/>
+              </a:schemeClr>
+            </a:solidFill>
+            <a:ln>
+              <a:noFill/>
+            </a:ln>
+          </p:spPr>
+          <p:style>
+            <a:lnRef idx="2">
+              <a:schemeClr val="accent1">
+                <a:shade val="50000"/>
+              </a:schemeClr>
+            </a:lnRef>
+            <a:fillRef idx="1">
+              <a:schemeClr val="accent1"/>
+            </a:fillRef>
+            <a:effectRef idx="0">
+              <a:schemeClr val="accent1"/>
+            </a:effectRef>
+            <a:fontRef idx="minor">
+              <a:schemeClr val="lt1"/>
+            </a:fontRef>
+          </p:style>
+          <p:txBody>
+            <a:bodyPr rtlCol="0" anchor="ctr"/>
+            <a:lstStyle/>
+            <a:p>
+              <a:pPr algn="ctr"/>
+              <a:r>
+                <a:rPr lang="es-ES" sz="1100" b="1" dirty="0">
+                  <a:solidFill>
+                    <a:schemeClr val="tx1"/>
+                  </a:solidFill>
+                </a:rPr>
+                <a:t>|&lt;</a:t>
+              </a:r>
+            </a:p>
+          </p:txBody>
+        </p:sp>
+        <p:sp>
+          <p:nvSpPr>
+            <p:cNvPr id="30" name="Rectángulo 29"/>
+            <p:cNvSpPr/>
+            <p:nvPr/>
+          </p:nvSpPr>
+          <p:spPr>
+            <a:xfrm>
+              <a:off x="7924800" y="4507126"/>
+              <a:ext cx="323849" cy="342890"/>
+            </a:xfrm>
+            <a:prstGeom prst="rect">
+              <a:avLst/>
+            </a:prstGeom>
+            <a:solidFill>
+              <a:schemeClr val="accent4">
+                <a:lumMod val="60000"/>
+                <a:lumOff val="40000"/>
+              </a:schemeClr>
+            </a:solidFill>
+            <a:ln>
+              <a:noFill/>
+            </a:ln>
+          </p:spPr>
+          <p:style>
+            <a:lnRef idx="2">
+              <a:schemeClr val="accent1">
+                <a:shade val="50000"/>
+              </a:schemeClr>
+            </a:lnRef>
+            <a:fillRef idx="1">
+              <a:schemeClr val="accent1"/>
+            </a:fillRef>
+            <a:effectRef idx="0">
+              <a:schemeClr val="accent1"/>
+            </a:effectRef>
+            <a:fontRef idx="minor">
+              <a:schemeClr val="lt1"/>
+            </a:fontRef>
+          </p:style>
+          <p:txBody>
+            <a:bodyPr rtlCol="0" anchor="ctr"/>
+            <a:lstStyle/>
+            <a:p>
+              <a:pPr algn="ctr"/>
+              <a:r>
+                <a:rPr lang="es-ES" sz="1100" b="1" dirty="0" smtClean="0">
+                  <a:solidFill>
+                    <a:schemeClr val="tx1"/>
+                  </a:solidFill>
+                </a:rPr>
+                <a:t>&lt;</a:t>
+              </a:r>
+              <a:endParaRPr lang="es-ES" sz="1100" b="1" dirty="0">
+                <a:solidFill>
+                  <a:schemeClr val="tx1"/>
+                </a:solidFill>
+              </a:endParaRPr>
+            </a:p>
+          </p:txBody>
+        </p:sp>
+        <p:sp>
+          <p:nvSpPr>
+            <p:cNvPr id="31" name="Rectángulo 30"/>
+            <p:cNvSpPr/>
+            <p:nvPr/>
+          </p:nvSpPr>
+          <p:spPr>
+            <a:xfrm>
+              <a:off x="8262936" y="4507126"/>
+              <a:ext cx="323849" cy="342890"/>
+            </a:xfrm>
+            <a:prstGeom prst="rect">
+              <a:avLst/>
+            </a:prstGeom>
+            <a:solidFill>
+              <a:schemeClr val="accent4">
+                <a:lumMod val="60000"/>
+                <a:lumOff val="40000"/>
+              </a:schemeClr>
+            </a:solidFill>
+            <a:ln>
+              <a:noFill/>
+            </a:ln>
+          </p:spPr>
+          <p:style>
+            <a:lnRef idx="2">
+              <a:schemeClr val="accent1">
+                <a:shade val="50000"/>
+              </a:schemeClr>
+            </a:lnRef>
+            <a:fillRef idx="1">
+              <a:schemeClr val="accent1"/>
+            </a:fillRef>
+            <a:effectRef idx="0">
+              <a:schemeClr val="accent1"/>
+            </a:effectRef>
+            <a:fontRef idx="minor">
+              <a:schemeClr val="lt1"/>
+            </a:fontRef>
+          </p:style>
+          <p:txBody>
+            <a:bodyPr rtlCol="0" anchor="ctr"/>
+            <a:lstStyle/>
+            <a:p>
+              <a:pPr algn="ctr"/>
+              <a:r>
+                <a:rPr lang="es-ES" sz="1100" b="1" dirty="0" smtClean="0">
+                  <a:solidFill>
+                    <a:schemeClr val="tx1"/>
+                  </a:solidFill>
+                </a:rPr>
+                <a:t>&gt;</a:t>
+              </a:r>
+              <a:endParaRPr lang="es-ES" sz="1100" b="1" dirty="0">
+                <a:solidFill>
+                  <a:schemeClr val="tx1"/>
+                </a:solidFill>
+              </a:endParaRPr>
+            </a:p>
+          </p:txBody>
+        </p:sp>
+        <p:sp>
+          <p:nvSpPr>
+            <p:cNvPr id="32" name="Rectángulo 31"/>
+            <p:cNvSpPr/>
+            <p:nvPr/>
+          </p:nvSpPr>
+          <p:spPr>
+            <a:xfrm>
+              <a:off x="8615361" y="4507126"/>
+              <a:ext cx="323849" cy="342890"/>
+            </a:xfrm>
+            <a:prstGeom prst="rect">
+              <a:avLst/>
+            </a:prstGeom>
+            <a:solidFill>
+              <a:schemeClr val="accent4">
+                <a:lumMod val="60000"/>
+                <a:lumOff val="40000"/>
+              </a:schemeClr>
+            </a:solidFill>
+            <a:ln>
+              <a:noFill/>
+            </a:ln>
+          </p:spPr>
+          <p:style>
+            <a:lnRef idx="2">
+              <a:schemeClr val="accent1">
+                <a:shade val="50000"/>
+              </a:schemeClr>
+            </a:lnRef>
+            <a:fillRef idx="1">
+              <a:schemeClr val="accent1"/>
+            </a:fillRef>
+            <a:effectRef idx="0">
+              <a:schemeClr val="accent1"/>
+            </a:effectRef>
+            <a:fontRef idx="minor">
+              <a:schemeClr val="lt1"/>
+            </a:fontRef>
+          </p:style>
+          <p:txBody>
+            <a:bodyPr rtlCol="0" anchor="ctr"/>
+            <a:lstStyle/>
+            <a:p>
+              <a:pPr algn="ctr"/>
+              <a:r>
+                <a:rPr lang="es-ES" sz="1100" b="1" dirty="0" smtClean="0">
+                  <a:solidFill>
+                    <a:schemeClr val="tx1"/>
+                  </a:solidFill>
+                </a:rPr>
+                <a:t>&gt;|</a:t>
+              </a:r>
+              <a:endParaRPr lang="es-ES" sz="1100" b="1" dirty="0">
+                <a:solidFill>
+                  <a:schemeClr val="tx1"/>
+                </a:solidFill>
+              </a:endParaRPr>
+            </a:p>
+          </p:txBody>
+        </p:sp>
+      </p:grpSp>
+    </p:spTree>
+    <p:extLst>
+      <p:ext uri="{BB962C8B-B14F-4D97-AF65-F5344CB8AC3E}">
+        <p14:creationId xmlns:p14="http://schemas.microsoft.com/office/powerpoint/2010/main" val="2644808379"/>
       </p:ext>
     </p:extLst>
   </p:cSld>

</xml_diff>